<commit_message>
Avancées sur le powerpoint
</commit_message>
<xml_diff>
--- a/Projet_5_présentation.pptx
+++ b/Projet_5_présentation.pptx
@@ -619,39 +619,68 @@
           <a:p>
             <a:r>
               <a:rPr lang="fr-FR" dirty="0"/>
-              <a:t>Nous nous intéresserons ici à deux Clusters : </a:t>
-            </a:r>
-          </a:p>
-          <a:p>
-            <a:r>
+              <a:t>On peut voir sur PC1 que les variables ayant le plus de poids dans l'inertie sont : </a:t>
+            </a:r>
+            <a:br>
               <a:rPr lang="fr-FR" dirty="0"/>
-              <a:t>Le 5 et le 7 </a:t>
-            </a:r>
+            </a:br>
+            <a:endParaRPr lang="fr-FR" dirty="0"/>
           </a:p>
           <a:p>
             <a:r>
               <a:rPr lang="fr-FR" dirty="0"/>
-              <a:t>Ainsi qu’à deux variables – </a:t>
+              <a:t>La disponibilité en protéines</a:t>
+            </a:r>
+          </a:p>
+          <a:p>
+            <a:r>
+              <a:rPr lang="fr-FR" dirty="0"/>
+              <a:t>La </a:t>
             </a:r>
             <a:r>
               <a:rPr lang="fr-FR" dirty="0" err="1"/>
-              <a:t>Ratio_prot</a:t>
+              <a:t>disponinibilité</a:t>
             </a:r>
             <a:r>
               <a:rPr lang="fr-FR" dirty="0"/>
-              <a:t> et </a:t>
-            </a:r>
-            <a:r>
-              <a:rPr lang="fr-FR" dirty="0" err="1"/>
-              <a:t>Dispo_alim_tot</a:t>
-            </a:r>
+              <a:t> alimentaire totale</a:t>
+            </a:r>
+          </a:p>
+          <a:p>
+            <a:r>
+              <a:rPr lang="fr-FR" dirty="0"/>
+              <a:t>Le ratio de protéines animales / Protéines totales CLICK</a:t>
+            </a:r>
+          </a:p>
+          <a:p>
             <a:endParaRPr lang="fr-FR" dirty="0"/>
           </a:p>
           <a:p>
             <a:r>
               <a:rPr lang="fr-FR" dirty="0"/>
-              <a:t>Comme vu dans la partie précédente, ces deux variables suivent bien une loi normale.</a:t>
-            </a:r>
+              <a:t>On remarque aussi que le PIB/h est assez élevé (0,41) </a:t>
+            </a:r>
+          </a:p>
+          <a:p>
+            <a:endParaRPr lang="fr-FR" dirty="0"/>
+          </a:p>
+          <a:p>
+            <a:r>
+              <a:rPr lang="fr-FR" dirty="0"/>
+              <a:t>On peut donc conclure que la composante principale PC1 correspond au niveau de richesses du pays</a:t>
+            </a:r>
+          </a:p>
+          <a:p>
+            <a:endParaRPr lang="fr-FR" dirty="0"/>
+          </a:p>
+          <a:p>
+            <a:r>
+              <a:rPr lang="fr-FR" dirty="0"/>
+              <a:t>CLICK</a:t>
+            </a:r>
+          </a:p>
+          <a:p>
+            <a:endParaRPr lang="fr-FR" dirty="0"/>
           </a:p>
         </p:txBody>
       </p:sp>
@@ -672,7 +701,7 @@
           <a:p>
             <a:fld id="{F44DFA25-216B-4048-9E14-17772AFFB9C9}" type="slidenum">
               <a:rPr lang="fr-FR" smtClean="0"/>
-              <a:t>20</a:t>
+              <a:t>14</a:t>
             </a:fld>
             <a:endParaRPr lang="fr-FR"/>
           </a:p>
@@ -681,7 +710,7 @@
     </p:spTree>
     <p:extLst>
       <p:ext uri="{BB962C8B-B14F-4D97-AF65-F5344CB8AC3E}">
-        <p14:creationId xmlns:p14="http://schemas.microsoft.com/office/powerpoint/2010/main" val="3671374684"/>
+        <p14:creationId xmlns:p14="http://schemas.microsoft.com/office/powerpoint/2010/main" val="1988068708"/>
       </p:ext>
     </p:extLst>
   </p:cSld>
@@ -737,44 +766,62 @@
           <a:p>
             <a:r>
               <a:rPr lang="fr-FR" dirty="0"/>
-              <a:t>On utilise ici </a:t>
+              <a:t>A l'exception du cluster 6, les pays sont regroupés correctement par cluster sur F1. </a:t>
+            </a:r>
+            <a:br>
+              <a:rPr lang="fr-FR" dirty="0"/>
+            </a:br>
+            <a:r>
+              <a:rPr lang="fr-FR" dirty="0"/>
+              <a:t>Si certains semblent être confondus avec les autres, c'est F2 qui nous permet de voir la différence entre ces derniers. </a:t>
+            </a:r>
+          </a:p>
+          <a:p>
+            <a:endParaRPr lang="fr-FR" dirty="0"/>
+          </a:p>
+          <a:p>
+            <a:r>
+              <a:rPr lang="fr-FR" dirty="0"/>
+              <a:t>Dans la partie du </a:t>
             </a:r>
             <a:r>
               <a:rPr lang="fr-FR" dirty="0" err="1"/>
-              <a:t>scipy.stats.barlett</a:t>
+              <a:t>dendogramme</a:t>
             </a:r>
             <a:r>
               <a:rPr lang="fr-FR" dirty="0"/>
-              <a:t> pour comparer les deux échantillons ; </a:t>
-            </a:r>
+              <a:t>, nous avons vu que le cluster 7 était celui qui nous intéressait le plus, voyons donc comment sont répartis les pays de ce cluster, et à quoi est-ce qu'ils correspondent, après l'ACP.</a:t>
+            </a:r>
+          </a:p>
+          <a:p>
+            <a:endParaRPr lang="fr-FR" dirty="0"/>
           </a:p>
           <a:p>
             <a:r>
               <a:rPr lang="fr-FR" dirty="0"/>
-              <a:t>On peut ainsi savoir si les variances sont différentes en comparant Alpha et </a:t>
+              <a:t>Le cluster 7 représente les pays le plus à droite sur F1, avec donc une forte valeur. </a:t>
+            </a:r>
+            <a:br>
+              <a:rPr lang="fr-FR" dirty="0"/>
+            </a:br>
+            <a:r>
+              <a:rPr lang="fr-FR" dirty="0"/>
+              <a:t>Comme nous l'avons vu </a:t>
             </a:r>
             <a:r>
               <a:rPr lang="fr-FR" dirty="0" err="1"/>
-              <a:t>P_valeur</a:t>
+              <a:t>précédement</a:t>
             </a:r>
             <a:r>
               <a:rPr lang="fr-FR" dirty="0"/>
-              <a:t> ;</a:t>
-            </a:r>
-          </a:p>
-          <a:p>
-            <a:endParaRPr lang="fr-FR" dirty="0"/>
-          </a:p>
-          <a:p>
-            <a:r>
+              <a:t>, F1 représente le niveau de richesse du pays ; </a:t>
+            </a:r>
+            <a:br>
               <a:rPr lang="fr-FR" dirty="0"/>
-              <a:t>Ici, avec un niveau de test à 1%, les variances sont bien égales.</a:t>
-            </a:r>
-          </a:p>
-          <a:p>
+            </a:br>
             <a:r>
               <a:rPr lang="fr-FR" dirty="0"/>
-              <a:t>Les deux Clusters suivent donc la même loi normale.</a:t>
+              <a:t>Les pays du cluster 7 correspondent donc aux pays les plus riches.</a:t>
             </a:r>
           </a:p>
         </p:txBody>
@@ -796,7 +843,7 @@
           <a:p>
             <a:fld id="{F44DFA25-216B-4048-9E14-17772AFFB9C9}" type="slidenum">
               <a:rPr lang="fr-FR" smtClean="0"/>
-              <a:t>21</a:t>
+              <a:t>15</a:t>
             </a:fld>
             <a:endParaRPr lang="fr-FR"/>
           </a:p>
@@ -805,7 +852,7 @@
     </p:spTree>
     <p:extLst>
       <p:ext uri="{BB962C8B-B14F-4D97-AF65-F5344CB8AC3E}">
-        <p14:creationId xmlns:p14="http://schemas.microsoft.com/office/powerpoint/2010/main" val="3666263677"/>
+        <p14:creationId xmlns:p14="http://schemas.microsoft.com/office/powerpoint/2010/main" val="3528905593"/>
       </p:ext>
     </p:extLst>
   </p:cSld>
@@ -861,53 +908,7 @@
           <a:p>
             <a:r>
               <a:rPr lang="fr-FR" dirty="0"/>
-              <a:t>On utilise ici </a:t>
-            </a:r>
-            <a:r>
-              <a:rPr lang="fr-FR" dirty="0" err="1"/>
-              <a:t>scipy.stats.ttest_ind</a:t>
-            </a:r>
-            <a:r>
-              <a:rPr lang="fr-FR" dirty="0"/>
-              <a:t> pour comparer les deux Clusters </a:t>
-            </a:r>
-          </a:p>
-          <a:p>
-            <a:r>
-              <a:rPr lang="fr-FR" dirty="0"/>
-              <a:t>CLICK</a:t>
-            </a:r>
-          </a:p>
-          <a:p>
-            <a:endParaRPr lang="fr-FR" dirty="0"/>
-          </a:p>
-          <a:p>
-            <a:r>
-              <a:rPr lang="fr-FR" dirty="0"/>
-              <a:t>Encore une fois, en comparant alpha et </a:t>
-            </a:r>
-            <a:r>
-              <a:rPr lang="fr-FR" dirty="0" err="1"/>
-              <a:t>p_valeur</a:t>
-            </a:r>
-            <a:r>
-              <a:rPr lang="fr-FR" dirty="0"/>
-              <a:t>, on sait si les moyennes sont égales ou non</a:t>
-            </a:r>
-          </a:p>
-          <a:p>
-            <a:endParaRPr lang="fr-FR" dirty="0"/>
-          </a:p>
-          <a:p>
-            <a:r>
-              <a:rPr lang="fr-FR" dirty="0"/>
-              <a:t>CLICK </a:t>
-            </a:r>
-          </a:p>
-          <a:p>
-            <a:r>
-              <a:rPr lang="fr-FR" dirty="0"/>
-              <a:t>Ici, les moyennes diffèrent bien.</a:t>
+              <a:t>Pour rappel, la liste des clusters avec les centroïdes </a:t>
             </a:r>
           </a:p>
         </p:txBody>
@@ -929,7 +930,7 @@
           <a:p>
             <a:fld id="{F44DFA25-216B-4048-9E14-17772AFFB9C9}" type="slidenum">
               <a:rPr lang="fr-FR" smtClean="0"/>
-              <a:t>22</a:t>
+              <a:t>16</a:t>
             </a:fld>
             <a:endParaRPr lang="fr-FR"/>
           </a:p>
@@ -938,7 +939,7 @@
     </p:spTree>
     <p:extLst>
       <p:ext uri="{BB962C8B-B14F-4D97-AF65-F5344CB8AC3E}">
-        <p14:creationId xmlns:p14="http://schemas.microsoft.com/office/powerpoint/2010/main" val="1147614657"/>
+        <p14:creationId xmlns:p14="http://schemas.microsoft.com/office/powerpoint/2010/main" val="1567256808"/>
       </p:ext>
     </p:extLst>
   </p:cSld>
@@ -992,7 +993,341 @@
           <a:bodyPr/>
           <a:lstStyle/>
           <a:p>
+            <a:pPr marL="0" marR="0" lvl="0" indent="0" algn="l" defTabSz="914400" rtl="0" eaLnBrk="1" fontAlgn="auto" latinLnBrk="0" hangingPunct="1">
+              <a:lnSpc>
+                <a:spcPct val="100000"/>
+              </a:lnSpc>
+              <a:spcBef>
+                <a:spcPts val="0"/>
+              </a:spcBef>
+              <a:spcAft>
+                <a:spcPts val="0"/>
+              </a:spcAft>
+              <a:buClrTx/>
+              <a:buSzTx/>
+              <a:buFontTx/>
+              <a:buNone/>
+              <a:tabLst/>
+              <a:defRPr/>
+            </a:pPr>
+            <a:r>
+              <a:rPr lang="fr-FR" dirty="0"/>
+              <a:t>CLICK</a:t>
+            </a:r>
+          </a:p>
+          <a:p>
+            <a:pPr marL="0" marR="0" lvl="0" indent="0" algn="l" defTabSz="914400" rtl="0" eaLnBrk="1" fontAlgn="auto" latinLnBrk="0" hangingPunct="1">
+              <a:lnSpc>
+                <a:spcPct val="100000"/>
+              </a:lnSpc>
+              <a:spcBef>
+                <a:spcPts val="0"/>
+              </a:spcBef>
+              <a:spcAft>
+                <a:spcPts val="0"/>
+              </a:spcAft>
+              <a:buClrTx/>
+              <a:buSzTx/>
+              <a:buFontTx/>
+              <a:buNone/>
+              <a:tabLst/>
+              <a:defRPr/>
+            </a:pPr>
+            <a:r>
+              <a:rPr lang="fr-FR" dirty="0" err="1"/>
+              <a:t>Np.random.seed</a:t>
+            </a:r>
+            <a:r>
+              <a:rPr lang="fr-FR" dirty="0"/>
+              <a:t>(1) permet de bloquer le nombre de lancés aléatoires à 1 (afin d’éviter d’avoir des résultats différent entre chaque exécution)</a:t>
+            </a:r>
+          </a:p>
+          <a:p>
+            <a:pPr marL="0" marR="0" lvl="0" indent="0" algn="l" defTabSz="914400" rtl="0" eaLnBrk="1" fontAlgn="auto" latinLnBrk="0" hangingPunct="1">
+              <a:lnSpc>
+                <a:spcPct val="100000"/>
+              </a:lnSpc>
+              <a:spcBef>
+                <a:spcPts val="0"/>
+              </a:spcBef>
+              <a:spcAft>
+                <a:spcPts val="0"/>
+              </a:spcAft>
+              <a:buClrTx/>
+              <a:buSzTx/>
+              <a:buFontTx/>
+              <a:buNone/>
+              <a:tabLst/>
+              <a:defRPr/>
+            </a:pPr>
             <a:endParaRPr lang="fr-FR" dirty="0"/>
+          </a:p>
+          <a:p>
+            <a:pPr marL="0" marR="0" lvl="0" indent="0" algn="l" defTabSz="914400" rtl="0" eaLnBrk="1" fontAlgn="auto" latinLnBrk="0" hangingPunct="1">
+              <a:lnSpc>
+                <a:spcPct val="100000"/>
+              </a:lnSpc>
+              <a:spcBef>
+                <a:spcPts val="0"/>
+              </a:spcBef>
+              <a:spcAft>
+                <a:spcPts val="0"/>
+              </a:spcAft>
+              <a:buClrTx/>
+              <a:buSzTx/>
+              <a:buFontTx/>
+              <a:buNone/>
+              <a:tabLst/>
+              <a:defRPr/>
+            </a:pPr>
+            <a:r>
+              <a:rPr lang="fr-FR" dirty="0"/>
+              <a:t>CLICK</a:t>
+            </a:r>
+          </a:p>
+          <a:p>
+            <a:pPr marL="0" marR="0" lvl="0" indent="0" algn="l" defTabSz="914400" rtl="0" eaLnBrk="1" fontAlgn="auto" latinLnBrk="0" hangingPunct="1">
+              <a:lnSpc>
+                <a:spcPct val="100000"/>
+              </a:lnSpc>
+              <a:spcBef>
+                <a:spcPts val="0"/>
+              </a:spcBef>
+              <a:spcAft>
+                <a:spcPts val="0"/>
+              </a:spcAft>
+              <a:buClrTx/>
+              <a:buSzTx/>
+              <a:buFontTx/>
+              <a:buNone/>
+              <a:tabLst/>
+              <a:defRPr/>
+            </a:pPr>
+            <a:r>
+              <a:rPr lang="fr-FR" dirty="0"/>
+              <a:t>On utilise ensuite ks_2amp pour savoir si la variable suit une loi normale ou non : </a:t>
+            </a:r>
+          </a:p>
+          <a:p>
+            <a:pPr marL="0" marR="0" lvl="0" indent="0" algn="l" defTabSz="914400" rtl="0" eaLnBrk="1" fontAlgn="auto" latinLnBrk="0" hangingPunct="1">
+              <a:lnSpc>
+                <a:spcPct val="100000"/>
+              </a:lnSpc>
+              <a:spcBef>
+                <a:spcPts val="0"/>
+              </a:spcBef>
+              <a:spcAft>
+                <a:spcPts val="0"/>
+              </a:spcAft>
+              <a:buClrTx/>
+              <a:buSzTx/>
+              <a:buFontTx/>
+              <a:buNone/>
+              <a:tabLst/>
+              <a:defRPr/>
+            </a:pPr>
+            <a:endParaRPr lang="fr-FR" dirty="0"/>
+          </a:p>
+          <a:p>
+            <a:pPr marL="0" marR="0" lvl="0" indent="0" algn="l" defTabSz="914400" rtl="0" eaLnBrk="1" fontAlgn="auto" latinLnBrk="0" hangingPunct="1">
+              <a:lnSpc>
+                <a:spcPct val="100000"/>
+              </a:lnSpc>
+              <a:spcBef>
+                <a:spcPts val="0"/>
+              </a:spcBef>
+              <a:spcAft>
+                <a:spcPts val="0"/>
+              </a:spcAft>
+              <a:buClrTx/>
+              <a:buSzTx/>
+              <a:buFontTx/>
+              <a:buNone/>
+              <a:tabLst/>
+              <a:defRPr/>
+            </a:pPr>
+            <a:r>
+              <a:rPr lang="fr-FR" dirty="0"/>
+              <a:t>CLICK</a:t>
+            </a:r>
+          </a:p>
+          <a:p>
+            <a:pPr marL="0" marR="0" lvl="0" indent="0" algn="l" defTabSz="914400" rtl="0" eaLnBrk="1" fontAlgn="auto" latinLnBrk="0" hangingPunct="1">
+              <a:lnSpc>
+                <a:spcPct val="100000"/>
+              </a:lnSpc>
+              <a:spcBef>
+                <a:spcPts val="0"/>
+              </a:spcBef>
+              <a:spcAft>
+                <a:spcPts val="0"/>
+              </a:spcAft>
+              <a:buClrTx/>
+              <a:buSzTx/>
+              <a:buFontTx/>
+              <a:buNone/>
+              <a:tabLst/>
+              <a:defRPr/>
+            </a:pPr>
+            <a:r>
+              <a:rPr lang="fr-FR" dirty="0"/>
+              <a:t>On prend d’abord notre échantillon (avec la colonne que l’on veut tester) </a:t>
+            </a:r>
+          </a:p>
+          <a:p>
+            <a:pPr marL="0" marR="0" lvl="0" indent="0" algn="l" defTabSz="914400" rtl="0" eaLnBrk="1" fontAlgn="auto" latinLnBrk="0" hangingPunct="1">
+              <a:lnSpc>
+                <a:spcPct val="100000"/>
+              </a:lnSpc>
+              <a:spcBef>
+                <a:spcPts val="0"/>
+              </a:spcBef>
+              <a:spcAft>
+                <a:spcPts val="0"/>
+              </a:spcAft>
+              <a:buClrTx/>
+              <a:buSzTx/>
+              <a:buFontTx/>
+              <a:buNone/>
+              <a:tabLst/>
+              <a:defRPr/>
+            </a:pPr>
+            <a:endParaRPr lang="fr-FR" dirty="0"/>
+          </a:p>
+          <a:p>
+            <a:pPr marL="0" marR="0" lvl="0" indent="0" algn="l" defTabSz="914400" rtl="0" eaLnBrk="1" fontAlgn="auto" latinLnBrk="0" hangingPunct="1">
+              <a:lnSpc>
+                <a:spcPct val="100000"/>
+              </a:lnSpc>
+              <a:spcBef>
+                <a:spcPts val="0"/>
+              </a:spcBef>
+              <a:spcAft>
+                <a:spcPts val="0"/>
+              </a:spcAft>
+              <a:buClrTx/>
+              <a:buSzTx/>
+              <a:buFontTx/>
+              <a:buNone/>
+              <a:tabLst/>
+              <a:defRPr/>
+            </a:pPr>
+            <a:r>
+              <a:rPr lang="fr-FR" dirty="0"/>
+              <a:t>CLICK</a:t>
+            </a:r>
+          </a:p>
+          <a:p>
+            <a:pPr marL="0" marR="0" lvl="0" indent="0" algn="l" defTabSz="914400" rtl="0" eaLnBrk="1" fontAlgn="auto" latinLnBrk="0" hangingPunct="1">
+              <a:lnSpc>
+                <a:spcPct val="100000"/>
+              </a:lnSpc>
+              <a:spcBef>
+                <a:spcPts val="0"/>
+              </a:spcBef>
+              <a:spcAft>
+                <a:spcPts val="0"/>
+              </a:spcAft>
+              <a:buClrTx/>
+              <a:buSzTx/>
+              <a:buFontTx/>
+              <a:buNone/>
+              <a:tabLst/>
+              <a:defRPr/>
+            </a:pPr>
+            <a:r>
+              <a:rPr lang="fr-FR" dirty="0"/>
+              <a:t>Puis, en deuxième valeur, on transforme notre échantillon en échantillon suivant une loi normale, afin de comparer les deux.</a:t>
+            </a:r>
+          </a:p>
+          <a:p>
+            <a:pPr marL="0" marR="0" lvl="0" indent="0" algn="l" defTabSz="914400" rtl="0" eaLnBrk="1" fontAlgn="auto" latinLnBrk="0" hangingPunct="1">
+              <a:lnSpc>
+                <a:spcPct val="100000"/>
+              </a:lnSpc>
+              <a:spcBef>
+                <a:spcPts val="0"/>
+              </a:spcBef>
+              <a:spcAft>
+                <a:spcPts val="0"/>
+              </a:spcAft>
+              <a:buClrTx/>
+              <a:buSzTx/>
+              <a:buFontTx/>
+              <a:buNone/>
+              <a:tabLst/>
+              <a:defRPr/>
+            </a:pPr>
+            <a:endParaRPr lang="fr-FR" dirty="0"/>
+          </a:p>
+          <a:p>
+            <a:pPr marL="0" marR="0" lvl="0" indent="0" algn="l" defTabSz="914400" rtl="0" eaLnBrk="1" fontAlgn="auto" latinLnBrk="0" hangingPunct="1">
+              <a:lnSpc>
+                <a:spcPct val="100000"/>
+              </a:lnSpc>
+              <a:spcBef>
+                <a:spcPts val="0"/>
+              </a:spcBef>
+              <a:spcAft>
+                <a:spcPts val="0"/>
+              </a:spcAft>
+              <a:buClrTx/>
+              <a:buSzTx/>
+              <a:buFontTx/>
+              <a:buNone/>
+              <a:tabLst/>
+              <a:defRPr/>
+            </a:pPr>
+            <a:r>
+              <a:rPr lang="fr-FR" dirty="0"/>
+              <a:t>CLICK</a:t>
+            </a:r>
+          </a:p>
+          <a:p>
+            <a:pPr marL="0" marR="0" lvl="0" indent="0" algn="l" defTabSz="914400" rtl="0" eaLnBrk="1" fontAlgn="auto" latinLnBrk="0" hangingPunct="1">
+              <a:lnSpc>
+                <a:spcPct val="100000"/>
+              </a:lnSpc>
+              <a:spcBef>
+                <a:spcPts val="0"/>
+              </a:spcBef>
+              <a:spcAft>
+                <a:spcPts val="0"/>
+              </a:spcAft>
+              <a:buClrTx/>
+              <a:buSzTx/>
+              <a:buFontTx/>
+              <a:buNone/>
+              <a:tabLst/>
+              <a:defRPr/>
+            </a:pPr>
+            <a:r>
+              <a:rPr lang="fr-FR" dirty="0"/>
+              <a:t>Enfin, on utilise une condition IF pour afficher si la variable suit une loi normale ou non (grâce à la comparaison entre Alpha et </a:t>
+            </a:r>
+            <a:r>
+              <a:rPr lang="fr-FR" dirty="0" err="1"/>
+              <a:t>P_valeur</a:t>
+            </a:r>
+            <a:r>
+              <a:rPr lang="fr-FR" dirty="0"/>
+              <a:t>)</a:t>
+            </a:r>
+          </a:p>
+          <a:p>
+            <a:endParaRPr lang="fr-FR" dirty="0"/>
+          </a:p>
+          <a:p>
+            <a:r>
+              <a:rPr lang="fr-FR" dirty="0"/>
+              <a:t>CLICK</a:t>
+            </a:r>
+          </a:p>
+          <a:p>
+            <a:r>
+              <a:rPr lang="fr-FR" dirty="0"/>
+              <a:t>Ce qui nous donne le tableau suivant pour nos variables </a:t>
+            </a:r>
           </a:p>
         </p:txBody>
       </p:sp>
@@ -1013,7 +1348,7 @@
           <a:p>
             <a:fld id="{F44DFA25-216B-4048-9E14-17772AFFB9C9}" type="slidenum">
               <a:rPr lang="fr-FR" smtClean="0"/>
-              <a:t>23</a:t>
+              <a:t>18</a:t>
             </a:fld>
             <a:endParaRPr lang="fr-FR"/>
           </a:p>
@@ -1022,7 +1357,7 @@
     </p:spTree>
     <p:extLst>
       <p:ext uri="{BB962C8B-B14F-4D97-AF65-F5344CB8AC3E}">
-        <p14:creationId xmlns:p14="http://schemas.microsoft.com/office/powerpoint/2010/main" val="910795080"/>
+        <p14:creationId xmlns:p14="http://schemas.microsoft.com/office/powerpoint/2010/main" val="821450017"/>
       </p:ext>
     </p:extLst>
   </p:cSld>
@@ -1076,7 +1411,47 @@
           <a:bodyPr/>
           <a:lstStyle/>
           <a:p>
+            <a:r>
+              <a:rPr lang="fr-FR" dirty="0"/>
+              <a:t>Point à revoir</a:t>
+            </a:r>
+          </a:p>
+          <a:p>
             <a:endParaRPr lang="fr-FR" dirty="0"/>
+          </a:p>
+          <a:p>
+            <a:r>
+              <a:rPr lang="fr-FR" dirty="0"/>
+              <a:t>Le but du test est de vérifier que nos Clusters diffèrent bien entre eux.</a:t>
+            </a:r>
+          </a:p>
+          <a:p>
+            <a:endParaRPr lang="fr-FR" dirty="0"/>
+          </a:p>
+          <a:p>
+            <a:r>
+              <a:rPr lang="fr-FR" dirty="0"/>
+              <a:t>On s’apprête à tester nos variables suivant une loi normale ; On souhaite savoir si ces variables suivent la même loi normale en fonction des Clusters (en analysant la Variance), tout en étant différents (en testant la Moyenne) ; </a:t>
+            </a:r>
+          </a:p>
+          <a:p>
+            <a:endParaRPr lang="fr-FR" dirty="0"/>
+          </a:p>
+          <a:p>
+            <a:r>
+              <a:rPr lang="fr-FR" dirty="0"/>
+              <a:t>En fait, on veut que chaque Cluster prenne une partie de la variable globale (une partie de la courbe de la variable de l’échantillon, en loi normale donc), mais que ces Clusters diffèrent dans la partie de la loi normale qu’il prenne (moyenne différente). </a:t>
+            </a:r>
+            <a:br>
+              <a:rPr lang="fr-FR" dirty="0"/>
+            </a:br>
+            <a:br>
+              <a:rPr lang="fr-FR" dirty="0"/>
+            </a:br>
+            <a:r>
+              <a:rPr lang="fr-FR" dirty="0"/>
+              <a:t>Partie à expliquer plus clairement, mais voilà l’idée.</a:t>
+            </a:r>
           </a:p>
         </p:txBody>
       </p:sp>
@@ -1095,9 +1470,9 @@
           <a:bodyPr/>
           <a:lstStyle/>
           <a:p>
-            <a:fld id="{5F05756B-5F5C-4EED-907C-E25857D58D0B}" type="slidenum">
+            <a:fld id="{F44DFA25-216B-4048-9E14-17772AFFB9C9}" type="slidenum">
               <a:rPr lang="fr-FR" smtClean="0"/>
-              <a:t>24</a:t>
+              <a:t>19</a:t>
             </a:fld>
             <a:endParaRPr lang="fr-FR"/>
           </a:p>
@@ -1106,7 +1481,7 @@
     </p:spTree>
     <p:extLst>
       <p:ext uri="{BB962C8B-B14F-4D97-AF65-F5344CB8AC3E}">
-        <p14:creationId xmlns:p14="http://schemas.microsoft.com/office/powerpoint/2010/main" val="268619433"/>
+        <p14:creationId xmlns:p14="http://schemas.microsoft.com/office/powerpoint/2010/main" val="3805455055"/>
       </p:ext>
     </p:extLst>
   </p:cSld>
@@ -1162,15 +1537,38 @@
           <a:p>
             <a:r>
               <a:rPr lang="fr-FR" dirty="0"/>
-              <a:t>Remettre le </a:t>
+              <a:t>Nous nous intéresserons ici à deux Clusters : </a:t>
+            </a:r>
+          </a:p>
+          <a:p>
+            <a:r>
+              <a:rPr lang="fr-FR" dirty="0"/>
+              <a:t>Le 5 et le 7 </a:t>
+            </a:r>
+          </a:p>
+          <a:p>
+            <a:r>
+              <a:rPr lang="fr-FR" dirty="0"/>
+              <a:t>Ainsi qu’à deux variables – </a:t>
             </a:r>
             <a:r>
               <a:rPr lang="fr-FR" dirty="0" err="1"/>
-              <a:t>Df</a:t>
+              <a:t>Ratio_prot</a:t>
             </a:r>
             <a:r>
               <a:rPr lang="fr-FR" dirty="0"/>
-              <a:t> sans la France et voir pour les émirats arabes unis</a:t>
+              <a:t> et </a:t>
+            </a:r>
+            <a:r>
+              <a:rPr lang="fr-FR" dirty="0" err="1"/>
+              <a:t>Dispo_alim_tot</a:t>
+            </a:r>
+            <a:endParaRPr lang="fr-FR" dirty="0"/>
+          </a:p>
+          <a:p>
+            <a:r>
+              <a:rPr lang="fr-FR" dirty="0"/>
+              <a:t>Comme vu dans la partie précédente, ces deux variables suivent bien une loi normale.</a:t>
             </a:r>
           </a:p>
         </p:txBody>
@@ -1192,7 +1590,7 @@
           <a:p>
             <a:fld id="{F44DFA25-216B-4048-9E14-17772AFFB9C9}" type="slidenum">
               <a:rPr lang="fr-FR" smtClean="0"/>
-              <a:t>25</a:t>
+              <a:t>20</a:t>
             </a:fld>
             <a:endParaRPr lang="fr-FR"/>
           </a:p>
@@ -1201,7 +1599,432 @@
     </p:spTree>
     <p:extLst>
       <p:ext uri="{BB962C8B-B14F-4D97-AF65-F5344CB8AC3E}">
-        <p14:creationId xmlns:p14="http://schemas.microsoft.com/office/powerpoint/2010/main" val="2302832259"/>
+        <p14:creationId xmlns:p14="http://schemas.microsoft.com/office/powerpoint/2010/main" val="3671374684"/>
+      </p:ext>
+    </p:extLst>
+  </p:cSld>
+  <p:clrMapOvr>
+    <a:masterClrMapping/>
+  </p:clrMapOvr>
+</p:notes>
+</file>
+
+<file path=ppt/notesSlides/notesSlide16.xml><?xml version="1.0" encoding="utf-8"?>
+<p:notes xmlns:a="http://schemas.openxmlformats.org/drawingml/2006/main" xmlns:r="http://schemas.openxmlformats.org/officeDocument/2006/relationships" xmlns:p="http://schemas.openxmlformats.org/presentationml/2006/main">
+  <p:cSld>
+    <p:spTree>
+      <p:nvGrpSpPr>
+        <p:cNvPr id="1" name=""/>
+        <p:cNvGrpSpPr/>
+        <p:nvPr/>
+      </p:nvGrpSpPr>
+      <p:grpSpPr>
+        <a:xfrm>
+          <a:off x="0" y="0"/>
+          <a:ext cx="0" cy="0"/>
+          <a:chOff x="0" y="0"/>
+          <a:chExt cx="0" cy="0"/>
+        </a:xfrm>
+      </p:grpSpPr>
+      <p:sp>
+        <p:nvSpPr>
+          <p:cNvPr id="2" name="Espace réservé de l'image des diapositives 1"/>
+          <p:cNvSpPr>
+            <a:spLocks noGrp="1" noRot="1" noChangeAspect="1"/>
+          </p:cNvSpPr>
+          <p:nvPr>
+            <p:ph type="sldImg"/>
+          </p:nvPr>
+        </p:nvSpPr>
+        <p:spPr/>
+      </p:sp>
+      <p:sp>
+        <p:nvSpPr>
+          <p:cNvPr id="3" name="Espace réservé des notes 2"/>
+          <p:cNvSpPr>
+            <a:spLocks noGrp="1"/>
+          </p:cNvSpPr>
+          <p:nvPr>
+            <p:ph type="body" idx="1"/>
+          </p:nvPr>
+        </p:nvSpPr>
+        <p:spPr/>
+        <p:txBody>
+          <a:bodyPr/>
+          <a:lstStyle/>
+          <a:p>
+            <a:r>
+              <a:rPr lang="fr-FR" dirty="0"/>
+              <a:t>On utilise ici </a:t>
+            </a:r>
+            <a:r>
+              <a:rPr lang="fr-FR" dirty="0" err="1"/>
+              <a:t>scipy.stats.barlett</a:t>
+            </a:r>
+            <a:r>
+              <a:rPr lang="fr-FR" dirty="0"/>
+              <a:t> pour comparer les deux échantillons ; </a:t>
+            </a:r>
+          </a:p>
+          <a:p>
+            <a:r>
+              <a:rPr lang="fr-FR" dirty="0"/>
+              <a:t>On peut ainsi savoir si les variances sont différentes en comparant Alpha et </a:t>
+            </a:r>
+            <a:r>
+              <a:rPr lang="fr-FR" dirty="0" err="1"/>
+              <a:t>P_valeur</a:t>
+            </a:r>
+            <a:r>
+              <a:rPr lang="fr-FR" dirty="0"/>
+              <a:t> ;</a:t>
+            </a:r>
+          </a:p>
+          <a:p>
+            <a:endParaRPr lang="fr-FR" dirty="0"/>
+          </a:p>
+          <a:p>
+            <a:r>
+              <a:rPr lang="fr-FR" dirty="0"/>
+              <a:t>Ici, avec un niveau de test à 1%, les variances sont bien égales.</a:t>
+            </a:r>
+          </a:p>
+          <a:p>
+            <a:r>
+              <a:rPr lang="fr-FR" dirty="0"/>
+              <a:t>Les deux Clusters suivent donc la même loi normale.</a:t>
+            </a:r>
+          </a:p>
+        </p:txBody>
+      </p:sp>
+      <p:sp>
+        <p:nvSpPr>
+          <p:cNvPr id="4" name="Espace réservé du numéro de diapositive 3"/>
+          <p:cNvSpPr>
+            <a:spLocks noGrp="1"/>
+          </p:cNvSpPr>
+          <p:nvPr>
+            <p:ph type="sldNum" sz="quarter" idx="5"/>
+          </p:nvPr>
+        </p:nvSpPr>
+        <p:spPr/>
+        <p:txBody>
+          <a:bodyPr/>
+          <a:lstStyle/>
+          <a:p>
+            <a:fld id="{F44DFA25-216B-4048-9E14-17772AFFB9C9}" type="slidenum">
+              <a:rPr lang="fr-FR" smtClean="0"/>
+              <a:t>21</a:t>
+            </a:fld>
+            <a:endParaRPr lang="fr-FR"/>
+          </a:p>
+        </p:txBody>
+      </p:sp>
+    </p:spTree>
+    <p:extLst>
+      <p:ext uri="{BB962C8B-B14F-4D97-AF65-F5344CB8AC3E}">
+        <p14:creationId xmlns:p14="http://schemas.microsoft.com/office/powerpoint/2010/main" val="3666263677"/>
+      </p:ext>
+    </p:extLst>
+  </p:cSld>
+  <p:clrMapOvr>
+    <a:masterClrMapping/>
+  </p:clrMapOvr>
+</p:notes>
+</file>
+
+<file path=ppt/notesSlides/notesSlide17.xml><?xml version="1.0" encoding="utf-8"?>
+<p:notes xmlns:a="http://schemas.openxmlformats.org/drawingml/2006/main" xmlns:r="http://schemas.openxmlformats.org/officeDocument/2006/relationships" xmlns:p="http://schemas.openxmlformats.org/presentationml/2006/main">
+  <p:cSld>
+    <p:spTree>
+      <p:nvGrpSpPr>
+        <p:cNvPr id="1" name=""/>
+        <p:cNvGrpSpPr/>
+        <p:nvPr/>
+      </p:nvGrpSpPr>
+      <p:grpSpPr>
+        <a:xfrm>
+          <a:off x="0" y="0"/>
+          <a:ext cx="0" cy="0"/>
+          <a:chOff x="0" y="0"/>
+          <a:chExt cx="0" cy="0"/>
+        </a:xfrm>
+      </p:grpSpPr>
+      <p:sp>
+        <p:nvSpPr>
+          <p:cNvPr id="2" name="Espace réservé de l'image des diapositives 1"/>
+          <p:cNvSpPr>
+            <a:spLocks noGrp="1" noRot="1" noChangeAspect="1"/>
+          </p:cNvSpPr>
+          <p:nvPr>
+            <p:ph type="sldImg"/>
+          </p:nvPr>
+        </p:nvSpPr>
+        <p:spPr/>
+      </p:sp>
+      <p:sp>
+        <p:nvSpPr>
+          <p:cNvPr id="3" name="Espace réservé des notes 2"/>
+          <p:cNvSpPr>
+            <a:spLocks noGrp="1"/>
+          </p:cNvSpPr>
+          <p:nvPr>
+            <p:ph type="body" idx="1"/>
+          </p:nvPr>
+        </p:nvSpPr>
+        <p:spPr/>
+        <p:txBody>
+          <a:bodyPr/>
+          <a:lstStyle/>
+          <a:p>
+            <a:r>
+              <a:rPr lang="fr-FR" dirty="0"/>
+              <a:t>On utilise ici </a:t>
+            </a:r>
+            <a:r>
+              <a:rPr lang="fr-FR" dirty="0" err="1"/>
+              <a:t>scipy.stats.ttest_ind</a:t>
+            </a:r>
+            <a:r>
+              <a:rPr lang="fr-FR" dirty="0"/>
+              <a:t> pour comparer les deux Clusters </a:t>
+            </a:r>
+          </a:p>
+          <a:p>
+            <a:r>
+              <a:rPr lang="fr-FR" dirty="0"/>
+              <a:t>CLICK</a:t>
+            </a:r>
+          </a:p>
+          <a:p>
+            <a:endParaRPr lang="fr-FR" dirty="0"/>
+          </a:p>
+          <a:p>
+            <a:r>
+              <a:rPr lang="fr-FR" dirty="0"/>
+              <a:t>Encore une fois, en comparant alpha et </a:t>
+            </a:r>
+            <a:r>
+              <a:rPr lang="fr-FR" dirty="0" err="1"/>
+              <a:t>p_valeur</a:t>
+            </a:r>
+            <a:r>
+              <a:rPr lang="fr-FR" dirty="0"/>
+              <a:t>, on sait si les moyennes sont égales ou non</a:t>
+            </a:r>
+          </a:p>
+          <a:p>
+            <a:endParaRPr lang="fr-FR" dirty="0"/>
+          </a:p>
+          <a:p>
+            <a:r>
+              <a:rPr lang="fr-FR" dirty="0"/>
+              <a:t>CLICK </a:t>
+            </a:r>
+          </a:p>
+          <a:p>
+            <a:r>
+              <a:rPr lang="fr-FR" dirty="0"/>
+              <a:t>Ici, les moyennes diffèrent bien.</a:t>
+            </a:r>
+          </a:p>
+        </p:txBody>
+      </p:sp>
+      <p:sp>
+        <p:nvSpPr>
+          <p:cNvPr id="4" name="Espace réservé du numéro de diapositive 3"/>
+          <p:cNvSpPr>
+            <a:spLocks noGrp="1"/>
+          </p:cNvSpPr>
+          <p:nvPr>
+            <p:ph type="sldNum" sz="quarter" idx="5"/>
+          </p:nvPr>
+        </p:nvSpPr>
+        <p:spPr/>
+        <p:txBody>
+          <a:bodyPr/>
+          <a:lstStyle/>
+          <a:p>
+            <a:fld id="{F44DFA25-216B-4048-9E14-17772AFFB9C9}" type="slidenum">
+              <a:rPr lang="fr-FR" smtClean="0"/>
+              <a:t>22</a:t>
+            </a:fld>
+            <a:endParaRPr lang="fr-FR"/>
+          </a:p>
+        </p:txBody>
+      </p:sp>
+    </p:spTree>
+    <p:extLst>
+      <p:ext uri="{BB962C8B-B14F-4D97-AF65-F5344CB8AC3E}">
+        <p14:creationId xmlns:p14="http://schemas.microsoft.com/office/powerpoint/2010/main" val="1147614657"/>
+      </p:ext>
+    </p:extLst>
+  </p:cSld>
+  <p:clrMapOvr>
+    <a:masterClrMapping/>
+  </p:clrMapOvr>
+</p:notes>
+</file>
+
+<file path=ppt/notesSlides/notesSlide18.xml><?xml version="1.0" encoding="utf-8"?>
+<p:notes xmlns:a="http://schemas.openxmlformats.org/drawingml/2006/main" xmlns:r="http://schemas.openxmlformats.org/officeDocument/2006/relationships" xmlns:p="http://schemas.openxmlformats.org/presentationml/2006/main">
+  <p:cSld>
+    <p:spTree>
+      <p:nvGrpSpPr>
+        <p:cNvPr id="1" name=""/>
+        <p:cNvGrpSpPr/>
+        <p:nvPr/>
+      </p:nvGrpSpPr>
+      <p:grpSpPr>
+        <a:xfrm>
+          <a:off x="0" y="0"/>
+          <a:ext cx="0" cy="0"/>
+          <a:chOff x="0" y="0"/>
+          <a:chExt cx="0" cy="0"/>
+        </a:xfrm>
+      </p:grpSpPr>
+      <p:sp>
+        <p:nvSpPr>
+          <p:cNvPr id="2" name="Espace réservé de l'image des diapositives 1"/>
+          <p:cNvSpPr>
+            <a:spLocks noGrp="1" noRot="1" noChangeAspect="1"/>
+          </p:cNvSpPr>
+          <p:nvPr>
+            <p:ph type="sldImg"/>
+          </p:nvPr>
+        </p:nvSpPr>
+        <p:spPr/>
+      </p:sp>
+      <p:sp>
+        <p:nvSpPr>
+          <p:cNvPr id="3" name="Espace réservé des notes 2"/>
+          <p:cNvSpPr>
+            <a:spLocks noGrp="1"/>
+          </p:cNvSpPr>
+          <p:nvPr>
+            <p:ph type="body" idx="1"/>
+          </p:nvPr>
+        </p:nvSpPr>
+        <p:spPr/>
+        <p:txBody>
+          <a:bodyPr/>
+          <a:lstStyle/>
+          <a:p>
+            <a:endParaRPr lang="fr-FR" dirty="0"/>
+          </a:p>
+        </p:txBody>
+      </p:sp>
+      <p:sp>
+        <p:nvSpPr>
+          <p:cNvPr id="4" name="Espace réservé du numéro de diapositive 3"/>
+          <p:cNvSpPr>
+            <a:spLocks noGrp="1"/>
+          </p:cNvSpPr>
+          <p:nvPr>
+            <p:ph type="sldNum" sz="quarter" idx="5"/>
+          </p:nvPr>
+        </p:nvSpPr>
+        <p:spPr/>
+        <p:txBody>
+          <a:bodyPr/>
+          <a:lstStyle/>
+          <a:p>
+            <a:fld id="{F44DFA25-216B-4048-9E14-17772AFFB9C9}" type="slidenum">
+              <a:rPr lang="fr-FR" smtClean="0"/>
+              <a:t>23</a:t>
+            </a:fld>
+            <a:endParaRPr lang="fr-FR"/>
+          </a:p>
+        </p:txBody>
+      </p:sp>
+    </p:spTree>
+    <p:extLst>
+      <p:ext uri="{BB962C8B-B14F-4D97-AF65-F5344CB8AC3E}">
+        <p14:creationId xmlns:p14="http://schemas.microsoft.com/office/powerpoint/2010/main" val="910795080"/>
+      </p:ext>
+    </p:extLst>
+  </p:cSld>
+  <p:clrMapOvr>
+    <a:masterClrMapping/>
+  </p:clrMapOvr>
+</p:notes>
+</file>
+
+<file path=ppt/notesSlides/notesSlide19.xml><?xml version="1.0" encoding="utf-8"?>
+<p:notes xmlns:a="http://schemas.openxmlformats.org/drawingml/2006/main" xmlns:r="http://schemas.openxmlformats.org/officeDocument/2006/relationships" xmlns:p="http://schemas.openxmlformats.org/presentationml/2006/main">
+  <p:cSld>
+    <p:spTree>
+      <p:nvGrpSpPr>
+        <p:cNvPr id="1" name=""/>
+        <p:cNvGrpSpPr/>
+        <p:nvPr/>
+      </p:nvGrpSpPr>
+      <p:grpSpPr>
+        <a:xfrm>
+          <a:off x="0" y="0"/>
+          <a:ext cx="0" cy="0"/>
+          <a:chOff x="0" y="0"/>
+          <a:chExt cx="0" cy="0"/>
+        </a:xfrm>
+      </p:grpSpPr>
+      <p:sp>
+        <p:nvSpPr>
+          <p:cNvPr id="2" name="Espace réservé de l'image des diapositives 1"/>
+          <p:cNvSpPr>
+            <a:spLocks noGrp="1" noRot="1" noChangeAspect="1"/>
+          </p:cNvSpPr>
+          <p:nvPr>
+            <p:ph type="sldImg"/>
+          </p:nvPr>
+        </p:nvSpPr>
+        <p:spPr/>
+      </p:sp>
+      <p:sp>
+        <p:nvSpPr>
+          <p:cNvPr id="3" name="Espace réservé des notes 2"/>
+          <p:cNvSpPr>
+            <a:spLocks noGrp="1"/>
+          </p:cNvSpPr>
+          <p:nvPr>
+            <p:ph type="body" idx="1"/>
+          </p:nvPr>
+        </p:nvSpPr>
+        <p:spPr/>
+        <p:txBody>
+          <a:bodyPr/>
+          <a:lstStyle/>
+          <a:p>
+            <a:endParaRPr lang="fr-FR" dirty="0"/>
+          </a:p>
+        </p:txBody>
+      </p:sp>
+      <p:sp>
+        <p:nvSpPr>
+          <p:cNvPr id="4" name="Espace réservé du numéro de diapositive 3"/>
+          <p:cNvSpPr>
+            <a:spLocks noGrp="1"/>
+          </p:cNvSpPr>
+          <p:nvPr>
+            <p:ph type="sldNum" sz="quarter" idx="5"/>
+          </p:nvPr>
+        </p:nvSpPr>
+        <p:spPr/>
+        <p:txBody>
+          <a:bodyPr/>
+          <a:lstStyle/>
+          <a:p>
+            <a:fld id="{5F05756B-5F5C-4EED-907C-E25857D58D0B}" type="slidenum">
+              <a:rPr lang="fr-FR" smtClean="0"/>
+              <a:t>24</a:t>
+            </a:fld>
+            <a:endParaRPr lang="fr-FR"/>
+          </a:p>
+        </p:txBody>
+      </p:sp>
+    </p:spTree>
+    <p:extLst>
+      <p:ext uri="{BB962C8B-B14F-4D97-AF65-F5344CB8AC3E}">
+        <p14:creationId xmlns:p14="http://schemas.microsoft.com/office/powerpoint/2010/main" val="268619433"/>
       </p:ext>
     </p:extLst>
   </p:cSld>
@@ -1255,6 +2078,34 @@
           <a:bodyPr/>
           <a:lstStyle/>
           <a:p>
+            <a:pPr marL="0" marR="0" lvl="0" indent="0" algn="l" defTabSz="914400" rtl="0" eaLnBrk="1" fontAlgn="auto" latinLnBrk="0" hangingPunct="1">
+              <a:lnSpc>
+                <a:spcPct val="100000"/>
+              </a:lnSpc>
+              <a:spcBef>
+                <a:spcPts val="0"/>
+              </a:spcBef>
+              <a:spcAft>
+                <a:spcPts val="0"/>
+              </a:spcAft>
+              <a:buClrTx/>
+              <a:buSzTx/>
+              <a:buFontTx/>
+              <a:buNone/>
+              <a:tabLst/>
+              <a:defRPr/>
+            </a:pPr>
+            <a:r>
+              <a:rPr lang="fr-FR" dirty="0"/>
+              <a:t>L’entreprise souhaite</a:t>
+            </a:r>
+            <a:r>
+              <a:rPr lang="fr-FR" baseline="0" dirty="0"/>
+              <a:t> se développer à l’international, en exportant de la viande de volaille. Aucun pays n’est visé en particulier. Mon travail consiste donc à « dégrossir » le champ des possibles en ciblant les pays les plus intéressants ; Ensuite, l’équipe Marketing pourra rentrer plus en détails dans les recherches pour ces pays là. </a:t>
+            </a:r>
+            <a:endParaRPr lang="fr-FR" dirty="0"/>
+          </a:p>
+          <a:p>
             <a:endParaRPr lang="fr-FR" dirty="0"/>
           </a:p>
         </p:txBody>
@@ -1274,9 +2125,9 @@
           <a:bodyPr/>
           <a:lstStyle/>
           <a:p>
-            <a:fld id="{5F05756B-5F5C-4EED-907C-E25857D58D0B}" type="slidenum">
+            <a:fld id="{F44DFA25-216B-4048-9E14-17772AFFB9C9}" type="slidenum">
               <a:rPr lang="fr-FR" smtClean="0"/>
-              <a:t>6</a:t>
+              <a:t>4</a:t>
             </a:fld>
             <a:endParaRPr lang="fr-FR"/>
           </a:p>
@@ -1285,7 +2136,102 @@
     </p:spTree>
     <p:extLst>
       <p:ext uri="{BB962C8B-B14F-4D97-AF65-F5344CB8AC3E}">
-        <p14:creationId xmlns:p14="http://schemas.microsoft.com/office/powerpoint/2010/main" val="4010471913"/>
+        <p14:creationId xmlns:p14="http://schemas.microsoft.com/office/powerpoint/2010/main" val="3322199382"/>
+      </p:ext>
+    </p:extLst>
+  </p:cSld>
+  <p:clrMapOvr>
+    <a:masterClrMapping/>
+  </p:clrMapOvr>
+</p:notes>
+</file>
+
+<file path=ppt/notesSlides/notesSlide20.xml><?xml version="1.0" encoding="utf-8"?>
+<p:notes xmlns:a="http://schemas.openxmlformats.org/drawingml/2006/main" xmlns:r="http://schemas.openxmlformats.org/officeDocument/2006/relationships" xmlns:p="http://schemas.openxmlformats.org/presentationml/2006/main">
+  <p:cSld>
+    <p:spTree>
+      <p:nvGrpSpPr>
+        <p:cNvPr id="1" name=""/>
+        <p:cNvGrpSpPr/>
+        <p:nvPr/>
+      </p:nvGrpSpPr>
+      <p:grpSpPr>
+        <a:xfrm>
+          <a:off x="0" y="0"/>
+          <a:ext cx="0" cy="0"/>
+          <a:chOff x="0" y="0"/>
+          <a:chExt cx="0" cy="0"/>
+        </a:xfrm>
+      </p:grpSpPr>
+      <p:sp>
+        <p:nvSpPr>
+          <p:cNvPr id="2" name="Espace réservé de l'image des diapositives 1"/>
+          <p:cNvSpPr>
+            <a:spLocks noGrp="1" noRot="1" noChangeAspect="1"/>
+          </p:cNvSpPr>
+          <p:nvPr>
+            <p:ph type="sldImg"/>
+          </p:nvPr>
+        </p:nvSpPr>
+        <p:spPr/>
+      </p:sp>
+      <p:sp>
+        <p:nvSpPr>
+          <p:cNvPr id="3" name="Espace réservé des notes 2"/>
+          <p:cNvSpPr>
+            <a:spLocks noGrp="1"/>
+          </p:cNvSpPr>
+          <p:nvPr>
+            <p:ph type="body" idx="1"/>
+          </p:nvPr>
+        </p:nvSpPr>
+        <p:spPr/>
+        <p:txBody>
+          <a:bodyPr/>
+          <a:lstStyle/>
+          <a:p>
+            <a:r>
+              <a:rPr lang="fr-FR" dirty="0"/>
+              <a:t>Remettre le </a:t>
+            </a:r>
+            <a:r>
+              <a:rPr lang="fr-FR" dirty="0" err="1"/>
+              <a:t>Df</a:t>
+            </a:r>
+            <a:r>
+              <a:rPr lang="fr-FR" dirty="0"/>
+              <a:t> sans la France et voir pour les émirats arabes unis</a:t>
+            </a:r>
+          </a:p>
+        </p:txBody>
+      </p:sp>
+      <p:sp>
+        <p:nvSpPr>
+          <p:cNvPr id="4" name="Espace réservé du numéro de diapositive 3"/>
+          <p:cNvSpPr>
+            <a:spLocks noGrp="1"/>
+          </p:cNvSpPr>
+          <p:nvPr>
+            <p:ph type="sldNum" sz="quarter" idx="5"/>
+          </p:nvPr>
+        </p:nvSpPr>
+        <p:spPr/>
+        <p:txBody>
+          <a:bodyPr/>
+          <a:lstStyle/>
+          <a:p>
+            <a:fld id="{F44DFA25-216B-4048-9E14-17772AFFB9C9}" type="slidenum">
+              <a:rPr lang="fr-FR" smtClean="0"/>
+              <a:t>25</a:t>
+            </a:fld>
+            <a:endParaRPr lang="fr-FR"/>
+          </a:p>
+        </p:txBody>
+      </p:sp>
+    </p:spTree>
+    <p:extLst>
+      <p:ext uri="{BB962C8B-B14F-4D97-AF65-F5344CB8AC3E}">
+        <p14:creationId xmlns:p14="http://schemas.microsoft.com/office/powerpoint/2010/main" val="2302832259"/>
       </p:ext>
     </p:extLst>
   </p:cSld>
@@ -1339,16 +2285,33 @@
           <a:bodyPr/>
           <a:lstStyle/>
           <a:p>
+            <a:pPr algn="just"/>
             <a:r>
               <a:rPr lang="fr-FR" dirty="0"/>
-              <a:t>CLICK</a:t>
-            </a:r>
-          </a:p>
-          <a:p>
+              <a:t>L’enjeux ici est d’accélérer l’étude de marché, en évitant à l’équipe Marketing de faire une étude précise sur un pays qui se révélera inintéressant par la suite (manque de richesse, consommation de viande trop faible, etc…).</a:t>
+            </a:r>
+          </a:p>
+          <a:p>
+            <a:pPr algn="just"/>
             <a:r>
               <a:rPr lang="fr-FR" dirty="0"/>
-              <a:t>Voici le dendrogramme</a:t>
-            </a:r>
+              <a:t>Mon étude intervient donc pour faire un premier tri.</a:t>
+            </a:r>
+          </a:p>
+          <a:p>
+            <a:pPr algn="just"/>
+            <a:r>
+              <a:rPr lang="fr-FR" dirty="0"/>
+              <a:t>Afin de commencer à s’implanter</a:t>
+            </a:r>
+            <a:r>
+              <a:rPr lang="fr-FR" baseline="0" dirty="0"/>
+              <a:t> à l’international, l’entreprise doit trouver des pays qui soient déjà développés, qui importent déjà de la viande de volaille. Il serait trop compliqué de créer un nouveau marché, et cela prendrait énormément de ressource ; Cela sera dans un deuxième temps quand l’entreprise aura grandi.</a:t>
+            </a:r>
+            <a:endParaRPr lang="fr-FR" dirty="0"/>
+          </a:p>
+          <a:p>
+            <a:endParaRPr lang="fr-FR" dirty="0"/>
           </a:p>
         </p:txBody>
       </p:sp>
@@ -1369,7 +2332,7 @@
           <a:p>
             <a:fld id="{F44DFA25-216B-4048-9E14-17772AFFB9C9}" type="slidenum">
               <a:rPr lang="fr-FR" smtClean="0"/>
-              <a:t>10</a:t>
+              <a:t>5</a:t>
             </a:fld>
             <a:endParaRPr lang="fr-FR"/>
           </a:p>
@@ -1378,7 +2341,7 @@
     </p:spTree>
     <p:extLst>
       <p:ext uri="{BB962C8B-B14F-4D97-AF65-F5344CB8AC3E}">
-        <p14:creationId xmlns:p14="http://schemas.microsoft.com/office/powerpoint/2010/main" val="369983837"/>
+        <p14:creationId xmlns:p14="http://schemas.microsoft.com/office/powerpoint/2010/main" val="395216430"/>
       </p:ext>
     </p:extLst>
   </p:cSld>
@@ -1432,10 +2395,7 @@
           <a:bodyPr/>
           <a:lstStyle/>
           <a:p>
-            <a:r>
-              <a:rPr lang="fr-FR" dirty="0"/>
-              <a:t>Nous avons besoin de 6 composantes principales pour expliquer près de 100% des informations</a:t>
-            </a:r>
+            <a:endParaRPr lang="fr-FR" dirty="0"/>
           </a:p>
         </p:txBody>
       </p:sp>
@@ -1454,9 +2414,9 @@
           <a:bodyPr/>
           <a:lstStyle/>
           <a:p>
-            <a:fld id="{F44DFA25-216B-4048-9E14-17772AFFB9C9}" type="slidenum">
+            <a:fld id="{5F05756B-5F5C-4EED-907C-E25857D58D0B}" type="slidenum">
               <a:rPr lang="fr-FR" smtClean="0"/>
-              <a:t>12</a:t>
+              <a:t>6</a:t>
             </a:fld>
             <a:endParaRPr lang="fr-FR"/>
           </a:p>
@@ -1465,7 +2425,7 @@
     </p:spTree>
     <p:extLst>
       <p:ext uri="{BB962C8B-B14F-4D97-AF65-F5344CB8AC3E}">
-        <p14:creationId xmlns:p14="http://schemas.microsoft.com/office/powerpoint/2010/main" val="2838572695"/>
+        <p14:creationId xmlns:p14="http://schemas.microsoft.com/office/powerpoint/2010/main" val="4010471913"/>
       </p:ext>
     </p:extLst>
   </p:cSld>
@@ -1521,7 +2481,7 @@
           <a:p>
             <a:r>
               <a:rPr lang="fr-FR" dirty="0"/>
-              <a:t>Le cercle n’est pas très lisible sur la partie droite, affichons un zoom ; CLICK</a:t>
+              <a:t>Ratio en kg/personne ???</a:t>
             </a:r>
           </a:p>
         </p:txBody>
@@ -1543,7 +2503,7 @@
           <a:p>
             <a:fld id="{F44DFA25-216B-4048-9E14-17772AFFB9C9}" type="slidenum">
               <a:rPr lang="fr-FR" smtClean="0"/>
-              <a:t>13</a:t>
+              <a:t>7</a:t>
             </a:fld>
             <a:endParaRPr lang="fr-FR"/>
           </a:p>
@@ -1552,7 +2512,7 @@
     </p:spTree>
     <p:extLst>
       <p:ext uri="{BB962C8B-B14F-4D97-AF65-F5344CB8AC3E}">
-        <p14:creationId xmlns:p14="http://schemas.microsoft.com/office/powerpoint/2010/main" val="999907268"/>
+        <p14:creationId xmlns:p14="http://schemas.microsoft.com/office/powerpoint/2010/main" val="51407293"/>
       </p:ext>
     </p:extLst>
   </p:cSld>
@@ -1608,68 +2568,14 @@
           <a:p>
             <a:r>
               <a:rPr lang="fr-FR" dirty="0"/>
-              <a:t>On peut voir sur PC1 que les variables ayant le plus de poids dans l'inertie sont : </a:t>
-            </a:r>
-            <a:br>
+              <a:t>CLICK</a:t>
+            </a:r>
+          </a:p>
+          <a:p>
+            <a:r>
               <a:rPr lang="fr-FR" dirty="0"/>
-            </a:br>
-            <a:endParaRPr lang="fr-FR" dirty="0"/>
-          </a:p>
-          <a:p>
-            <a:r>
-              <a:rPr lang="fr-FR" dirty="0"/>
-              <a:t>La disponibilité en protéines</a:t>
-            </a:r>
-          </a:p>
-          <a:p>
-            <a:r>
-              <a:rPr lang="fr-FR" dirty="0"/>
-              <a:t>La </a:t>
-            </a:r>
-            <a:r>
-              <a:rPr lang="fr-FR" dirty="0" err="1"/>
-              <a:t>disponinibilité</a:t>
-            </a:r>
-            <a:r>
-              <a:rPr lang="fr-FR" dirty="0"/>
-              <a:t> alimentaire totale</a:t>
-            </a:r>
-          </a:p>
-          <a:p>
-            <a:r>
-              <a:rPr lang="fr-FR" dirty="0"/>
-              <a:t>Le ratio de protéines animales / Protéines totales CLICK</a:t>
-            </a:r>
-          </a:p>
-          <a:p>
-            <a:endParaRPr lang="fr-FR" dirty="0"/>
-          </a:p>
-          <a:p>
-            <a:r>
-              <a:rPr lang="fr-FR" dirty="0"/>
-              <a:t>On remarque aussi que le PIB/h est assez élevé (0,41) </a:t>
-            </a:r>
-          </a:p>
-          <a:p>
-            <a:endParaRPr lang="fr-FR" dirty="0"/>
-          </a:p>
-          <a:p>
-            <a:r>
-              <a:rPr lang="fr-FR" dirty="0"/>
-              <a:t>On peut donc conclure que la composante principale PC1 correspond au niveau de richesses du pays</a:t>
-            </a:r>
-          </a:p>
-          <a:p>
-            <a:endParaRPr lang="fr-FR" dirty="0"/>
-          </a:p>
-          <a:p>
-            <a:r>
-              <a:rPr lang="fr-FR" dirty="0"/>
-              <a:t>CLICK</a:t>
-            </a:r>
-          </a:p>
-          <a:p>
-            <a:endParaRPr lang="fr-FR" dirty="0"/>
+              <a:t>Voici le dendrogramme</a:t>
+            </a:r>
           </a:p>
         </p:txBody>
       </p:sp>
@@ -1690,7 +2596,7 @@
           <a:p>
             <a:fld id="{F44DFA25-216B-4048-9E14-17772AFFB9C9}" type="slidenum">
               <a:rPr lang="fr-FR" smtClean="0"/>
-              <a:t>14</a:t>
+              <a:t>10</a:t>
             </a:fld>
             <a:endParaRPr lang="fr-FR"/>
           </a:p>
@@ -1699,7 +2605,7 @@
     </p:spTree>
     <p:extLst>
       <p:ext uri="{BB962C8B-B14F-4D97-AF65-F5344CB8AC3E}">
-        <p14:creationId xmlns:p14="http://schemas.microsoft.com/office/powerpoint/2010/main" val="1988068708"/>
+        <p14:creationId xmlns:p14="http://schemas.microsoft.com/office/powerpoint/2010/main" val="369983837"/>
       </p:ext>
     </p:extLst>
   </p:cSld>
@@ -1755,14 +2661,40 @@
           <a:p>
             <a:r>
               <a:rPr lang="fr-FR" dirty="0"/>
-              <a:t>A l'exception du cluster 6, les pays sont regroupés correctement par cluster sur F1. </a:t>
-            </a:r>
-            <a:br>
+              <a:t>Pour les centroïdes, j’ai fait la moyenne de chaque variable par Cluster ; Le dendrogramme ne travaillant pas avec des centroïdes (contrairement au k-</a:t>
+            </a:r>
+            <a:r>
+              <a:rPr lang="fr-FR" dirty="0" err="1"/>
+              <a:t>means</a:t>
+            </a:r>
+            <a:r>
               <a:rPr lang="fr-FR" dirty="0"/>
-            </a:br>
+              <a:t>)</a:t>
+            </a:r>
+          </a:p>
+          <a:p>
+            <a:endParaRPr lang="fr-FR" dirty="0"/>
+          </a:p>
+          <a:p>
             <a:r>
               <a:rPr lang="fr-FR" dirty="0"/>
-              <a:t>Si certains semblent être confondus avec les autres, c'est F2 qui nous permet de voir la différence entre ces derniers. </a:t>
+              <a:t>Pour rappel, on recherche des pays développés –PIB important - , avec </a:t>
+            </a:r>
+            <a:r>
+              <a:rPr lang="fr-FR" dirty="0" err="1"/>
+              <a:t>ratio_prot</a:t>
+            </a:r>
+            <a:r>
+              <a:rPr lang="fr-FR" dirty="0"/>
+              <a:t> dispo </a:t>
+            </a:r>
+            <a:r>
+              <a:rPr lang="fr-FR" dirty="0" err="1"/>
+              <a:t>prot</a:t>
+            </a:r>
+            <a:r>
+              <a:rPr lang="fr-FR" dirty="0"/>
+              <a:t> dispo alim élevés, et un taux d’importation lui aussi élevé.</a:t>
             </a:r>
           </a:p>
           <a:p>
@@ -1771,15 +2703,13 @@
           <a:p>
             <a:r>
               <a:rPr lang="fr-FR" dirty="0"/>
-              <a:t>Dans la partie du </a:t>
-            </a:r>
-            <a:r>
-              <a:rPr lang="fr-FR" dirty="0" err="1"/>
-              <a:t>dendogramme</a:t>
-            </a:r>
+              <a:t>Le Cluster 7 semble donc correspondre à notre recherche.</a:t>
+            </a:r>
+          </a:p>
+          <a:p>
             <a:r>
               <a:rPr lang="fr-FR" dirty="0"/>
-              <a:t>, nous avons vu que le cluster 7 était celui qui nous intéressait le plus, voyons donc comment sont répartis les pays de ce cluster, et à quoi est-ce qu'ils correspondent, après l'ACP.</a:t>
+              <a:t>CLICK</a:t>
             </a:r>
           </a:p>
           <a:p>
@@ -1788,29 +2718,16 @@
           <a:p>
             <a:r>
               <a:rPr lang="fr-FR" dirty="0"/>
-              <a:t>Le cluster 7 représente les pays le plus à droite sur F1, avec donc une forte valeur. </a:t>
-            </a:r>
-            <a:br>
+              <a:t>L’importation nous donne une idée sur la taille du marché, mais n’étant pas ramenée par habitant on peut avoir des surprises</a:t>
+            </a:r>
+          </a:p>
+          <a:p>
+            <a:endParaRPr lang="fr-FR" dirty="0"/>
+          </a:p>
+          <a:p>
+            <a:r>
               <a:rPr lang="fr-FR" dirty="0"/>
-            </a:br>
-            <a:r>
-              <a:rPr lang="fr-FR" dirty="0"/>
-              <a:t>Comme nous l'avons vu </a:t>
-            </a:r>
-            <a:r>
-              <a:rPr lang="fr-FR" dirty="0" err="1"/>
-              <a:t>précédement</a:t>
-            </a:r>
-            <a:r>
-              <a:rPr lang="fr-FR" dirty="0"/>
-              <a:t>, F1 représente le niveau de richesse du pays ; </a:t>
-            </a:r>
-            <a:br>
-              <a:rPr lang="fr-FR" dirty="0"/>
-            </a:br>
-            <a:r>
-              <a:rPr lang="fr-FR" dirty="0"/>
-              <a:t>Les pays du cluster 7 correspondent donc aux pays les plus riches.</a:t>
+              <a:t>Ajouter la liste du Cluster 7 </a:t>
             </a:r>
           </a:p>
         </p:txBody>
@@ -1832,7 +2749,7 @@
           <a:p>
             <a:fld id="{F44DFA25-216B-4048-9E14-17772AFFB9C9}" type="slidenum">
               <a:rPr lang="fr-FR" smtClean="0"/>
-              <a:t>15</a:t>
+              <a:t>11</a:t>
             </a:fld>
             <a:endParaRPr lang="fr-FR"/>
           </a:p>
@@ -1841,7 +2758,7 @@
     </p:spTree>
     <p:extLst>
       <p:ext uri="{BB962C8B-B14F-4D97-AF65-F5344CB8AC3E}">
-        <p14:creationId xmlns:p14="http://schemas.microsoft.com/office/powerpoint/2010/main" val="3528905593"/>
+        <p14:creationId xmlns:p14="http://schemas.microsoft.com/office/powerpoint/2010/main" val="3079451134"/>
       </p:ext>
     </p:extLst>
   </p:cSld>
@@ -1897,7 +2814,7 @@
           <a:p>
             <a:r>
               <a:rPr lang="fr-FR" dirty="0"/>
-              <a:t>Pour rappel, la liste des clusters avec les centroïdes </a:t>
+              <a:t>Nous avons besoin de 6 composantes principales pour expliquer près de 100% des informations</a:t>
             </a:r>
           </a:p>
         </p:txBody>
@@ -1919,7 +2836,7 @@
           <a:p>
             <a:fld id="{F44DFA25-216B-4048-9E14-17772AFFB9C9}" type="slidenum">
               <a:rPr lang="fr-FR" smtClean="0"/>
-              <a:t>16</a:t>
+              <a:t>12</a:t>
             </a:fld>
             <a:endParaRPr lang="fr-FR"/>
           </a:p>
@@ -1928,7 +2845,7 @@
     </p:spTree>
     <p:extLst>
       <p:ext uri="{BB962C8B-B14F-4D97-AF65-F5344CB8AC3E}">
-        <p14:creationId xmlns:p14="http://schemas.microsoft.com/office/powerpoint/2010/main" val="1567256808"/>
+        <p14:creationId xmlns:p14="http://schemas.microsoft.com/office/powerpoint/2010/main" val="2838572695"/>
       </p:ext>
     </p:extLst>
   </p:cSld>
@@ -1982,340 +2899,9 @@
           <a:bodyPr/>
           <a:lstStyle/>
           <a:p>
-            <a:pPr marL="0" marR="0" lvl="0" indent="0" algn="l" defTabSz="914400" rtl="0" eaLnBrk="1" fontAlgn="auto" latinLnBrk="0" hangingPunct="1">
-              <a:lnSpc>
-                <a:spcPct val="100000"/>
-              </a:lnSpc>
-              <a:spcBef>
-                <a:spcPts val="0"/>
-              </a:spcBef>
-              <a:spcAft>
-                <a:spcPts val="0"/>
-              </a:spcAft>
-              <a:buClrTx/>
-              <a:buSzTx/>
-              <a:buFontTx/>
-              <a:buNone/>
-              <a:tabLst/>
-              <a:defRPr/>
-            </a:pPr>
             <a:r>
               <a:rPr lang="fr-FR" dirty="0"/>
-              <a:t>CLICK</a:t>
-            </a:r>
-          </a:p>
-          <a:p>
-            <a:pPr marL="0" marR="0" lvl="0" indent="0" algn="l" defTabSz="914400" rtl="0" eaLnBrk="1" fontAlgn="auto" latinLnBrk="0" hangingPunct="1">
-              <a:lnSpc>
-                <a:spcPct val="100000"/>
-              </a:lnSpc>
-              <a:spcBef>
-                <a:spcPts val="0"/>
-              </a:spcBef>
-              <a:spcAft>
-                <a:spcPts val="0"/>
-              </a:spcAft>
-              <a:buClrTx/>
-              <a:buSzTx/>
-              <a:buFontTx/>
-              <a:buNone/>
-              <a:tabLst/>
-              <a:defRPr/>
-            </a:pPr>
-            <a:r>
-              <a:rPr lang="fr-FR" dirty="0" err="1"/>
-              <a:t>Np.random.seed</a:t>
-            </a:r>
-            <a:r>
-              <a:rPr lang="fr-FR" dirty="0"/>
-              <a:t>(1) permet de bloquer le nombre de lancés aléatoires à 1 (afin d’éviter d’avoir des résultats différent entre chaque exécution)</a:t>
-            </a:r>
-          </a:p>
-          <a:p>
-            <a:pPr marL="0" marR="0" lvl="0" indent="0" algn="l" defTabSz="914400" rtl="0" eaLnBrk="1" fontAlgn="auto" latinLnBrk="0" hangingPunct="1">
-              <a:lnSpc>
-                <a:spcPct val="100000"/>
-              </a:lnSpc>
-              <a:spcBef>
-                <a:spcPts val="0"/>
-              </a:spcBef>
-              <a:spcAft>
-                <a:spcPts val="0"/>
-              </a:spcAft>
-              <a:buClrTx/>
-              <a:buSzTx/>
-              <a:buFontTx/>
-              <a:buNone/>
-              <a:tabLst/>
-              <a:defRPr/>
-            </a:pPr>
-            <a:endParaRPr lang="fr-FR" dirty="0"/>
-          </a:p>
-          <a:p>
-            <a:pPr marL="0" marR="0" lvl="0" indent="0" algn="l" defTabSz="914400" rtl="0" eaLnBrk="1" fontAlgn="auto" latinLnBrk="0" hangingPunct="1">
-              <a:lnSpc>
-                <a:spcPct val="100000"/>
-              </a:lnSpc>
-              <a:spcBef>
-                <a:spcPts val="0"/>
-              </a:spcBef>
-              <a:spcAft>
-                <a:spcPts val="0"/>
-              </a:spcAft>
-              <a:buClrTx/>
-              <a:buSzTx/>
-              <a:buFontTx/>
-              <a:buNone/>
-              <a:tabLst/>
-              <a:defRPr/>
-            </a:pPr>
-            <a:r>
-              <a:rPr lang="fr-FR" dirty="0"/>
-              <a:t>CLICK</a:t>
-            </a:r>
-          </a:p>
-          <a:p>
-            <a:pPr marL="0" marR="0" lvl="0" indent="0" algn="l" defTabSz="914400" rtl="0" eaLnBrk="1" fontAlgn="auto" latinLnBrk="0" hangingPunct="1">
-              <a:lnSpc>
-                <a:spcPct val="100000"/>
-              </a:lnSpc>
-              <a:spcBef>
-                <a:spcPts val="0"/>
-              </a:spcBef>
-              <a:spcAft>
-                <a:spcPts val="0"/>
-              </a:spcAft>
-              <a:buClrTx/>
-              <a:buSzTx/>
-              <a:buFontTx/>
-              <a:buNone/>
-              <a:tabLst/>
-              <a:defRPr/>
-            </a:pPr>
-            <a:r>
-              <a:rPr lang="fr-FR" dirty="0"/>
-              <a:t>On utilise ensuite ks_2amp pour savoir si la variable suit une loi normale ou non : </a:t>
-            </a:r>
-          </a:p>
-          <a:p>
-            <a:pPr marL="0" marR="0" lvl="0" indent="0" algn="l" defTabSz="914400" rtl="0" eaLnBrk="1" fontAlgn="auto" latinLnBrk="0" hangingPunct="1">
-              <a:lnSpc>
-                <a:spcPct val="100000"/>
-              </a:lnSpc>
-              <a:spcBef>
-                <a:spcPts val="0"/>
-              </a:spcBef>
-              <a:spcAft>
-                <a:spcPts val="0"/>
-              </a:spcAft>
-              <a:buClrTx/>
-              <a:buSzTx/>
-              <a:buFontTx/>
-              <a:buNone/>
-              <a:tabLst/>
-              <a:defRPr/>
-            </a:pPr>
-            <a:endParaRPr lang="fr-FR" dirty="0"/>
-          </a:p>
-          <a:p>
-            <a:pPr marL="0" marR="0" lvl="0" indent="0" algn="l" defTabSz="914400" rtl="0" eaLnBrk="1" fontAlgn="auto" latinLnBrk="0" hangingPunct="1">
-              <a:lnSpc>
-                <a:spcPct val="100000"/>
-              </a:lnSpc>
-              <a:spcBef>
-                <a:spcPts val="0"/>
-              </a:spcBef>
-              <a:spcAft>
-                <a:spcPts val="0"/>
-              </a:spcAft>
-              <a:buClrTx/>
-              <a:buSzTx/>
-              <a:buFontTx/>
-              <a:buNone/>
-              <a:tabLst/>
-              <a:defRPr/>
-            </a:pPr>
-            <a:r>
-              <a:rPr lang="fr-FR" dirty="0"/>
-              <a:t>CLICK</a:t>
-            </a:r>
-          </a:p>
-          <a:p>
-            <a:pPr marL="0" marR="0" lvl="0" indent="0" algn="l" defTabSz="914400" rtl="0" eaLnBrk="1" fontAlgn="auto" latinLnBrk="0" hangingPunct="1">
-              <a:lnSpc>
-                <a:spcPct val="100000"/>
-              </a:lnSpc>
-              <a:spcBef>
-                <a:spcPts val="0"/>
-              </a:spcBef>
-              <a:spcAft>
-                <a:spcPts val="0"/>
-              </a:spcAft>
-              <a:buClrTx/>
-              <a:buSzTx/>
-              <a:buFontTx/>
-              <a:buNone/>
-              <a:tabLst/>
-              <a:defRPr/>
-            </a:pPr>
-            <a:r>
-              <a:rPr lang="fr-FR" dirty="0"/>
-              <a:t>On prend d’abord notre échantillon (avec la colonne que l’on veut tester) </a:t>
-            </a:r>
-          </a:p>
-          <a:p>
-            <a:pPr marL="0" marR="0" lvl="0" indent="0" algn="l" defTabSz="914400" rtl="0" eaLnBrk="1" fontAlgn="auto" latinLnBrk="0" hangingPunct="1">
-              <a:lnSpc>
-                <a:spcPct val="100000"/>
-              </a:lnSpc>
-              <a:spcBef>
-                <a:spcPts val="0"/>
-              </a:spcBef>
-              <a:spcAft>
-                <a:spcPts val="0"/>
-              </a:spcAft>
-              <a:buClrTx/>
-              <a:buSzTx/>
-              <a:buFontTx/>
-              <a:buNone/>
-              <a:tabLst/>
-              <a:defRPr/>
-            </a:pPr>
-            <a:endParaRPr lang="fr-FR" dirty="0"/>
-          </a:p>
-          <a:p>
-            <a:pPr marL="0" marR="0" lvl="0" indent="0" algn="l" defTabSz="914400" rtl="0" eaLnBrk="1" fontAlgn="auto" latinLnBrk="0" hangingPunct="1">
-              <a:lnSpc>
-                <a:spcPct val="100000"/>
-              </a:lnSpc>
-              <a:spcBef>
-                <a:spcPts val="0"/>
-              </a:spcBef>
-              <a:spcAft>
-                <a:spcPts val="0"/>
-              </a:spcAft>
-              <a:buClrTx/>
-              <a:buSzTx/>
-              <a:buFontTx/>
-              <a:buNone/>
-              <a:tabLst/>
-              <a:defRPr/>
-            </a:pPr>
-            <a:r>
-              <a:rPr lang="fr-FR" dirty="0"/>
-              <a:t>CLICK</a:t>
-            </a:r>
-          </a:p>
-          <a:p>
-            <a:pPr marL="0" marR="0" lvl="0" indent="0" algn="l" defTabSz="914400" rtl="0" eaLnBrk="1" fontAlgn="auto" latinLnBrk="0" hangingPunct="1">
-              <a:lnSpc>
-                <a:spcPct val="100000"/>
-              </a:lnSpc>
-              <a:spcBef>
-                <a:spcPts val="0"/>
-              </a:spcBef>
-              <a:spcAft>
-                <a:spcPts val="0"/>
-              </a:spcAft>
-              <a:buClrTx/>
-              <a:buSzTx/>
-              <a:buFontTx/>
-              <a:buNone/>
-              <a:tabLst/>
-              <a:defRPr/>
-            </a:pPr>
-            <a:r>
-              <a:rPr lang="fr-FR" dirty="0"/>
-              <a:t>Puis, en deuxième valeur, on transforme notre échantillon en échantillon suivant une loi normale, afin de comparer les deux.</a:t>
-            </a:r>
-          </a:p>
-          <a:p>
-            <a:pPr marL="0" marR="0" lvl="0" indent="0" algn="l" defTabSz="914400" rtl="0" eaLnBrk="1" fontAlgn="auto" latinLnBrk="0" hangingPunct="1">
-              <a:lnSpc>
-                <a:spcPct val="100000"/>
-              </a:lnSpc>
-              <a:spcBef>
-                <a:spcPts val="0"/>
-              </a:spcBef>
-              <a:spcAft>
-                <a:spcPts val="0"/>
-              </a:spcAft>
-              <a:buClrTx/>
-              <a:buSzTx/>
-              <a:buFontTx/>
-              <a:buNone/>
-              <a:tabLst/>
-              <a:defRPr/>
-            </a:pPr>
-            <a:endParaRPr lang="fr-FR" dirty="0"/>
-          </a:p>
-          <a:p>
-            <a:pPr marL="0" marR="0" lvl="0" indent="0" algn="l" defTabSz="914400" rtl="0" eaLnBrk="1" fontAlgn="auto" latinLnBrk="0" hangingPunct="1">
-              <a:lnSpc>
-                <a:spcPct val="100000"/>
-              </a:lnSpc>
-              <a:spcBef>
-                <a:spcPts val="0"/>
-              </a:spcBef>
-              <a:spcAft>
-                <a:spcPts val="0"/>
-              </a:spcAft>
-              <a:buClrTx/>
-              <a:buSzTx/>
-              <a:buFontTx/>
-              <a:buNone/>
-              <a:tabLst/>
-              <a:defRPr/>
-            </a:pPr>
-            <a:r>
-              <a:rPr lang="fr-FR" dirty="0"/>
-              <a:t>CLICK</a:t>
-            </a:r>
-          </a:p>
-          <a:p>
-            <a:pPr marL="0" marR="0" lvl="0" indent="0" algn="l" defTabSz="914400" rtl="0" eaLnBrk="1" fontAlgn="auto" latinLnBrk="0" hangingPunct="1">
-              <a:lnSpc>
-                <a:spcPct val="100000"/>
-              </a:lnSpc>
-              <a:spcBef>
-                <a:spcPts val="0"/>
-              </a:spcBef>
-              <a:spcAft>
-                <a:spcPts val="0"/>
-              </a:spcAft>
-              <a:buClrTx/>
-              <a:buSzTx/>
-              <a:buFontTx/>
-              <a:buNone/>
-              <a:tabLst/>
-              <a:defRPr/>
-            </a:pPr>
-            <a:r>
-              <a:rPr lang="fr-FR" dirty="0"/>
-              <a:t>Enfin, on utilise une condition IF pour afficher si la variable suit une loi normale ou non (grâce à la comparaison entre Alpha et </a:t>
-            </a:r>
-            <a:r>
-              <a:rPr lang="fr-FR" dirty="0" err="1"/>
-              <a:t>P_valeur</a:t>
-            </a:r>
-            <a:r>
-              <a:rPr lang="fr-FR" dirty="0"/>
-              <a:t>)</a:t>
-            </a:r>
-          </a:p>
-          <a:p>
-            <a:endParaRPr lang="fr-FR" dirty="0"/>
-          </a:p>
-          <a:p>
-            <a:r>
-              <a:rPr lang="fr-FR" dirty="0"/>
-              <a:t>CLICK</a:t>
-            </a:r>
-          </a:p>
-          <a:p>
-            <a:r>
-              <a:rPr lang="fr-FR" dirty="0"/>
-              <a:t>Ce qui nous donne le tableau suivant pour nos variables </a:t>
+              <a:t>Le cercle n’est pas très lisible sur la partie droite, affichons un zoom ; CLICK</a:t>
             </a:r>
           </a:p>
         </p:txBody>
@@ -2337,7 +2923,7 @@
           <a:p>
             <a:fld id="{F44DFA25-216B-4048-9E14-17772AFFB9C9}" type="slidenum">
               <a:rPr lang="fr-FR" smtClean="0"/>
-              <a:t>18</a:t>
+              <a:t>13</a:t>
             </a:fld>
             <a:endParaRPr lang="fr-FR"/>
           </a:p>
@@ -2346,7 +2932,7 @@
     </p:spTree>
     <p:extLst>
       <p:ext uri="{BB962C8B-B14F-4D97-AF65-F5344CB8AC3E}">
-        <p14:creationId xmlns:p14="http://schemas.microsoft.com/office/powerpoint/2010/main" val="821450017"/>
+        <p14:creationId xmlns:p14="http://schemas.microsoft.com/office/powerpoint/2010/main" val="999907268"/>
       </p:ext>
     </p:extLst>
   </p:cSld>
@@ -6446,7 +7032,7 @@
           <p:nvPr/>
         </p:nvPicPr>
         <p:blipFill>
-          <a:blip r:embed="rId2">
+          <a:blip r:embed="rId3">
             <a:extLst>
               <a:ext uri="{28A0092B-C50C-407E-A947-70E740481C1C}">
                 <a14:useLocalDpi xmlns:a14="http://schemas.microsoft.com/office/drawing/2010/main" val="0"/>
@@ -6482,7 +7068,7 @@
           <p:nvPr/>
         </p:nvPicPr>
         <p:blipFill>
-          <a:blip r:embed="rId3"/>
+          <a:blip r:embed="rId4"/>
           <a:stretch>
             <a:fillRect/>
           </a:stretch>
@@ -9873,7 +10459,7 @@
                                           </p:stCondLst>
                                         </p:cTn>
                                         <p:tgtEl>
-                                          <p:spTgt spid="15"/>
+                                          <p:spTgt spid="14"/>
                                         </p:tgtEl>
                                         <p:attrNameLst>
                                           <p:attrName>style.visibility</p:attrName>
@@ -9918,7 +10504,7 @@
                                           </p:stCondLst>
                                         </p:cTn>
                                         <p:tgtEl>
-                                          <p:spTgt spid="16"/>
+                                          <p:spTgt spid="15"/>
                                         </p:tgtEl>
                                         <p:attrNameLst>
                                           <p:attrName>style.visibility</p:attrName>
@@ -9950,7 +10536,7 @@
                             </p:stCondLst>
                             <p:childTnLst>
                               <p:par>
-                                <p:cTn id="21" presetID="1" presetClass="entr" presetSubtype="0" fill="hold" nodeType="clickEffect">
+                                <p:cTn id="21" presetID="1" presetClass="entr" presetSubtype="0" fill="hold" grpId="0" nodeType="clickEffect">
                                   <p:stCondLst>
                                     <p:cond delay="0"/>
                                   </p:stCondLst>
@@ -9958,6 +10544,51 @@
                                     <p:set>
                                       <p:cBhvr>
                                         <p:cTn id="22" dur="1" fill="hold">
+                                          <p:stCondLst>
+                                            <p:cond delay="0"/>
+                                          </p:stCondLst>
+                                        </p:cTn>
+                                        <p:tgtEl>
+                                          <p:spTgt spid="16"/>
+                                        </p:tgtEl>
+                                        <p:attrNameLst>
+                                          <p:attrName>style.visibility</p:attrName>
+                                        </p:attrNameLst>
+                                      </p:cBhvr>
+                                      <p:to>
+                                        <p:strVal val="visible"/>
+                                      </p:to>
+                                    </p:set>
+                                  </p:childTnLst>
+                                </p:cTn>
+                              </p:par>
+                            </p:childTnLst>
+                          </p:cTn>
+                        </p:par>
+                      </p:childTnLst>
+                    </p:cTn>
+                  </p:par>
+                  <p:par>
+                    <p:cTn id="23" fill="hold">
+                      <p:stCondLst>
+                        <p:cond delay="indefinite"/>
+                      </p:stCondLst>
+                      <p:childTnLst>
+                        <p:par>
+                          <p:cTn id="24" fill="hold">
+                            <p:stCondLst>
+                              <p:cond delay="0"/>
+                            </p:stCondLst>
+                            <p:childTnLst>
+                              <p:par>
+                                <p:cTn id="25" presetID="1" presetClass="entr" presetSubtype="0" fill="hold" nodeType="clickEffect">
+                                  <p:stCondLst>
+                                    <p:cond delay="0"/>
+                                  </p:stCondLst>
+                                  <p:childTnLst>
+                                    <p:set>
+                                      <p:cBhvr>
+                                        <p:cTn id="26" dur="1" fill="hold">
                                           <p:stCondLst>
                                             <p:cond delay="0"/>
                                           </p:stCondLst>
@@ -10006,6 +10637,7 @@
     <p:bldLst>
       <p:bldP spid="12" grpId="0" animBg="1"/>
       <p:bldP spid="13" grpId="0" animBg="1"/>
+      <p:bldP spid="14" grpId="0" animBg="1"/>
       <p:bldP spid="15" grpId="0" animBg="1"/>
       <p:bldP spid="16" grpId="0" animBg="1"/>
     </p:bldLst>
@@ -10080,7 +10712,7 @@
           <p:nvPr/>
         </p:nvPicPr>
         <p:blipFill>
-          <a:blip r:embed="rId2">
+          <a:blip r:embed="rId3">
             <a:extLst>
               <a:ext uri="{28A0092B-C50C-407E-A947-70E740481C1C}">
                 <a14:useLocalDpi xmlns:a14="http://schemas.microsoft.com/office/drawing/2010/main" val="0"/>
@@ -10101,56 +10733,114 @@
           </a:prstGeom>
         </p:spPr>
       </p:pic>
-      <p:sp>
-        <p:nvSpPr>
-          <p:cNvPr id="5" name="ZoneTexte 4">
-            <a:extLst>
-              <a:ext uri="{FF2B5EF4-FFF2-40B4-BE49-F238E27FC236}">
-                <a16:creationId xmlns:a16="http://schemas.microsoft.com/office/drawing/2014/main" id="{12A2BE7E-2453-4960-9F9F-0ABCFB98C6CA}"/>
-              </a:ext>
-            </a:extLst>
-          </p:cNvPr>
-          <p:cNvSpPr txBox="1"/>
+      <p:pic>
+        <p:nvPicPr>
+          <p:cNvPr id="15" name="Image 14">
+            <a:extLst>
+              <a:ext uri="{FF2B5EF4-FFF2-40B4-BE49-F238E27FC236}">
+                <a16:creationId xmlns:a16="http://schemas.microsoft.com/office/drawing/2014/main" id="{87E37925-0385-4E5A-B44C-9DC0EF09C648}"/>
+              </a:ext>
+            </a:extLst>
+          </p:cNvPr>
+          <p:cNvPicPr>
+            <a:picLocks noChangeAspect="1"/>
+          </p:cNvPicPr>
           <p:nvPr/>
-        </p:nvSpPr>
+        </p:nvPicPr>
+        <p:blipFill>
+          <a:blip r:embed="rId4">
+            <a:extLst>
+              <a:ext uri="{28A0092B-C50C-407E-A947-70E740481C1C}">
+                <a14:useLocalDpi xmlns:a14="http://schemas.microsoft.com/office/drawing/2010/main" val="0"/>
+              </a:ext>
+            </a:extLst>
+          </a:blip>
+          <a:stretch>
+            <a:fillRect/>
+          </a:stretch>
+        </p:blipFill>
         <p:spPr>
           <a:xfrm>
-            <a:off x="2088292" y="2496065"/>
-            <a:ext cx="7710616" cy="2308324"/>
+            <a:off x="2019299" y="1422400"/>
+            <a:ext cx="8153401" cy="5435600"/>
           </a:xfrm>
           <a:prstGeom prst="rect">
             <a:avLst/>
           </a:prstGeom>
-          <a:noFill/>
         </p:spPr>
-        <p:txBody>
-          <a:bodyPr wrap="square" rtlCol="0">
-            <a:spAutoFit/>
-          </a:bodyPr>
-          <a:lstStyle/>
-          <a:p>
-            <a:r>
-              <a:rPr lang="fr-FR" dirty="0"/>
-              <a:t>Le but de ce test est de vérifier que les différents Clusters diffèrent bien entre eux ; </a:t>
-            </a:r>
-          </a:p>
-          <a:p>
-            <a:r>
-              <a:rPr lang="fr-FR" dirty="0"/>
-              <a:t>Pour cela nous allons faire un test de comparaison sur la Variance et la Moyenne entre deux Clusters.</a:t>
-            </a:r>
-          </a:p>
-          <a:p>
-            <a:endParaRPr lang="fr-FR" dirty="0"/>
-          </a:p>
-          <a:p>
-            <a:r>
-              <a:rPr lang="fr-FR" dirty="0"/>
-              <a:t>Pour que deux Clusters soient effectivement différents, il faut que leur Variances soient égales (ils suivent la même loi normale), mais que leur moyennes diffèrent.</a:t>
-            </a:r>
-          </a:p>
-        </p:txBody>
-      </p:sp>
+      </p:pic>
+      <p:pic>
+        <p:nvPicPr>
+          <p:cNvPr id="17" name="Image 16">
+            <a:extLst>
+              <a:ext uri="{FF2B5EF4-FFF2-40B4-BE49-F238E27FC236}">
+                <a16:creationId xmlns:a16="http://schemas.microsoft.com/office/drawing/2014/main" id="{9E28E25D-A14B-48E8-972E-549B4E5AE219}"/>
+              </a:ext>
+            </a:extLst>
+          </p:cNvPr>
+          <p:cNvPicPr>
+            <a:picLocks noChangeAspect="1"/>
+          </p:cNvPicPr>
+          <p:nvPr/>
+        </p:nvPicPr>
+        <p:blipFill>
+          <a:blip r:embed="rId5">
+            <a:extLst>
+              <a:ext uri="{28A0092B-C50C-407E-A947-70E740481C1C}">
+                <a14:useLocalDpi xmlns:a14="http://schemas.microsoft.com/office/drawing/2010/main" val="0"/>
+              </a:ext>
+            </a:extLst>
+          </a:blip>
+          <a:stretch>
+            <a:fillRect/>
+          </a:stretch>
+        </p:blipFill>
+        <p:spPr>
+          <a:xfrm>
+            <a:off x="2019299" y="1422399"/>
+            <a:ext cx="8153401" cy="5435601"/>
+          </a:xfrm>
+          <a:prstGeom prst="rect">
+            <a:avLst/>
+          </a:prstGeom>
+        </p:spPr>
+      </p:pic>
+      <p:pic>
+        <p:nvPicPr>
+          <p:cNvPr id="19" name="Image 18">
+            <a:extLst>
+              <a:ext uri="{FF2B5EF4-FFF2-40B4-BE49-F238E27FC236}">
+                <a16:creationId xmlns:a16="http://schemas.microsoft.com/office/drawing/2014/main" id="{3060126B-D2D4-46B9-9707-25D5343E30F1}"/>
+              </a:ext>
+            </a:extLst>
+          </p:cNvPr>
+          <p:cNvPicPr>
+            <a:picLocks noChangeAspect="1"/>
+          </p:cNvPicPr>
+          <p:nvPr/>
+        </p:nvPicPr>
+        <p:blipFill>
+          <a:blip r:embed="rId6">
+            <a:extLst>
+              <a:ext uri="{28A0092B-C50C-407E-A947-70E740481C1C}">
+                <a14:useLocalDpi xmlns:a14="http://schemas.microsoft.com/office/drawing/2010/main" val="0"/>
+              </a:ext>
+            </a:extLst>
+          </a:blip>
+          <a:stretch>
+            <a:fillRect/>
+          </a:stretch>
+        </p:blipFill>
+        <p:spPr>
+          <a:xfrm>
+            <a:off x="2019298" y="1422398"/>
+            <a:ext cx="8153401" cy="5435601"/>
+          </a:xfrm>
+          <a:prstGeom prst="rect">
+            <a:avLst/>
+          </a:prstGeom>
+        </p:spPr>
+      </p:pic>
     </p:spTree>
     <p:extLst>
       <p:ext uri="{BB962C8B-B14F-4D97-AF65-F5344CB8AC3E}">
@@ -10161,6 +10851,126 @@
   <p:clrMapOvr>
     <a:masterClrMapping/>
   </p:clrMapOvr>
+  <p:timing>
+    <p:tnLst>
+      <p:par>
+        <p:cTn id="1" dur="indefinite" restart="never" nodeType="tmRoot">
+          <p:childTnLst>
+            <p:seq concurrent="1" nextAc="seek">
+              <p:cTn id="2" dur="indefinite" nodeType="mainSeq">
+                <p:childTnLst>
+                  <p:par>
+                    <p:cTn id="3" fill="hold">
+                      <p:stCondLst>
+                        <p:cond delay="indefinite"/>
+                      </p:stCondLst>
+                      <p:childTnLst>
+                        <p:par>
+                          <p:cTn id="4" fill="hold">
+                            <p:stCondLst>
+                              <p:cond delay="0"/>
+                            </p:stCondLst>
+                            <p:childTnLst>
+                              <p:par>
+                                <p:cTn id="5" presetID="1" presetClass="entr" presetSubtype="0" fill="hold" nodeType="clickEffect">
+                                  <p:stCondLst>
+                                    <p:cond delay="0"/>
+                                  </p:stCondLst>
+                                  <p:childTnLst>
+                                    <p:set>
+                                      <p:cBhvr>
+                                        <p:cTn id="6" dur="1" fill="hold">
+                                          <p:stCondLst>
+                                            <p:cond delay="0"/>
+                                          </p:stCondLst>
+                                        </p:cTn>
+                                        <p:tgtEl>
+                                          <p:spTgt spid="17"/>
+                                        </p:tgtEl>
+                                        <p:attrNameLst>
+                                          <p:attrName>style.visibility</p:attrName>
+                                        </p:attrNameLst>
+                                      </p:cBhvr>
+                                      <p:to>
+                                        <p:strVal val="visible"/>
+                                      </p:to>
+                                    </p:set>
+                                  </p:childTnLst>
+                                </p:cTn>
+                              </p:par>
+                            </p:childTnLst>
+                          </p:cTn>
+                        </p:par>
+                      </p:childTnLst>
+                    </p:cTn>
+                  </p:par>
+                  <p:par>
+                    <p:cTn id="7" fill="hold">
+                      <p:stCondLst>
+                        <p:cond delay="indefinite"/>
+                      </p:stCondLst>
+                      <p:childTnLst>
+                        <p:par>
+                          <p:cTn id="8" fill="hold">
+                            <p:stCondLst>
+                              <p:cond delay="0"/>
+                            </p:stCondLst>
+                            <p:childTnLst>
+                              <p:par>
+                                <p:cTn id="9" presetID="1" presetClass="entr" presetSubtype="0" fill="hold" nodeType="clickEffect">
+                                  <p:stCondLst>
+                                    <p:cond delay="0"/>
+                                  </p:stCondLst>
+                                  <p:childTnLst>
+                                    <p:set>
+                                      <p:cBhvr>
+                                        <p:cTn id="10" dur="1" fill="hold">
+                                          <p:stCondLst>
+                                            <p:cond delay="0"/>
+                                          </p:stCondLst>
+                                        </p:cTn>
+                                        <p:tgtEl>
+                                          <p:spTgt spid="19"/>
+                                        </p:tgtEl>
+                                        <p:attrNameLst>
+                                          <p:attrName>style.visibility</p:attrName>
+                                        </p:attrNameLst>
+                                      </p:cBhvr>
+                                      <p:to>
+                                        <p:strVal val="visible"/>
+                                      </p:to>
+                                    </p:set>
+                                  </p:childTnLst>
+                                </p:cTn>
+                              </p:par>
+                            </p:childTnLst>
+                          </p:cTn>
+                        </p:par>
+                      </p:childTnLst>
+                    </p:cTn>
+                  </p:par>
+                </p:childTnLst>
+              </p:cTn>
+              <p:prevCondLst>
+                <p:cond evt="onPrev" delay="0">
+                  <p:tgtEl>
+                    <p:sldTgt/>
+                  </p:tgtEl>
+                </p:cond>
+              </p:prevCondLst>
+              <p:nextCondLst>
+                <p:cond evt="onNext" delay="0">
+                  <p:tgtEl>
+                    <p:sldTgt/>
+                  </p:tgtEl>
+                </p:cond>
+              </p:nextCondLst>
+            </p:seq>
+          </p:childTnLst>
+        </p:cTn>
+      </p:par>
+    </p:tnLst>
+  </p:timing>
 </p:sld>
 </file>
 
@@ -13474,6 +14284,14 @@
 <file path=ppt/slides/slide4.xml><?xml version="1.0" encoding="utf-8"?>
 <p:sld xmlns:a="http://schemas.openxmlformats.org/drawingml/2006/main" xmlns:r="http://schemas.openxmlformats.org/officeDocument/2006/relationships" xmlns:p="http://schemas.openxmlformats.org/presentationml/2006/main">
   <p:cSld>
+    <p:bg>
+      <p:bgPr>
+        <a:solidFill>
+          <a:srgbClr val="000000"/>
+        </a:solidFill>
+        <a:effectLst/>
+      </p:bgPr>
+    </p:bg>
     <p:spTree>
       <p:nvGrpSpPr>
         <p:cNvPr id="1" name=""/>
@@ -13490,6 +14308,105 @@
       </p:grpSpPr>
       <p:sp>
         <p:nvSpPr>
+          <p:cNvPr id="13" name="Rectangle 12">
+            <a:extLst>
+              <a:ext uri="{FF2B5EF4-FFF2-40B4-BE49-F238E27FC236}">
+                <a16:creationId xmlns:a16="http://schemas.microsoft.com/office/drawing/2014/main" id="{71B2258F-86CA-4D4D-8270-BC05FCDEBFB3}"/>
+              </a:ext>
+              <a:ext uri="{C183D7F6-B498-43B3-948B-1728B52AA6E4}">
+                <adec:decorative xmlns:adec="http://schemas.microsoft.com/office/drawing/2017/decorative" val="1"/>
+              </a:ext>
+            </a:extLst>
+          </p:cNvPr>
+          <p:cNvSpPr>
+            <a:spLocks noGrp="1" noRot="1" noChangeAspect="1" noMove="1" noResize="1" noEditPoints="1" noAdjustHandles="1" noChangeArrowheads="1" noChangeShapeType="1" noTextEdit="1"/>
+          </p:cNvSpPr>
+          <p:nvPr>
+            <p:extLst>
+              <p:ext uri="{386F3935-93C4-4BCD-93E2-E3B085C9AB24}">
+                <p16:designElem xmlns:p16="http://schemas.microsoft.com/office/powerpoint/2015/main" val="1"/>
+              </p:ext>
+            </p:extLst>
+          </p:nvPr>
+        </p:nvSpPr>
+        <p:spPr>
+          <a:xfrm>
+            <a:off x="0" y="0"/>
+            <a:ext cx="12192000" cy="6857999"/>
+          </a:xfrm>
+          <a:prstGeom prst="rect">
+            <a:avLst/>
+          </a:prstGeom>
+          <a:solidFill>
+            <a:srgbClr val="000000"/>
+          </a:solidFill>
+          <a:ln>
+            <a:noFill/>
+          </a:ln>
+        </p:spPr>
+        <p:style>
+          <a:lnRef idx="2">
+            <a:schemeClr val="accent1">
+              <a:shade val="50000"/>
+            </a:schemeClr>
+          </a:lnRef>
+          <a:fillRef idx="1">
+            <a:schemeClr val="accent1"/>
+          </a:fillRef>
+          <a:effectRef idx="0">
+            <a:schemeClr val="accent1"/>
+          </a:effectRef>
+          <a:fontRef idx="minor">
+            <a:schemeClr val="lt1"/>
+          </a:fontRef>
+        </p:style>
+        <p:txBody>
+          <a:bodyPr rtlCol="0" anchor="ctr"/>
+          <a:lstStyle/>
+          <a:p>
+            <a:pPr algn="ctr"/>
+            <a:endParaRPr lang="en-US"/>
+          </a:p>
+        </p:txBody>
+      </p:sp>
+      <p:pic>
+        <p:nvPicPr>
+          <p:cNvPr id="8" name="Image 7">
+            <a:extLst>
+              <a:ext uri="{FF2B5EF4-FFF2-40B4-BE49-F238E27FC236}">
+                <a16:creationId xmlns:a16="http://schemas.microsoft.com/office/drawing/2014/main" id="{D68292BD-772A-4AB2-AA3D-2287B8A4E6BB}"/>
+              </a:ext>
+            </a:extLst>
+          </p:cNvPr>
+          <p:cNvPicPr>
+            <a:picLocks noChangeAspect="1"/>
+          </p:cNvPicPr>
+          <p:nvPr/>
+        </p:nvPicPr>
+        <p:blipFill rotWithShape="1">
+          <a:blip r:embed="rId3">
+            <a:alphaModFix amt="50000"/>
+            <a:extLst>
+              <a:ext uri="{28A0092B-C50C-407E-A947-70E740481C1C}">
+                <a14:useLocalDpi xmlns:a14="http://schemas.microsoft.com/office/drawing/2010/main" val="0"/>
+              </a:ext>
+            </a:extLst>
+          </a:blip>
+          <a:srcRect b="15730"/>
+          <a:stretch/>
+        </p:blipFill>
+        <p:spPr>
+          <a:xfrm>
+            <a:off x="20" y="1"/>
+            <a:ext cx="12191980" cy="6857999"/>
+          </a:xfrm>
+          <a:prstGeom prst="rect">
+            <a:avLst/>
+          </a:prstGeom>
+        </p:spPr>
+      </p:pic>
+      <p:sp>
+        <p:nvSpPr>
           <p:cNvPr id="2" name="Titre 1">
             <a:extLst>
               <a:ext uri="{FF2B5EF4-FFF2-40B4-BE49-F238E27FC236}">
@@ -13506,8 +14423,8 @@
         </p:nvSpPr>
         <p:spPr>
           <a:xfrm>
-            <a:off x="1524000" y="329883"/>
-            <a:ext cx="9144000" cy="1082357"/>
+            <a:off x="1524000" y="1122362"/>
+            <a:ext cx="9144000" cy="2900518"/>
           </a:xfrm>
         </p:spPr>
         <p:txBody>
@@ -13517,51 +14434,13 @@
           <a:lstStyle/>
           <a:p>
             <a:r>
-              <a:rPr lang="fr-FR" dirty="0" err="1"/>
+              <a:rPr lang="fr-FR">
+                <a:solidFill>
+                  <a:srgbClr val="FFFFFF"/>
+                </a:solidFill>
+              </a:rPr>
               <a:t>Context</a:t>
             </a:r>
-            <a:endParaRPr lang="fr-FR" dirty="0"/>
-          </a:p>
-        </p:txBody>
-      </p:sp>
-      <p:sp>
-        <p:nvSpPr>
-          <p:cNvPr id="3" name="Sous-titre 2">
-            <a:extLst>
-              <a:ext uri="{FF2B5EF4-FFF2-40B4-BE49-F238E27FC236}">
-                <a16:creationId xmlns:a16="http://schemas.microsoft.com/office/drawing/2014/main" id="{8005F86F-E615-467E-BFD3-2221E96317A6}"/>
-              </a:ext>
-            </a:extLst>
-          </p:cNvPr>
-          <p:cNvSpPr>
-            <a:spLocks noGrp="1"/>
-          </p:cNvSpPr>
-          <p:nvPr>
-            <p:ph type="subTitle" idx="1"/>
-          </p:nvPr>
-        </p:nvSpPr>
-        <p:spPr>
-          <a:xfrm>
-            <a:off x="1524000" y="2468880"/>
-            <a:ext cx="9144000" cy="1920240"/>
-          </a:xfrm>
-        </p:spPr>
-        <p:txBody>
-          <a:bodyPr>
-            <a:normAutofit/>
-          </a:bodyPr>
-          <a:lstStyle/>
-          <a:p>
-            <a:pPr algn="just"/>
-            <a:r>
-              <a:rPr lang="fr-FR" dirty="0"/>
-              <a:t>L’entreprise souhaite</a:t>
-            </a:r>
-            <a:r>
-              <a:rPr lang="fr-FR" baseline="0" dirty="0"/>
-              <a:t> se développer à l’international, en exportant de la viande de volaille. Aucun pays n’est visé en particulier. Mon travail consiste donc à « dégrossir » le champ des possibles en ciblant les pays les plus intéressants ; Ensuite, l’équipe Marketing pourra rentrer plus en détails dans les recherches pour ces pays là. </a:t>
-            </a:r>
-            <a:endParaRPr lang="fr-FR" dirty="0"/>
           </a:p>
         </p:txBody>
       </p:sp>
@@ -13573,7 +14452,7 @@
     </p:extLst>
   </p:cSld>
   <p:clrMapOvr>
-    <a:masterClrMapping/>
+    <a:overrideClrMapping bg1="dk1" tx1="lt1" bg2="dk2" tx2="lt2" accent1="accent1" accent2="accent2" accent3="accent3" accent4="accent4" accent5="accent5" accent6="accent6" hlink="hlink" folHlink="folHlink"/>
   </p:clrMapOvr>
 </p:sld>
 </file>
@@ -13648,40 +14527,229 @@
         </p:nvSpPr>
         <p:spPr>
           <a:xfrm>
-            <a:off x="1524000" y="2468880"/>
-            <a:ext cx="9144000" cy="1991360"/>
+            <a:off x="4363713" y="1499961"/>
+            <a:ext cx="3464574" cy="600834"/>
           </a:xfrm>
         </p:spPr>
         <p:txBody>
           <a:bodyPr>
-            <a:normAutofit fontScale="77500" lnSpcReduction="20000"/>
+            <a:normAutofit/>
           </a:bodyPr>
           <a:lstStyle/>
           <a:p>
             <a:pPr algn="just"/>
             <a:r>
               <a:rPr lang="fr-FR" dirty="0"/>
-              <a:t>L’enjeux ici est d’accélérer l’étude de marché, en évitant à l’équipe Marketing de faire une étude précise sur un pays qui se révélera inintéressant par la suite (manque de richesse, consommation de viande trop faible, etc…).</a:t>
+              <a:t>Fournir une liste de pays :</a:t>
             </a:r>
           </a:p>
           <a:p>
             <a:pPr algn="just"/>
+            <a:endParaRPr lang="fr-FR" dirty="0"/>
+          </a:p>
+          <a:p>
+            <a:pPr algn="just"/>
+            <a:endParaRPr lang="fr-FR" dirty="0"/>
+          </a:p>
+          <a:p>
+            <a:pPr algn="just"/>
+            <a:endParaRPr lang="fr-FR" dirty="0"/>
+          </a:p>
+          <a:p>
+            <a:pPr algn="just"/>
+            <a:endParaRPr lang="fr-FR" dirty="0"/>
+          </a:p>
+        </p:txBody>
+      </p:sp>
+      <p:pic>
+        <p:nvPicPr>
+          <p:cNvPr id="5" name="Image 4">
+            <a:extLst>
+              <a:ext uri="{FF2B5EF4-FFF2-40B4-BE49-F238E27FC236}">
+                <a16:creationId xmlns:a16="http://schemas.microsoft.com/office/drawing/2014/main" id="{B41CCFEC-502B-436F-B3E2-4FC5657B1B8E}"/>
+              </a:ext>
+            </a:extLst>
+          </p:cNvPr>
+          <p:cNvPicPr>
+            <a:picLocks noChangeAspect="1"/>
+          </p:cNvPicPr>
+          <p:nvPr/>
+        </p:nvPicPr>
+        <p:blipFill rotWithShape="1">
+          <a:blip r:embed="rId3"/>
+          <a:srcRect l="41807" t="15807" r="2892" b="17398"/>
+          <a:stretch/>
+        </p:blipFill>
+        <p:spPr>
+          <a:xfrm>
+            <a:off x="671046" y="2502552"/>
+            <a:ext cx="2106976" cy="2544897"/>
+          </a:xfrm>
+          <a:prstGeom prst="rect">
+            <a:avLst/>
+          </a:prstGeom>
+        </p:spPr>
+      </p:pic>
+      <p:pic>
+        <p:nvPicPr>
+          <p:cNvPr id="6" name="Image 5">
+            <a:extLst>
+              <a:ext uri="{FF2B5EF4-FFF2-40B4-BE49-F238E27FC236}">
+                <a16:creationId xmlns:a16="http://schemas.microsoft.com/office/drawing/2014/main" id="{E0F1485B-FC03-47E5-A594-1A20E5198B6F}"/>
+              </a:ext>
+            </a:extLst>
+          </p:cNvPr>
+          <p:cNvPicPr>
+            <a:picLocks noChangeAspect="1"/>
+          </p:cNvPicPr>
+          <p:nvPr/>
+        </p:nvPicPr>
+        <p:blipFill rotWithShape="1">
+          <a:blip r:embed="rId4"/>
+          <a:srcRect l="16043" t="17246" r="20463" b="28520"/>
+          <a:stretch/>
+        </p:blipFill>
+        <p:spPr>
+          <a:xfrm>
+            <a:off x="5042511" y="2502552"/>
+            <a:ext cx="2106976" cy="1938136"/>
+          </a:xfrm>
+          <a:prstGeom prst="rect">
+            <a:avLst/>
+          </a:prstGeom>
+        </p:spPr>
+      </p:pic>
+      <p:pic>
+        <p:nvPicPr>
+          <p:cNvPr id="7" name="Image 6">
+            <a:extLst>
+              <a:ext uri="{FF2B5EF4-FFF2-40B4-BE49-F238E27FC236}">
+                <a16:creationId xmlns:a16="http://schemas.microsoft.com/office/drawing/2014/main" id="{2CB11B7D-CA7C-49E7-B4B0-B9E835C214C0}"/>
+              </a:ext>
+            </a:extLst>
+          </p:cNvPr>
+          <p:cNvPicPr>
+            <a:picLocks noChangeAspect="1"/>
+          </p:cNvPicPr>
+          <p:nvPr/>
+        </p:nvPicPr>
+        <p:blipFill rotWithShape="1">
+          <a:blip r:embed="rId5"/>
+          <a:srcRect l="26807" t="9783" r="26609" b="14537"/>
+          <a:stretch/>
+        </p:blipFill>
+        <p:spPr>
+          <a:xfrm>
+            <a:off x="8538446" y="2502552"/>
+            <a:ext cx="3141549" cy="1840123"/>
+          </a:xfrm>
+          <a:prstGeom prst="rect">
+            <a:avLst/>
+          </a:prstGeom>
+        </p:spPr>
+      </p:pic>
+      <p:sp>
+        <p:nvSpPr>
+          <p:cNvPr id="8" name="ZoneTexte 7">
+            <a:extLst>
+              <a:ext uri="{FF2B5EF4-FFF2-40B4-BE49-F238E27FC236}">
+                <a16:creationId xmlns:a16="http://schemas.microsoft.com/office/drawing/2014/main" id="{7627CF94-14BF-46B2-9DDC-8430C998B405}"/>
+              </a:ext>
+            </a:extLst>
+          </p:cNvPr>
+          <p:cNvSpPr txBox="1"/>
+          <p:nvPr/>
+        </p:nvSpPr>
+        <p:spPr>
+          <a:xfrm>
+            <a:off x="855643" y="2133220"/>
+            <a:ext cx="1737783" cy="369332"/>
+          </a:xfrm>
+          <a:prstGeom prst="rect">
+            <a:avLst/>
+          </a:prstGeom>
+          <a:noFill/>
+        </p:spPr>
+        <p:txBody>
+          <a:bodyPr wrap="none" rtlCol="0">
+            <a:spAutoFit/>
+          </a:bodyPr>
+          <a:lstStyle/>
+          <a:p>
             <a:r>
               <a:rPr lang="fr-FR" dirty="0"/>
-              <a:t>Mon étude intervient donc pour faire un premier tri.</a:t>
-            </a:r>
-          </a:p>
-          <a:p>
-            <a:pPr algn="just"/>
+              <a:t>Déjà développés</a:t>
+            </a:r>
+          </a:p>
+        </p:txBody>
+      </p:sp>
+      <p:sp>
+        <p:nvSpPr>
+          <p:cNvPr id="9" name="ZoneTexte 8">
+            <a:extLst>
+              <a:ext uri="{FF2B5EF4-FFF2-40B4-BE49-F238E27FC236}">
+                <a16:creationId xmlns:a16="http://schemas.microsoft.com/office/drawing/2014/main" id="{9EE62118-321E-41E4-99E0-0195D2886ED0}"/>
+              </a:ext>
+            </a:extLst>
+          </p:cNvPr>
+          <p:cNvSpPr txBox="1"/>
+          <p:nvPr/>
+        </p:nvSpPr>
+        <p:spPr>
+          <a:xfrm>
+            <a:off x="4783236" y="2133220"/>
+            <a:ext cx="2625527" cy="369332"/>
+          </a:xfrm>
+          <a:prstGeom prst="rect">
+            <a:avLst/>
+          </a:prstGeom>
+          <a:noFill/>
+        </p:spPr>
+        <p:txBody>
+          <a:bodyPr wrap="none" rtlCol="0">
+            <a:spAutoFit/>
+          </a:bodyPr>
+          <a:lstStyle/>
+          <a:p>
             <a:r>
               <a:rPr lang="fr-FR" dirty="0"/>
-              <a:t>Afin de commencer à s’implanter</a:t>
-            </a:r>
-            <a:r>
-              <a:rPr lang="fr-FR" baseline="0" dirty="0"/>
-              <a:t> à l’international, l’entreprise doit trouver des pays qui soient déjà développés, qui importent déjà de la viande de volaille. Il serait trop compliqué de créer un nouveau marché, et cela prendrait énormément de ressource ; Cela sera dans un deuxième temps quand l’entreprise aura grandi.</a:t>
-            </a:r>
-            <a:endParaRPr lang="fr-FR" dirty="0"/>
+              <a:t>Consommant de la viande</a:t>
+            </a:r>
+          </a:p>
+        </p:txBody>
+      </p:sp>
+      <p:sp>
+        <p:nvSpPr>
+          <p:cNvPr id="10" name="ZoneTexte 9">
+            <a:extLst>
+              <a:ext uri="{FF2B5EF4-FFF2-40B4-BE49-F238E27FC236}">
+                <a16:creationId xmlns:a16="http://schemas.microsoft.com/office/drawing/2014/main" id="{A0948C6D-FAC9-48B7-B0DA-20807F9004EC}"/>
+              </a:ext>
+            </a:extLst>
+          </p:cNvPr>
+          <p:cNvSpPr txBox="1"/>
+          <p:nvPr/>
+        </p:nvSpPr>
+        <p:spPr>
+          <a:xfrm>
+            <a:off x="8697489" y="2133220"/>
+            <a:ext cx="2823465" cy="369332"/>
+          </a:xfrm>
+          <a:prstGeom prst="rect">
+            <a:avLst/>
+          </a:prstGeom>
+          <a:noFill/>
+        </p:spPr>
+        <p:txBody>
+          <a:bodyPr wrap="none" rtlCol="0">
+            <a:spAutoFit/>
+          </a:bodyPr>
+          <a:lstStyle/>
+          <a:p>
+            <a:r>
+              <a:rPr lang="fr-FR" dirty="0"/>
+              <a:t>Importations déjà présentes</a:t>
+            </a:r>
           </a:p>
         </p:txBody>
       </p:sp>
@@ -13695,6 +14763,257 @@
   <p:clrMapOvr>
     <a:masterClrMapping/>
   </p:clrMapOvr>
+  <p:timing>
+    <p:tnLst>
+      <p:par>
+        <p:cTn id="1" dur="indefinite" restart="never" nodeType="tmRoot">
+          <p:childTnLst>
+            <p:seq concurrent="1" nextAc="seek">
+              <p:cTn id="2" dur="indefinite" nodeType="mainSeq">
+                <p:childTnLst>
+                  <p:par>
+                    <p:cTn id="3" fill="hold">
+                      <p:stCondLst>
+                        <p:cond delay="indefinite"/>
+                      </p:stCondLst>
+                      <p:childTnLst>
+                        <p:par>
+                          <p:cTn id="4" fill="hold">
+                            <p:stCondLst>
+                              <p:cond delay="0"/>
+                            </p:stCondLst>
+                            <p:childTnLst>
+                              <p:par>
+                                <p:cTn id="5" presetID="1" presetClass="entr" presetSubtype="0" fill="hold" grpId="0" nodeType="clickEffect">
+                                  <p:stCondLst>
+                                    <p:cond delay="0"/>
+                                  </p:stCondLst>
+                                  <p:childTnLst>
+                                    <p:set>
+                                      <p:cBhvr>
+                                        <p:cTn id="6" dur="1" fill="hold">
+                                          <p:stCondLst>
+                                            <p:cond delay="0"/>
+                                          </p:stCondLst>
+                                        </p:cTn>
+                                        <p:tgtEl>
+                                          <p:spTgt spid="8"/>
+                                        </p:tgtEl>
+                                        <p:attrNameLst>
+                                          <p:attrName>style.visibility</p:attrName>
+                                        </p:attrNameLst>
+                                      </p:cBhvr>
+                                      <p:to>
+                                        <p:strVal val="visible"/>
+                                      </p:to>
+                                    </p:set>
+                                  </p:childTnLst>
+                                </p:cTn>
+                              </p:par>
+                              <p:par>
+                                <p:cTn id="7" presetID="1" presetClass="entr" presetSubtype="0" fill="hold" nodeType="withEffect">
+                                  <p:stCondLst>
+                                    <p:cond delay="0"/>
+                                  </p:stCondLst>
+                                  <p:childTnLst>
+                                    <p:set>
+                                      <p:cBhvr>
+                                        <p:cTn id="8" dur="1" fill="hold">
+                                          <p:stCondLst>
+                                            <p:cond delay="0"/>
+                                          </p:stCondLst>
+                                        </p:cTn>
+                                        <p:tgtEl>
+                                          <p:spTgt spid="5"/>
+                                        </p:tgtEl>
+                                        <p:attrNameLst>
+                                          <p:attrName>style.visibility</p:attrName>
+                                        </p:attrNameLst>
+                                      </p:cBhvr>
+                                      <p:to>
+                                        <p:strVal val="visible"/>
+                                      </p:to>
+                                    </p:set>
+                                  </p:childTnLst>
+                                </p:cTn>
+                              </p:par>
+                            </p:childTnLst>
+                          </p:cTn>
+                        </p:par>
+                      </p:childTnLst>
+                    </p:cTn>
+                  </p:par>
+                  <p:par>
+                    <p:cTn id="9" fill="hold">
+                      <p:stCondLst>
+                        <p:cond delay="indefinite"/>
+                      </p:stCondLst>
+                      <p:childTnLst>
+                        <p:par>
+                          <p:cTn id="10" fill="hold">
+                            <p:stCondLst>
+                              <p:cond delay="0"/>
+                            </p:stCondLst>
+                            <p:childTnLst>
+                              <p:par>
+                                <p:cTn id="11" presetID="1" presetClass="entr" presetSubtype="0" fill="hold" grpId="0" nodeType="clickEffect">
+                                  <p:stCondLst>
+                                    <p:cond delay="0"/>
+                                  </p:stCondLst>
+                                  <p:childTnLst>
+                                    <p:set>
+                                      <p:cBhvr>
+                                        <p:cTn id="12" dur="1" fill="hold">
+                                          <p:stCondLst>
+                                            <p:cond delay="0"/>
+                                          </p:stCondLst>
+                                        </p:cTn>
+                                        <p:tgtEl>
+                                          <p:spTgt spid="9"/>
+                                        </p:tgtEl>
+                                        <p:attrNameLst>
+                                          <p:attrName>style.visibility</p:attrName>
+                                        </p:attrNameLst>
+                                      </p:cBhvr>
+                                      <p:to>
+                                        <p:strVal val="visible"/>
+                                      </p:to>
+                                    </p:set>
+                                  </p:childTnLst>
+                                </p:cTn>
+                              </p:par>
+                              <p:par>
+                                <p:cTn id="13" presetID="1" presetClass="entr" presetSubtype="0" fill="hold" nodeType="withEffect">
+                                  <p:stCondLst>
+                                    <p:cond delay="0"/>
+                                  </p:stCondLst>
+                                  <p:childTnLst>
+                                    <p:set>
+                                      <p:cBhvr>
+                                        <p:cTn id="14" dur="1" fill="hold">
+                                          <p:stCondLst>
+                                            <p:cond delay="0"/>
+                                          </p:stCondLst>
+                                        </p:cTn>
+                                        <p:tgtEl>
+                                          <p:spTgt spid="6"/>
+                                        </p:tgtEl>
+                                        <p:attrNameLst>
+                                          <p:attrName>style.visibility</p:attrName>
+                                        </p:attrNameLst>
+                                      </p:cBhvr>
+                                      <p:to>
+                                        <p:strVal val="visible"/>
+                                      </p:to>
+                                    </p:set>
+                                  </p:childTnLst>
+                                </p:cTn>
+                              </p:par>
+                            </p:childTnLst>
+                          </p:cTn>
+                        </p:par>
+                      </p:childTnLst>
+                    </p:cTn>
+                  </p:par>
+                  <p:par>
+                    <p:cTn id="15" fill="hold">
+                      <p:stCondLst>
+                        <p:cond delay="indefinite"/>
+                      </p:stCondLst>
+                      <p:childTnLst>
+                        <p:par>
+                          <p:cTn id="16" fill="hold">
+                            <p:stCondLst>
+                              <p:cond delay="0"/>
+                            </p:stCondLst>
+                            <p:childTnLst>
+                              <p:par>
+                                <p:cTn id="17" presetID="1" presetClass="entr" presetSubtype="0" fill="hold" grpId="0" nodeType="clickEffect">
+                                  <p:stCondLst>
+                                    <p:cond delay="0"/>
+                                  </p:stCondLst>
+                                  <p:childTnLst>
+                                    <p:set>
+                                      <p:cBhvr>
+                                        <p:cTn id="18" dur="1" fill="hold">
+                                          <p:stCondLst>
+                                            <p:cond delay="0"/>
+                                          </p:stCondLst>
+                                        </p:cTn>
+                                        <p:tgtEl>
+                                          <p:spTgt spid="10"/>
+                                        </p:tgtEl>
+                                        <p:attrNameLst>
+                                          <p:attrName>style.visibility</p:attrName>
+                                        </p:attrNameLst>
+                                      </p:cBhvr>
+                                      <p:to>
+                                        <p:strVal val="visible"/>
+                                      </p:to>
+                                    </p:set>
+                                  </p:childTnLst>
+                                </p:cTn>
+                              </p:par>
+                              <p:par>
+                                <p:cTn id="19" presetID="1" presetClass="entr" presetSubtype="0" fill="hold" nodeType="withEffect">
+                                  <p:stCondLst>
+                                    <p:cond delay="0"/>
+                                  </p:stCondLst>
+                                  <p:childTnLst>
+                                    <p:set>
+                                      <p:cBhvr>
+                                        <p:cTn id="20" dur="1" fill="hold">
+                                          <p:stCondLst>
+                                            <p:cond delay="0"/>
+                                          </p:stCondLst>
+                                        </p:cTn>
+                                        <p:tgtEl>
+                                          <p:spTgt spid="7"/>
+                                        </p:tgtEl>
+                                        <p:attrNameLst>
+                                          <p:attrName>style.visibility</p:attrName>
+                                        </p:attrNameLst>
+                                      </p:cBhvr>
+                                      <p:to>
+                                        <p:strVal val="visible"/>
+                                      </p:to>
+                                    </p:set>
+                                  </p:childTnLst>
+                                </p:cTn>
+                              </p:par>
+                            </p:childTnLst>
+                          </p:cTn>
+                        </p:par>
+                      </p:childTnLst>
+                    </p:cTn>
+                  </p:par>
+                </p:childTnLst>
+              </p:cTn>
+              <p:prevCondLst>
+                <p:cond evt="onPrev" delay="0">
+                  <p:tgtEl>
+                    <p:sldTgt/>
+                  </p:tgtEl>
+                </p:cond>
+              </p:prevCondLst>
+              <p:nextCondLst>
+                <p:cond evt="onNext" delay="0">
+                  <p:tgtEl>
+                    <p:sldTgt/>
+                  </p:tgtEl>
+                </p:cond>
+              </p:nextCondLst>
+            </p:seq>
+          </p:childTnLst>
+        </p:cTn>
+      </p:par>
+    </p:tnLst>
+    <p:bldLst>
+      <p:bldP spid="8" grpId="0"/>
+      <p:bldP spid="9" grpId="0"/>
+      <p:bldP spid="10" grpId="0"/>
+    </p:bldLst>
+  </p:timing>
 </p:sld>
 </file>
 
@@ -14291,12 +15610,12 @@
         <p:spPr>
           <a:xfrm>
             <a:off x="1391920" y="1999139"/>
-            <a:ext cx="9144000" cy="2859722"/>
+            <a:ext cx="9144000" cy="3536688"/>
           </a:xfrm>
         </p:spPr>
         <p:txBody>
           <a:bodyPr>
-            <a:normAutofit fontScale="85000" lnSpcReduction="20000"/>
+            <a:normAutofit fontScale="92500" lnSpcReduction="10000"/>
           </a:bodyPr>
           <a:lstStyle/>
           <a:p>
@@ -14373,6 +15692,16 @@
             <a:r>
               <a:rPr lang="fr-FR" dirty="0"/>
               <a:t>La ratio du PIB (n/n-1)</a:t>
+            </a:r>
+          </a:p>
+          <a:p>
+            <a:pPr marL="342900" indent="-342900" algn="l">
+              <a:buFont typeface="Arial" panose="020B0604020202020204" pitchFamily="34" charset="0"/>
+              <a:buChar char="•"/>
+            </a:pPr>
+            <a:r>
+              <a:rPr lang="fr-FR" dirty="0"/>
+              <a:t>Importations de viande de volaille (en Tonnes)</a:t>
             </a:r>
           </a:p>
         </p:txBody>
@@ -14392,7 +15721,7 @@
           <p:nvPr/>
         </p:nvPicPr>
         <p:blipFill>
-          <a:blip r:embed="rId2">
+          <a:blip r:embed="rId3">
             <a:extLst>
               <a:ext uri="{28A0092B-C50C-407E-A947-70E740481C1C}">
                 <a14:useLocalDpi xmlns:a14="http://schemas.microsoft.com/office/drawing/2010/main" val="0"/>
@@ -14423,6 +15752,379 @@
   <p:clrMapOvr>
     <a:masterClrMapping/>
   </p:clrMapOvr>
+  <p:timing>
+    <p:tnLst>
+      <p:par>
+        <p:cTn id="1" dur="indefinite" restart="never" nodeType="tmRoot">
+          <p:childTnLst>
+            <p:seq concurrent="1" nextAc="seek">
+              <p:cTn id="2" dur="indefinite" nodeType="mainSeq">
+                <p:childTnLst>
+                  <p:par>
+                    <p:cTn id="3" fill="hold">
+                      <p:stCondLst>
+                        <p:cond delay="indefinite"/>
+                      </p:stCondLst>
+                      <p:childTnLst>
+                        <p:par>
+                          <p:cTn id="4" fill="hold">
+                            <p:stCondLst>
+                              <p:cond delay="0"/>
+                            </p:stCondLst>
+                            <p:childTnLst>
+                              <p:par>
+                                <p:cTn id="5" presetID="1" presetClass="entr" presetSubtype="0" fill="hold" nodeType="clickEffect">
+                                  <p:stCondLst>
+                                    <p:cond delay="0"/>
+                                  </p:stCondLst>
+                                  <p:childTnLst>
+                                    <p:set>
+                                      <p:cBhvr>
+                                        <p:cTn id="6" dur="1" fill="hold">
+                                          <p:stCondLst>
+                                            <p:cond delay="0"/>
+                                          </p:stCondLst>
+                                        </p:cTn>
+                                        <p:tgtEl>
+                                          <p:spTgt spid="3">
+                                            <p:txEl>
+                                              <p:pRg st="2" end="2"/>
+                                            </p:txEl>
+                                          </p:spTgt>
+                                        </p:tgtEl>
+                                        <p:attrNameLst>
+                                          <p:attrName>style.visibility</p:attrName>
+                                        </p:attrNameLst>
+                                      </p:cBhvr>
+                                      <p:to>
+                                        <p:strVal val="visible"/>
+                                      </p:to>
+                                    </p:set>
+                                  </p:childTnLst>
+                                </p:cTn>
+                              </p:par>
+                            </p:childTnLst>
+                          </p:cTn>
+                        </p:par>
+                      </p:childTnLst>
+                    </p:cTn>
+                  </p:par>
+                  <p:par>
+                    <p:cTn id="7" fill="hold">
+                      <p:stCondLst>
+                        <p:cond delay="indefinite"/>
+                      </p:stCondLst>
+                      <p:childTnLst>
+                        <p:par>
+                          <p:cTn id="8" fill="hold">
+                            <p:stCondLst>
+                              <p:cond delay="0"/>
+                            </p:stCondLst>
+                            <p:childTnLst>
+                              <p:par>
+                                <p:cTn id="9" presetID="1" presetClass="entr" presetSubtype="0" fill="hold" nodeType="clickEffect">
+                                  <p:stCondLst>
+                                    <p:cond delay="0"/>
+                                  </p:stCondLst>
+                                  <p:childTnLst>
+                                    <p:set>
+                                      <p:cBhvr>
+                                        <p:cTn id="10" dur="1" fill="hold">
+                                          <p:stCondLst>
+                                            <p:cond delay="0"/>
+                                          </p:stCondLst>
+                                        </p:cTn>
+                                        <p:tgtEl>
+                                          <p:spTgt spid="3">
+                                            <p:txEl>
+                                              <p:pRg st="3" end="3"/>
+                                            </p:txEl>
+                                          </p:spTgt>
+                                        </p:tgtEl>
+                                        <p:attrNameLst>
+                                          <p:attrName>style.visibility</p:attrName>
+                                        </p:attrNameLst>
+                                      </p:cBhvr>
+                                      <p:to>
+                                        <p:strVal val="visible"/>
+                                      </p:to>
+                                    </p:set>
+                                  </p:childTnLst>
+                                </p:cTn>
+                              </p:par>
+                            </p:childTnLst>
+                          </p:cTn>
+                        </p:par>
+                      </p:childTnLst>
+                    </p:cTn>
+                  </p:par>
+                  <p:par>
+                    <p:cTn id="11" fill="hold">
+                      <p:stCondLst>
+                        <p:cond delay="indefinite"/>
+                      </p:stCondLst>
+                      <p:childTnLst>
+                        <p:par>
+                          <p:cTn id="12" fill="hold">
+                            <p:stCondLst>
+                              <p:cond delay="0"/>
+                            </p:stCondLst>
+                            <p:childTnLst>
+                              <p:par>
+                                <p:cTn id="13" presetID="1" presetClass="entr" presetSubtype="0" fill="hold" nodeType="clickEffect">
+                                  <p:stCondLst>
+                                    <p:cond delay="0"/>
+                                  </p:stCondLst>
+                                  <p:childTnLst>
+                                    <p:set>
+                                      <p:cBhvr>
+                                        <p:cTn id="14" dur="1" fill="hold">
+                                          <p:stCondLst>
+                                            <p:cond delay="0"/>
+                                          </p:stCondLst>
+                                        </p:cTn>
+                                        <p:tgtEl>
+                                          <p:spTgt spid="3">
+                                            <p:txEl>
+                                              <p:pRg st="4" end="4"/>
+                                            </p:txEl>
+                                          </p:spTgt>
+                                        </p:tgtEl>
+                                        <p:attrNameLst>
+                                          <p:attrName>style.visibility</p:attrName>
+                                        </p:attrNameLst>
+                                      </p:cBhvr>
+                                      <p:to>
+                                        <p:strVal val="visible"/>
+                                      </p:to>
+                                    </p:set>
+                                  </p:childTnLst>
+                                </p:cTn>
+                              </p:par>
+                            </p:childTnLst>
+                          </p:cTn>
+                        </p:par>
+                      </p:childTnLst>
+                    </p:cTn>
+                  </p:par>
+                  <p:par>
+                    <p:cTn id="15" fill="hold">
+                      <p:stCondLst>
+                        <p:cond delay="indefinite"/>
+                      </p:stCondLst>
+                      <p:childTnLst>
+                        <p:par>
+                          <p:cTn id="16" fill="hold">
+                            <p:stCondLst>
+                              <p:cond delay="0"/>
+                            </p:stCondLst>
+                            <p:childTnLst>
+                              <p:par>
+                                <p:cTn id="17" presetID="1" presetClass="entr" presetSubtype="0" fill="hold" nodeType="clickEffect">
+                                  <p:stCondLst>
+                                    <p:cond delay="0"/>
+                                  </p:stCondLst>
+                                  <p:childTnLst>
+                                    <p:set>
+                                      <p:cBhvr>
+                                        <p:cTn id="18" dur="1" fill="hold">
+                                          <p:stCondLst>
+                                            <p:cond delay="0"/>
+                                          </p:stCondLst>
+                                        </p:cTn>
+                                        <p:tgtEl>
+                                          <p:spTgt spid="3">
+                                            <p:txEl>
+                                              <p:pRg st="5" end="5"/>
+                                            </p:txEl>
+                                          </p:spTgt>
+                                        </p:tgtEl>
+                                        <p:attrNameLst>
+                                          <p:attrName>style.visibility</p:attrName>
+                                        </p:attrNameLst>
+                                      </p:cBhvr>
+                                      <p:to>
+                                        <p:strVal val="visible"/>
+                                      </p:to>
+                                    </p:set>
+                                  </p:childTnLst>
+                                </p:cTn>
+                              </p:par>
+                            </p:childTnLst>
+                          </p:cTn>
+                        </p:par>
+                      </p:childTnLst>
+                    </p:cTn>
+                  </p:par>
+                  <p:par>
+                    <p:cTn id="19" fill="hold">
+                      <p:stCondLst>
+                        <p:cond delay="indefinite"/>
+                      </p:stCondLst>
+                      <p:childTnLst>
+                        <p:par>
+                          <p:cTn id="20" fill="hold">
+                            <p:stCondLst>
+                              <p:cond delay="0"/>
+                            </p:stCondLst>
+                            <p:childTnLst>
+                              <p:par>
+                                <p:cTn id="21" presetID="1" presetClass="entr" presetSubtype="0" fill="hold" nodeType="clickEffect">
+                                  <p:stCondLst>
+                                    <p:cond delay="0"/>
+                                  </p:stCondLst>
+                                  <p:childTnLst>
+                                    <p:set>
+                                      <p:cBhvr>
+                                        <p:cTn id="22" dur="1" fill="hold">
+                                          <p:stCondLst>
+                                            <p:cond delay="0"/>
+                                          </p:stCondLst>
+                                        </p:cTn>
+                                        <p:tgtEl>
+                                          <p:spTgt spid="3">
+                                            <p:txEl>
+                                              <p:pRg st="6" end="6"/>
+                                            </p:txEl>
+                                          </p:spTgt>
+                                        </p:tgtEl>
+                                        <p:attrNameLst>
+                                          <p:attrName>style.visibility</p:attrName>
+                                        </p:attrNameLst>
+                                      </p:cBhvr>
+                                      <p:to>
+                                        <p:strVal val="visible"/>
+                                      </p:to>
+                                    </p:set>
+                                  </p:childTnLst>
+                                </p:cTn>
+                              </p:par>
+                            </p:childTnLst>
+                          </p:cTn>
+                        </p:par>
+                      </p:childTnLst>
+                    </p:cTn>
+                  </p:par>
+                  <p:par>
+                    <p:cTn id="23" fill="hold">
+                      <p:stCondLst>
+                        <p:cond delay="indefinite"/>
+                      </p:stCondLst>
+                      <p:childTnLst>
+                        <p:par>
+                          <p:cTn id="24" fill="hold">
+                            <p:stCondLst>
+                              <p:cond delay="0"/>
+                            </p:stCondLst>
+                            <p:childTnLst>
+                              <p:par>
+                                <p:cTn id="25" presetID="1" presetClass="entr" presetSubtype="0" fill="hold" nodeType="clickEffect">
+                                  <p:stCondLst>
+                                    <p:cond delay="0"/>
+                                  </p:stCondLst>
+                                  <p:childTnLst>
+                                    <p:set>
+                                      <p:cBhvr>
+                                        <p:cTn id="26" dur="1" fill="hold">
+                                          <p:stCondLst>
+                                            <p:cond delay="0"/>
+                                          </p:stCondLst>
+                                        </p:cTn>
+                                        <p:tgtEl>
+                                          <p:spTgt spid="3">
+                                            <p:txEl>
+                                              <p:pRg st="7" end="7"/>
+                                            </p:txEl>
+                                          </p:spTgt>
+                                        </p:tgtEl>
+                                        <p:attrNameLst>
+                                          <p:attrName>style.visibility</p:attrName>
+                                        </p:attrNameLst>
+                                      </p:cBhvr>
+                                      <p:to>
+                                        <p:strVal val="visible"/>
+                                      </p:to>
+                                    </p:set>
+                                  </p:childTnLst>
+                                </p:cTn>
+                              </p:par>
+                            </p:childTnLst>
+                          </p:cTn>
+                        </p:par>
+                      </p:childTnLst>
+                    </p:cTn>
+                  </p:par>
+                  <p:par>
+                    <p:cTn id="27" fill="hold">
+                      <p:stCondLst>
+                        <p:cond delay="indefinite"/>
+                      </p:stCondLst>
+                      <p:childTnLst>
+                        <p:par>
+                          <p:cTn id="28" fill="hold">
+                            <p:stCondLst>
+                              <p:cond delay="0"/>
+                            </p:stCondLst>
+                            <p:childTnLst>
+                              <p:par>
+                                <p:cTn id="29" presetID="1" presetClass="entr" presetSubtype="0" fill="hold" nodeType="clickEffect">
+                                  <p:stCondLst>
+                                    <p:cond delay="0"/>
+                                  </p:stCondLst>
+                                  <p:childTnLst>
+                                    <p:set>
+                                      <p:cBhvr>
+                                        <p:cTn id="30" dur="1" fill="hold">
+                                          <p:stCondLst>
+                                            <p:cond delay="0"/>
+                                          </p:stCondLst>
+                                        </p:cTn>
+                                        <p:tgtEl>
+                                          <p:spTgt spid="3">
+                                            <p:txEl>
+                                              <p:pRg st="8" end="8"/>
+                                            </p:txEl>
+                                          </p:spTgt>
+                                        </p:tgtEl>
+                                        <p:attrNameLst>
+                                          <p:attrName>style.visibility</p:attrName>
+                                        </p:attrNameLst>
+                                      </p:cBhvr>
+                                      <p:to>
+                                        <p:strVal val="visible"/>
+                                      </p:to>
+                                    </p:set>
+                                  </p:childTnLst>
+                                </p:cTn>
+                              </p:par>
+                            </p:childTnLst>
+                          </p:cTn>
+                        </p:par>
+                      </p:childTnLst>
+                    </p:cTn>
+                  </p:par>
+                </p:childTnLst>
+              </p:cTn>
+              <p:prevCondLst>
+                <p:cond evt="onPrev" delay="0">
+                  <p:tgtEl>
+                    <p:sldTgt/>
+                  </p:tgtEl>
+                </p:cond>
+              </p:prevCondLst>
+              <p:nextCondLst>
+                <p:cond evt="onNext" delay="0">
+                  <p:tgtEl>
+                    <p:sldTgt/>
+                  </p:tgtEl>
+                </p:cond>
+              </p:nextCondLst>
+            </p:seq>
+          </p:childTnLst>
+        </p:cTn>
+      </p:par>
+    </p:tnLst>
+  </p:timing>
 </p:sld>
 </file>
 

</xml_diff>

<commit_message>
Dernières modifications avant la soutenance
</commit_message>
<xml_diff>
--- a/Projet_5_présentation.pptx
+++ b/Projet_5_présentation.pptx
@@ -33,7 +33,7 @@
     <p:sldId id="323" r:id="rId24"/>
     <p:sldId id="289" r:id="rId25"/>
     <p:sldId id="302" r:id="rId26"/>
-    <p:sldId id="303" r:id="rId27"/>
+    <p:sldId id="324" r:id="rId27"/>
   </p:sldIdLst>
   <p:sldSz cx="12192000" cy="6858000"/>
   <p:notesSz cx="6858000" cy="9144000"/>
@@ -222,7 +222,7 @@
           <a:p>
             <a:fld id="{F3F2F135-A303-4DD6-9894-2ECAD9E5DBC9}" type="datetimeFigureOut">
               <a:rPr lang="fr-FR" smtClean="0"/>
-              <a:t>24/04/2019</a:t>
+              <a:t>07/05/2019</a:t>
             </a:fld>
             <a:endParaRPr lang="fr-FR"/>
           </a:p>
@@ -911,6 +911,95 @@
               <a:t>Pour rappel, la liste des clusters avec les centroïdes </a:t>
             </a:r>
           </a:p>
+          <a:p>
+            <a:endParaRPr lang="fr-FR" dirty="0"/>
+          </a:p>
+          <a:p>
+            <a:r>
+              <a:rPr lang="fr-FR" dirty="0"/>
+              <a:t>CLICK</a:t>
+            </a:r>
+          </a:p>
+          <a:p>
+            <a:endParaRPr lang="fr-FR" dirty="0"/>
+          </a:p>
+          <a:p>
+            <a:r>
+              <a:rPr lang="fr-FR" dirty="0"/>
+              <a:t>Voici la liste des pays du Cluster 7, une liste très grande. On a ici les pays qui nous intéressent au niveau des </a:t>
+            </a:r>
+            <a:r>
+              <a:rPr lang="fr-FR" dirty="0" err="1"/>
+              <a:t>kpi</a:t>
+            </a:r>
+            <a:r>
+              <a:rPr lang="fr-FR" dirty="0"/>
+              <a:t> mis en place juste avant. Cependant certains pays possèdent très peu d’importations. Nous allons donc faire un tri sur cette liste, que l’on verra juste après.</a:t>
+            </a:r>
+          </a:p>
+          <a:p>
+            <a:endParaRPr lang="fr-FR" dirty="0"/>
+          </a:p>
+          <a:p>
+            <a:r>
+              <a:rPr lang="fr-FR" dirty="0"/>
+              <a:t>Intéressons nous maintenant aux deux pays du Cluster 6 que nous avons vu dans la partie « Projection des individus » afin de voir à quoi ils correspondent. </a:t>
+            </a:r>
+          </a:p>
+          <a:p>
+            <a:endParaRPr lang="fr-FR" dirty="0"/>
+          </a:p>
+          <a:p>
+            <a:r>
+              <a:rPr lang="fr-FR" dirty="0"/>
+              <a:t>CLICK</a:t>
+            </a:r>
+          </a:p>
+          <a:p>
+            <a:endParaRPr lang="fr-FR" dirty="0"/>
+          </a:p>
+          <a:p>
+            <a:r>
+              <a:rPr lang="fr-FR" dirty="0"/>
+              <a:t>Nous voyons ici qu’il s’agit de la CHINE – RAS de Hong Kong et de la Russie ; </a:t>
+            </a:r>
+          </a:p>
+          <a:p>
+            <a:r>
+              <a:rPr lang="fr-FR" dirty="0"/>
+              <a:t>Concernant Hong Kong, on peut voir que toutes les valeurs correspondent bien à ce que l’on attend dans nos KPIs, pour la Russie, le PIB est trop faible pour faire partie de notre liste.</a:t>
+            </a:r>
+          </a:p>
+          <a:p>
+            <a:endParaRPr lang="fr-FR" dirty="0"/>
+          </a:p>
+          <a:p>
+            <a:r>
+              <a:rPr lang="fr-FR" dirty="0"/>
+              <a:t>Nous allons donc rajouter Hong Kong à notre liste, et ne garder uniquement les pays ayant une importation supérieure à 130 000 tonnes. Cette valeur d’importation nous permet de s’assurer qu’un marché est déjà présent sur le territoire ciblé. Cette valeur est arbitraire, elle pourra être rediscuter avec l’équipe Marketing en fonction du nombre voulu de pays. Il s’agit ici de proposer une liste de pays réduite et très ciblée. </a:t>
+            </a:r>
+          </a:p>
+          <a:p>
+            <a:r>
+              <a:rPr lang="fr-FR" dirty="0"/>
+              <a:t>CLICK</a:t>
+            </a:r>
+          </a:p>
+          <a:p>
+            <a:r>
+              <a:rPr lang="fr-FR" dirty="0"/>
+              <a:t>CLICK</a:t>
+            </a:r>
+          </a:p>
+          <a:p>
+            <a:endParaRPr lang="fr-FR" dirty="0"/>
+          </a:p>
+          <a:p>
+            <a:r>
+              <a:rPr lang="fr-FR" dirty="0"/>
+              <a:t>Voici donc la liste des pays.</a:t>
+            </a:r>
+          </a:p>
         </p:txBody>
       </p:sp>
       <p:sp>
@@ -993,340 +1082,18 @@
           <a:bodyPr/>
           <a:lstStyle/>
           <a:p>
-            <a:pPr marL="0" marR="0" lvl="0" indent="0" algn="l" defTabSz="914400" rtl="0" eaLnBrk="1" fontAlgn="auto" latinLnBrk="0" hangingPunct="1">
-              <a:lnSpc>
-                <a:spcPct val="100000"/>
-              </a:lnSpc>
-              <a:spcBef>
-                <a:spcPts val="0"/>
-              </a:spcBef>
-              <a:spcAft>
-                <a:spcPts val="0"/>
-              </a:spcAft>
-              <a:buClrTx/>
-              <a:buSzTx/>
-              <a:buFontTx/>
-              <a:buNone/>
-              <a:tabLst/>
-              <a:defRPr/>
-            </a:pPr>
             <a:r>
               <a:rPr lang="fr-FR" dirty="0"/>
-              <a:t>CLICK</a:t>
-            </a:r>
-          </a:p>
-          <a:p>
-            <a:pPr marL="0" marR="0" lvl="0" indent="0" algn="l" defTabSz="914400" rtl="0" eaLnBrk="1" fontAlgn="auto" latinLnBrk="0" hangingPunct="1">
-              <a:lnSpc>
-                <a:spcPct val="100000"/>
-              </a:lnSpc>
-              <a:spcBef>
-                <a:spcPts val="0"/>
-              </a:spcBef>
-              <a:spcAft>
-                <a:spcPts val="0"/>
-              </a:spcAft>
-              <a:buClrTx/>
-              <a:buSzTx/>
-              <a:buFontTx/>
-              <a:buNone/>
-              <a:tabLst/>
-              <a:defRPr/>
-            </a:pPr>
-            <a:r>
-              <a:rPr lang="fr-FR" dirty="0" err="1"/>
-              <a:t>Np.random.seed</a:t>
-            </a:r>
+              <a:t>La liste des pays a été établie. </a:t>
+            </a:r>
+          </a:p>
+          <a:p>
+            <a:endParaRPr lang="fr-FR" dirty="0"/>
+          </a:p>
+          <a:p>
             <a:r>
               <a:rPr lang="fr-FR" dirty="0"/>
-              <a:t>(1) permet de bloquer le nombre de lancés aléatoires à 1 (afin d’éviter d’avoir des résultats différent entre chaque exécution)</a:t>
-            </a:r>
-          </a:p>
-          <a:p>
-            <a:pPr marL="0" marR="0" lvl="0" indent="0" algn="l" defTabSz="914400" rtl="0" eaLnBrk="1" fontAlgn="auto" latinLnBrk="0" hangingPunct="1">
-              <a:lnSpc>
-                <a:spcPct val="100000"/>
-              </a:lnSpc>
-              <a:spcBef>
-                <a:spcPts val="0"/>
-              </a:spcBef>
-              <a:spcAft>
-                <a:spcPts val="0"/>
-              </a:spcAft>
-              <a:buClrTx/>
-              <a:buSzTx/>
-              <a:buFontTx/>
-              <a:buNone/>
-              <a:tabLst/>
-              <a:defRPr/>
-            </a:pPr>
-            <a:endParaRPr lang="fr-FR" dirty="0"/>
-          </a:p>
-          <a:p>
-            <a:pPr marL="0" marR="0" lvl="0" indent="0" algn="l" defTabSz="914400" rtl="0" eaLnBrk="1" fontAlgn="auto" latinLnBrk="0" hangingPunct="1">
-              <a:lnSpc>
-                <a:spcPct val="100000"/>
-              </a:lnSpc>
-              <a:spcBef>
-                <a:spcPts val="0"/>
-              </a:spcBef>
-              <a:spcAft>
-                <a:spcPts val="0"/>
-              </a:spcAft>
-              <a:buClrTx/>
-              <a:buSzTx/>
-              <a:buFontTx/>
-              <a:buNone/>
-              <a:tabLst/>
-              <a:defRPr/>
-            </a:pPr>
-            <a:r>
-              <a:rPr lang="fr-FR" dirty="0"/>
-              <a:t>CLICK</a:t>
-            </a:r>
-          </a:p>
-          <a:p>
-            <a:pPr marL="0" marR="0" lvl="0" indent="0" algn="l" defTabSz="914400" rtl="0" eaLnBrk="1" fontAlgn="auto" latinLnBrk="0" hangingPunct="1">
-              <a:lnSpc>
-                <a:spcPct val="100000"/>
-              </a:lnSpc>
-              <a:spcBef>
-                <a:spcPts val="0"/>
-              </a:spcBef>
-              <a:spcAft>
-                <a:spcPts val="0"/>
-              </a:spcAft>
-              <a:buClrTx/>
-              <a:buSzTx/>
-              <a:buFontTx/>
-              <a:buNone/>
-              <a:tabLst/>
-              <a:defRPr/>
-            </a:pPr>
-            <a:r>
-              <a:rPr lang="fr-FR" dirty="0"/>
-              <a:t>On utilise ensuite ks_2amp pour savoir si la variable suit une loi normale ou non : </a:t>
-            </a:r>
-          </a:p>
-          <a:p>
-            <a:pPr marL="0" marR="0" lvl="0" indent="0" algn="l" defTabSz="914400" rtl="0" eaLnBrk="1" fontAlgn="auto" latinLnBrk="0" hangingPunct="1">
-              <a:lnSpc>
-                <a:spcPct val="100000"/>
-              </a:lnSpc>
-              <a:spcBef>
-                <a:spcPts val="0"/>
-              </a:spcBef>
-              <a:spcAft>
-                <a:spcPts val="0"/>
-              </a:spcAft>
-              <a:buClrTx/>
-              <a:buSzTx/>
-              <a:buFontTx/>
-              <a:buNone/>
-              <a:tabLst/>
-              <a:defRPr/>
-            </a:pPr>
-            <a:endParaRPr lang="fr-FR" dirty="0"/>
-          </a:p>
-          <a:p>
-            <a:pPr marL="0" marR="0" lvl="0" indent="0" algn="l" defTabSz="914400" rtl="0" eaLnBrk="1" fontAlgn="auto" latinLnBrk="0" hangingPunct="1">
-              <a:lnSpc>
-                <a:spcPct val="100000"/>
-              </a:lnSpc>
-              <a:spcBef>
-                <a:spcPts val="0"/>
-              </a:spcBef>
-              <a:spcAft>
-                <a:spcPts val="0"/>
-              </a:spcAft>
-              <a:buClrTx/>
-              <a:buSzTx/>
-              <a:buFontTx/>
-              <a:buNone/>
-              <a:tabLst/>
-              <a:defRPr/>
-            </a:pPr>
-            <a:r>
-              <a:rPr lang="fr-FR" dirty="0"/>
-              <a:t>CLICK</a:t>
-            </a:r>
-          </a:p>
-          <a:p>
-            <a:pPr marL="0" marR="0" lvl="0" indent="0" algn="l" defTabSz="914400" rtl="0" eaLnBrk="1" fontAlgn="auto" latinLnBrk="0" hangingPunct="1">
-              <a:lnSpc>
-                <a:spcPct val="100000"/>
-              </a:lnSpc>
-              <a:spcBef>
-                <a:spcPts val="0"/>
-              </a:spcBef>
-              <a:spcAft>
-                <a:spcPts val="0"/>
-              </a:spcAft>
-              <a:buClrTx/>
-              <a:buSzTx/>
-              <a:buFontTx/>
-              <a:buNone/>
-              <a:tabLst/>
-              <a:defRPr/>
-            </a:pPr>
-            <a:r>
-              <a:rPr lang="fr-FR" dirty="0"/>
-              <a:t>On prend d’abord notre échantillon (avec la colonne que l’on veut tester) </a:t>
-            </a:r>
-          </a:p>
-          <a:p>
-            <a:pPr marL="0" marR="0" lvl="0" indent="0" algn="l" defTabSz="914400" rtl="0" eaLnBrk="1" fontAlgn="auto" latinLnBrk="0" hangingPunct="1">
-              <a:lnSpc>
-                <a:spcPct val="100000"/>
-              </a:lnSpc>
-              <a:spcBef>
-                <a:spcPts val="0"/>
-              </a:spcBef>
-              <a:spcAft>
-                <a:spcPts val="0"/>
-              </a:spcAft>
-              <a:buClrTx/>
-              <a:buSzTx/>
-              <a:buFontTx/>
-              <a:buNone/>
-              <a:tabLst/>
-              <a:defRPr/>
-            </a:pPr>
-            <a:endParaRPr lang="fr-FR" dirty="0"/>
-          </a:p>
-          <a:p>
-            <a:pPr marL="0" marR="0" lvl="0" indent="0" algn="l" defTabSz="914400" rtl="0" eaLnBrk="1" fontAlgn="auto" latinLnBrk="0" hangingPunct="1">
-              <a:lnSpc>
-                <a:spcPct val="100000"/>
-              </a:lnSpc>
-              <a:spcBef>
-                <a:spcPts val="0"/>
-              </a:spcBef>
-              <a:spcAft>
-                <a:spcPts val="0"/>
-              </a:spcAft>
-              <a:buClrTx/>
-              <a:buSzTx/>
-              <a:buFontTx/>
-              <a:buNone/>
-              <a:tabLst/>
-              <a:defRPr/>
-            </a:pPr>
-            <a:r>
-              <a:rPr lang="fr-FR" dirty="0"/>
-              <a:t>CLICK</a:t>
-            </a:r>
-          </a:p>
-          <a:p>
-            <a:pPr marL="0" marR="0" lvl="0" indent="0" algn="l" defTabSz="914400" rtl="0" eaLnBrk="1" fontAlgn="auto" latinLnBrk="0" hangingPunct="1">
-              <a:lnSpc>
-                <a:spcPct val="100000"/>
-              </a:lnSpc>
-              <a:spcBef>
-                <a:spcPts val="0"/>
-              </a:spcBef>
-              <a:spcAft>
-                <a:spcPts val="0"/>
-              </a:spcAft>
-              <a:buClrTx/>
-              <a:buSzTx/>
-              <a:buFontTx/>
-              <a:buNone/>
-              <a:tabLst/>
-              <a:defRPr/>
-            </a:pPr>
-            <a:r>
-              <a:rPr lang="fr-FR" dirty="0"/>
-              <a:t>Puis, en deuxième valeur, on transforme notre échantillon en échantillon suivant une loi normale, afin de comparer les deux.</a:t>
-            </a:r>
-          </a:p>
-          <a:p>
-            <a:pPr marL="0" marR="0" lvl="0" indent="0" algn="l" defTabSz="914400" rtl="0" eaLnBrk="1" fontAlgn="auto" latinLnBrk="0" hangingPunct="1">
-              <a:lnSpc>
-                <a:spcPct val="100000"/>
-              </a:lnSpc>
-              <a:spcBef>
-                <a:spcPts val="0"/>
-              </a:spcBef>
-              <a:spcAft>
-                <a:spcPts val="0"/>
-              </a:spcAft>
-              <a:buClrTx/>
-              <a:buSzTx/>
-              <a:buFontTx/>
-              <a:buNone/>
-              <a:tabLst/>
-              <a:defRPr/>
-            </a:pPr>
-            <a:endParaRPr lang="fr-FR" dirty="0"/>
-          </a:p>
-          <a:p>
-            <a:pPr marL="0" marR="0" lvl="0" indent="0" algn="l" defTabSz="914400" rtl="0" eaLnBrk="1" fontAlgn="auto" latinLnBrk="0" hangingPunct="1">
-              <a:lnSpc>
-                <a:spcPct val="100000"/>
-              </a:lnSpc>
-              <a:spcBef>
-                <a:spcPts val="0"/>
-              </a:spcBef>
-              <a:spcAft>
-                <a:spcPts val="0"/>
-              </a:spcAft>
-              <a:buClrTx/>
-              <a:buSzTx/>
-              <a:buFontTx/>
-              <a:buNone/>
-              <a:tabLst/>
-              <a:defRPr/>
-            </a:pPr>
-            <a:r>
-              <a:rPr lang="fr-FR" dirty="0"/>
-              <a:t>CLICK</a:t>
-            </a:r>
-          </a:p>
-          <a:p>
-            <a:pPr marL="0" marR="0" lvl="0" indent="0" algn="l" defTabSz="914400" rtl="0" eaLnBrk="1" fontAlgn="auto" latinLnBrk="0" hangingPunct="1">
-              <a:lnSpc>
-                <a:spcPct val="100000"/>
-              </a:lnSpc>
-              <a:spcBef>
-                <a:spcPts val="0"/>
-              </a:spcBef>
-              <a:spcAft>
-                <a:spcPts val="0"/>
-              </a:spcAft>
-              <a:buClrTx/>
-              <a:buSzTx/>
-              <a:buFontTx/>
-              <a:buNone/>
-              <a:tabLst/>
-              <a:defRPr/>
-            </a:pPr>
-            <a:r>
-              <a:rPr lang="fr-FR" dirty="0"/>
-              <a:t>Enfin, on utilise une condition IF pour afficher si la variable suit une loi normale ou non (grâce à la comparaison entre Alpha et </a:t>
-            </a:r>
-            <a:r>
-              <a:rPr lang="fr-FR" dirty="0" err="1"/>
-              <a:t>P_valeur</a:t>
-            </a:r>
-            <a:r>
-              <a:rPr lang="fr-FR" dirty="0"/>
-              <a:t>)</a:t>
-            </a:r>
-          </a:p>
-          <a:p>
-            <a:endParaRPr lang="fr-FR" dirty="0"/>
-          </a:p>
-          <a:p>
-            <a:r>
-              <a:rPr lang="fr-FR" dirty="0"/>
-              <a:t>CLICK</a:t>
-            </a:r>
-          </a:p>
-          <a:p>
-            <a:r>
-              <a:rPr lang="fr-FR" dirty="0"/>
-              <a:t>Ce qui nous donne le tableau suivant pour nos variables </a:t>
+              <a:t>Intéressons nous maintenant aux variables en elles même afin de s’assurer que nos différents Clusters diffèrent bien.</a:t>
             </a:r>
           </a:p>
         </p:txBody>
@@ -1348,7 +1115,7 @@
           <a:p>
             <a:fld id="{F44DFA25-216B-4048-9E14-17772AFFB9C9}" type="slidenum">
               <a:rPr lang="fr-FR" smtClean="0"/>
-              <a:t>18</a:t>
+              <a:t>17</a:t>
             </a:fld>
             <a:endParaRPr lang="fr-FR"/>
           </a:p>
@@ -1357,7 +1124,7 @@
     </p:spTree>
     <p:extLst>
       <p:ext uri="{BB962C8B-B14F-4D97-AF65-F5344CB8AC3E}">
-        <p14:creationId xmlns:p14="http://schemas.microsoft.com/office/powerpoint/2010/main" val="821450017"/>
+        <p14:creationId xmlns:p14="http://schemas.microsoft.com/office/powerpoint/2010/main" val="2192376994"/>
       </p:ext>
     </p:extLst>
   </p:cSld>
@@ -1411,46 +1178,340 @@
           <a:bodyPr/>
           <a:lstStyle/>
           <a:p>
+            <a:pPr marL="0" marR="0" lvl="0" indent="0" algn="l" defTabSz="914400" rtl="0" eaLnBrk="1" fontAlgn="auto" latinLnBrk="0" hangingPunct="1">
+              <a:lnSpc>
+                <a:spcPct val="100000"/>
+              </a:lnSpc>
+              <a:spcBef>
+                <a:spcPts val="0"/>
+              </a:spcBef>
+              <a:spcAft>
+                <a:spcPts val="0"/>
+              </a:spcAft>
+              <a:buClrTx/>
+              <a:buSzTx/>
+              <a:buFontTx/>
+              <a:buNone/>
+              <a:tabLst/>
+              <a:defRPr/>
+            </a:pPr>
             <a:r>
               <a:rPr lang="fr-FR" dirty="0"/>
-              <a:t>Point à revoir</a:t>
-            </a:r>
-          </a:p>
-          <a:p>
+              <a:t>CLICK</a:t>
+            </a:r>
+          </a:p>
+          <a:p>
+            <a:pPr marL="0" marR="0" lvl="0" indent="0" algn="l" defTabSz="914400" rtl="0" eaLnBrk="1" fontAlgn="auto" latinLnBrk="0" hangingPunct="1">
+              <a:lnSpc>
+                <a:spcPct val="100000"/>
+              </a:lnSpc>
+              <a:spcBef>
+                <a:spcPts val="0"/>
+              </a:spcBef>
+              <a:spcAft>
+                <a:spcPts val="0"/>
+              </a:spcAft>
+              <a:buClrTx/>
+              <a:buSzTx/>
+              <a:buFontTx/>
+              <a:buNone/>
+              <a:tabLst/>
+              <a:defRPr/>
+            </a:pPr>
+            <a:r>
+              <a:rPr lang="fr-FR" dirty="0" err="1"/>
+              <a:t>Np.random.seed</a:t>
+            </a:r>
+            <a:r>
+              <a:rPr lang="fr-FR" dirty="0"/>
+              <a:t>(1) permet de bloquer le nombre de lancés aléatoires à 1 (afin d’éviter d’avoir des résultats différent entre chaque exécution)</a:t>
+            </a:r>
+          </a:p>
+          <a:p>
+            <a:pPr marL="0" marR="0" lvl="0" indent="0" algn="l" defTabSz="914400" rtl="0" eaLnBrk="1" fontAlgn="auto" latinLnBrk="0" hangingPunct="1">
+              <a:lnSpc>
+                <a:spcPct val="100000"/>
+              </a:lnSpc>
+              <a:spcBef>
+                <a:spcPts val="0"/>
+              </a:spcBef>
+              <a:spcAft>
+                <a:spcPts val="0"/>
+              </a:spcAft>
+              <a:buClrTx/>
+              <a:buSzTx/>
+              <a:buFontTx/>
+              <a:buNone/>
+              <a:tabLst/>
+              <a:defRPr/>
+            </a:pPr>
             <a:endParaRPr lang="fr-FR" dirty="0"/>
           </a:p>
           <a:p>
+            <a:pPr marL="0" marR="0" lvl="0" indent="0" algn="l" defTabSz="914400" rtl="0" eaLnBrk="1" fontAlgn="auto" latinLnBrk="0" hangingPunct="1">
+              <a:lnSpc>
+                <a:spcPct val="100000"/>
+              </a:lnSpc>
+              <a:spcBef>
+                <a:spcPts val="0"/>
+              </a:spcBef>
+              <a:spcAft>
+                <a:spcPts val="0"/>
+              </a:spcAft>
+              <a:buClrTx/>
+              <a:buSzTx/>
+              <a:buFontTx/>
+              <a:buNone/>
+              <a:tabLst/>
+              <a:defRPr/>
+            </a:pPr>
             <a:r>
               <a:rPr lang="fr-FR" dirty="0"/>
-              <a:t>Le but du test est de vérifier que nos Clusters diffèrent bien entre eux.</a:t>
-            </a:r>
-          </a:p>
-          <a:p>
+              <a:t>CLICK</a:t>
+            </a:r>
+          </a:p>
+          <a:p>
+            <a:pPr marL="0" marR="0" lvl="0" indent="0" algn="l" defTabSz="914400" rtl="0" eaLnBrk="1" fontAlgn="auto" latinLnBrk="0" hangingPunct="1">
+              <a:lnSpc>
+                <a:spcPct val="100000"/>
+              </a:lnSpc>
+              <a:spcBef>
+                <a:spcPts val="0"/>
+              </a:spcBef>
+              <a:spcAft>
+                <a:spcPts val="0"/>
+              </a:spcAft>
+              <a:buClrTx/>
+              <a:buSzTx/>
+              <a:buFontTx/>
+              <a:buNone/>
+              <a:tabLst/>
+              <a:defRPr/>
+            </a:pPr>
+            <a:r>
+              <a:rPr lang="fr-FR" dirty="0"/>
+              <a:t>On utilise ensuite ks_2amp pour savoir si la variable suit une loi normale ou non : </a:t>
+            </a:r>
+          </a:p>
+          <a:p>
+            <a:pPr marL="0" marR="0" lvl="0" indent="0" algn="l" defTabSz="914400" rtl="0" eaLnBrk="1" fontAlgn="auto" latinLnBrk="0" hangingPunct="1">
+              <a:lnSpc>
+                <a:spcPct val="100000"/>
+              </a:lnSpc>
+              <a:spcBef>
+                <a:spcPts val="0"/>
+              </a:spcBef>
+              <a:spcAft>
+                <a:spcPts val="0"/>
+              </a:spcAft>
+              <a:buClrTx/>
+              <a:buSzTx/>
+              <a:buFontTx/>
+              <a:buNone/>
+              <a:tabLst/>
+              <a:defRPr/>
+            </a:pPr>
             <a:endParaRPr lang="fr-FR" dirty="0"/>
           </a:p>
           <a:p>
+            <a:pPr marL="0" marR="0" lvl="0" indent="0" algn="l" defTabSz="914400" rtl="0" eaLnBrk="1" fontAlgn="auto" latinLnBrk="0" hangingPunct="1">
+              <a:lnSpc>
+                <a:spcPct val="100000"/>
+              </a:lnSpc>
+              <a:spcBef>
+                <a:spcPts val="0"/>
+              </a:spcBef>
+              <a:spcAft>
+                <a:spcPts val="0"/>
+              </a:spcAft>
+              <a:buClrTx/>
+              <a:buSzTx/>
+              <a:buFontTx/>
+              <a:buNone/>
+              <a:tabLst/>
+              <a:defRPr/>
+            </a:pPr>
             <a:r>
               <a:rPr lang="fr-FR" dirty="0"/>
-              <a:t>On s’apprête à tester nos variables suivant une loi normale ; On souhaite savoir si ces variables suivent la même loi normale en fonction des Clusters (en analysant la Variance), tout en étant différents (en testant la Moyenne) ; </a:t>
-            </a:r>
-          </a:p>
-          <a:p>
+              <a:t>CLICK</a:t>
+            </a:r>
+          </a:p>
+          <a:p>
+            <a:pPr marL="0" marR="0" lvl="0" indent="0" algn="l" defTabSz="914400" rtl="0" eaLnBrk="1" fontAlgn="auto" latinLnBrk="0" hangingPunct="1">
+              <a:lnSpc>
+                <a:spcPct val="100000"/>
+              </a:lnSpc>
+              <a:spcBef>
+                <a:spcPts val="0"/>
+              </a:spcBef>
+              <a:spcAft>
+                <a:spcPts val="0"/>
+              </a:spcAft>
+              <a:buClrTx/>
+              <a:buSzTx/>
+              <a:buFontTx/>
+              <a:buNone/>
+              <a:tabLst/>
+              <a:defRPr/>
+            </a:pPr>
+            <a:r>
+              <a:rPr lang="fr-FR" dirty="0"/>
+              <a:t>On prend d’abord notre échantillon (avec la colonne que l’on veut tester) </a:t>
+            </a:r>
+          </a:p>
+          <a:p>
+            <a:pPr marL="0" marR="0" lvl="0" indent="0" algn="l" defTabSz="914400" rtl="0" eaLnBrk="1" fontAlgn="auto" latinLnBrk="0" hangingPunct="1">
+              <a:lnSpc>
+                <a:spcPct val="100000"/>
+              </a:lnSpc>
+              <a:spcBef>
+                <a:spcPts val="0"/>
+              </a:spcBef>
+              <a:spcAft>
+                <a:spcPts val="0"/>
+              </a:spcAft>
+              <a:buClrTx/>
+              <a:buSzTx/>
+              <a:buFontTx/>
+              <a:buNone/>
+              <a:tabLst/>
+              <a:defRPr/>
+            </a:pPr>
             <a:endParaRPr lang="fr-FR" dirty="0"/>
           </a:p>
           <a:p>
+            <a:pPr marL="0" marR="0" lvl="0" indent="0" algn="l" defTabSz="914400" rtl="0" eaLnBrk="1" fontAlgn="auto" latinLnBrk="0" hangingPunct="1">
+              <a:lnSpc>
+                <a:spcPct val="100000"/>
+              </a:lnSpc>
+              <a:spcBef>
+                <a:spcPts val="0"/>
+              </a:spcBef>
+              <a:spcAft>
+                <a:spcPts val="0"/>
+              </a:spcAft>
+              <a:buClrTx/>
+              <a:buSzTx/>
+              <a:buFontTx/>
+              <a:buNone/>
+              <a:tabLst/>
+              <a:defRPr/>
+            </a:pPr>
             <a:r>
               <a:rPr lang="fr-FR" dirty="0"/>
-              <a:t>En fait, on veut que chaque Cluster prenne une partie de la variable globale (une partie de la courbe de la variable de l’échantillon, en loi normale donc), mais que ces Clusters diffèrent dans la partie de la loi normale qu’il prenne (moyenne différente). </a:t>
-            </a:r>
-            <a:br>
+              <a:t>CLICK</a:t>
+            </a:r>
+          </a:p>
+          <a:p>
+            <a:pPr marL="0" marR="0" lvl="0" indent="0" algn="l" defTabSz="914400" rtl="0" eaLnBrk="1" fontAlgn="auto" latinLnBrk="0" hangingPunct="1">
+              <a:lnSpc>
+                <a:spcPct val="100000"/>
+              </a:lnSpc>
+              <a:spcBef>
+                <a:spcPts val="0"/>
+              </a:spcBef>
+              <a:spcAft>
+                <a:spcPts val="0"/>
+              </a:spcAft>
+              <a:buClrTx/>
+              <a:buSzTx/>
+              <a:buFontTx/>
+              <a:buNone/>
+              <a:tabLst/>
+              <a:defRPr/>
+            </a:pPr>
+            <a:r>
               <a:rPr lang="fr-FR" dirty="0"/>
-            </a:br>
-            <a:br>
+              <a:t>Puis, en deuxième valeur, on transforme notre échantillon en échantillon suivant une loi normale, afin de comparer les deux.</a:t>
+            </a:r>
+          </a:p>
+          <a:p>
+            <a:pPr marL="0" marR="0" lvl="0" indent="0" algn="l" defTabSz="914400" rtl="0" eaLnBrk="1" fontAlgn="auto" latinLnBrk="0" hangingPunct="1">
+              <a:lnSpc>
+                <a:spcPct val="100000"/>
+              </a:lnSpc>
+              <a:spcBef>
+                <a:spcPts val="0"/>
+              </a:spcBef>
+              <a:spcAft>
+                <a:spcPts val="0"/>
+              </a:spcAft>
+              <a:buClrTx/>
+              <a:buSzTx/>
+              <a:buFontTx/>
+              <a:buNone/>
+              <a:tabLst/>
+              <a:defRPr/>
+            </a:pPr>
+            <a:endParaRPr lang="fr-FR" dirty="0"/>
+          </a:p>
+          <a:p>
+            <a:pPr marL="0" marR="0" lvl="0" indent="0" algn="l" defTabSz="914400" rtl="0" eaLnBrk="1" fontAlgn="auto" latinLnBrk="0" hangingPunct="1">
+              <a:lnSpc>
+                <a:spcPct val="100000"/>
+              </a:lnSpc>
+              <a:spcBef>
+                <a:spcPts val="0"/>
+              </a:spcBef>
+              <a:spcAft>
+                <a:spcPts val="0"/>
+              </a:spcAft>
+              <a:buClrTx/>
+              <a:buSzTx/>
+              <a:buFontTx/>
+              <a:buNone/>
+              <a:tabLst/>
+              <a:defRPr/>
+            </a:pPr>
+            <a:r>
               <a:rPr lang="fr-FR" dirty="0"/>
-            </a:br>
+              <a:t>CLICK</a:t>
+            </a:r>
+          </a:p>
+          <a:p>
+            <a:pPr marL="0" marR="0" lvl="0" indent="0" algn="l" defTabSz="914400" rtl="0" eaLnBrk="1" fontAlgn="auto" latinLnBrk="0" hangingPunct="1">
+              <a:lnSpc>
+                <a:spcPct val="100000"/>
+              </a:lnSpc>
+              <a:spcBef>
+                <a:spcPts val="0"/>
+              </a:spcBef>
+              <a:spcAft>
+                <a:spcPts val="0"/>
+              </a:spcAft>
+              <a:buClrTx/>
+              <a:buSzTx/>
+              <a:buFontTx/>
+              <a:buNone/>
+              <a:tabLst/>
+              <a:defRPr/>
+            </a:pPr>
             <a:r>
               <a:rPr lang="fr-FR" dirty="0"/>
-              <a:t>Partie à expliquer plus clairement, mais voilà l’idée.</a:t>
+              <a:t>Enfin, on utilise une condition IF pour afficher si la variable suit une loi normale ou non (grâce à la comparaison entre Alpha et </a:t>
+            </a:r>
+            <a:r>
+              <a:rPr lang="fr-FR" dirty="0" err="1"/>
+              <a:t>P_valeur</a:t>
+            </a:r>
+            <a:r>
+              <a:rPr lang="fr-FR" dirty="0"/>
+              <a:t>)</a:t>
+            </a:r>
+          </a:p>
+          <a:p>
+            <a:endParaRPr lang="fr-FR" dirty="0"/>
+          </a:p>
+          <a:p>
+            <a:r>
+              <a:rPr lang="fr-FR" dirty="0"/>
+              <a:t>CLICK</a:t>
+            </a:r>
+          </a:p>
+          <a:p>
+            <a:r>
+              <a:rPr lang="fr-FR" dirty="0"/>
+              <a:t>Ce qui nous donne le tableau suivant pour nos variables </a:t>
             </a:r>
           </a:p>
         </p:txBody>
@@ -1472,7 +1533,7 @@
           <a:p>
             <a:fld id="{F44DFA25-216B-4048-9E14-17772AFFB9C9}" type="slidenum">
               <a:rPr lang="fr-FR" smtClean="0"/>
-              <a:t>19</a:t>
+              <a:t>18</a:t>
             </a:fld>
             <a:endParaRPr lang="fr-FR"/>
           </a:p>
@@ -1481,7 +1542,7 @@
     </p:spTree>
     <p:extLst>
       <p:ext uri="{BB962C8B-B14F-4D97-AF65-F5344CB8AC3E}">
-        <p14:creationId xmlns:p14="http://schemas.microsoft.com/office/powerpoint/2010/main" val="3805455055"/>
+        <p14:creationId xmlns:p14="http://schemas.microsoft.com/office/powerpoint/2010/main" val="821450017"/>
       </p:ext>
     </p:extLst>
   </p:cSld>
@@ -1537,38 +1598,53 @@
           <a:p>
             <a:r>
               <a:rPr lang="fr-FR" dirty="0"/>
-              <a:t>Nous nous intéresserons ici à deux Clusters : </a:t>
-            </a:r>
+              <a:t>XXXXX</a:t>
+            </a:r>
+          </a:p>
+          <a:p>
+            <a:endParaRPr lang="fr-FR" dirty="0"/>
           </a:p>
           <a:p>
             <a:r>
               <a:rPr lang="fr-FR" dirty="0"/>
-              <a:t>Le 5 et le 7 </a:t>
-            </a:r>
+              <a:t>Point à revoir</a:t>
+            </a:r>
+          </a:p>
+          <a:p>
+            <a:endParaRPr lang="fr-FR" dirty="0"/>
           </a:p>
           <a:p>
             <a:r>
               <a:rPr lang="fr-FR" dirty="0"/>
-              <a:t>Ainsi qu’à deux variables – </a:t>
-            </a:r>
-            <a:r>
-              <a:rPr lang="fr-FR" dirty="0" err="1"/>
-              <a:t>Ratio_prot</a:t>
-            </a:r>
+              <a:t>Le but du test est de vérifier que nos Clusters diffèrent bien entre eux.</a:t>
+            </a:r>
+          </a:p>
+          <a:p>
+            <a:endParaRPr lang="fr-FR" dirty="0"/>
+          </a:p>
+          <a:p>
             <a:r>
               <a:rPr lang="fr-FR" dirty="0"/>
-              <a:t> et </a:t>
-            </a:r>
-            <a:r>
-              <a:rPr lang="fr-FR" dirty="0" err="1"/>
-              <a:t>Dispo_alim_tot</a:t>
-            </a:r>
+              <a:t>On s’apprête à tester nos variables suivant une loi normale ; On souhaite savoir si ces variables suivent la même loi normale en fonction des Clusters (en analysant la Variance), tout en étant différents (en testant la Moyenne) ; </a:t>
+            </a:r>
+          </a:p>
+          <a:p>
             <a:endParaRPr lang="fr-FR" dirty="0"/>
           </a:p>
           <a:p>
             <a:r>
               <a:rPr lang="fr-FR" dirty="0"/>
-              <a:t>Comme vu dans la partie précédente, ces deux variables suivent bien une loi normale.</a:t>
+              <a:t>En fait, on veut que chaque Cluster prenne une partie de la variable globale (une partie de la courbe de la variable de l’échantillon, en loi normale donc), mais que ces Clusters diffèrent dans la partie de la loi normale qu’il prenne (moyenne différente). </a:t>
+            </a:r>
+            <a:br>
+              <a:rPr lang="fr-FR" dirty="0"/>
+            </a:br>
+            <a:br>
+              <a:rPr lang="fr-FR" dirty="0"/>
+            </a:br>
+            <a:r>
+              <a:rPr lang="fr-FR" dirty="0"/>
+              <a:t>Partie à expliquer plus clairement, mais voilà l’idée.</a:t>
             </a:r>
           </a:p>
         </p:txBody>
@@ -1590,7 +1666,7 @@
           <a:p>
             <a:fld id="{F44DFA25-216B-4048-9E14-17772AFFB9C9}" type="slidenum">
               <a:rPr lang="fr-FR" smtClean="0"/>
-              <a:t>20</a:t>
+              <a:t>19</a:t>
             </a:fld>
             <a:endParaRPr lang="fr-FR"/>
           </a:p>
@@ -1599,7 +1675,7 @@
     </p:spTree>
     <p:extLst>
       <p:ext uri="{BB962C8B-B14F-4D97-AF65-F5344CB8AC3E}">
-        <p14:creationId xmlns:p14="http://schemas.microsoft.com/office/powerpoint/2010/main" val="3671374684"/>
+        <p14:creationId xmlns:p14="http://schemas.microsoft.com/office/powerpoint/2010/main" val="3805455055"/>
       </p:ext>
     </p:extLst>
   </p:cSld>
@@ -1655,44 +1731,38 @@
           <a:p>
             <a:r>
               <a:rPr lang="fr-FR" dirty="0"/>
-              <a:t>On utilise ici </a:t>
+              <a:t>Nous nous intéresserons ici à deux Clusters : </a:t>
+            </a:r>
+          </a:p>
+          <a:p>
+            <a:r>
+              <a:rPr lang="fr-FR" dirty="0"/>
+              <a:t>Le 5 et le 7 </a:t>
+            </a:r>
+          </a:p>
+          <a:p>
+            <a:r>
+              <a:rPr lang="fr-FR" dirty="0"/>
+              <a:t>Ainsi qu’à deux variables – </a:t>
             </a:r>
             <a:r>
               <a:rPr lang="fr-FR" dirty="0" err="1"/>
-              <a:t>scipy.stats.barlett</a:t>
+              <a:t>Ratio_prot</a:t>
             </a:r>
             <a:r>
               <a:rPr lang="fr-FR" dirty="0"/>
-              <a:t> pour comparer les deux échantillons ; </a:t>
-            </a:r>
+              <a:t> et </a:t>
+            </a:r>
+            <a:r>
+              <a:rPr lang="fr-FR" dirty="0" err="1"/>
+              <a:t>Dispo_alim_tot</a:t>
+            </a:r>
+            <a:endParaRPr lang="fr-FR" dirty="0"/>
           </a:p>
           <a:p>
             <a:r>
               <a:rPr lang="fr-FR" dirty="0"/>
-              <a:t>On peut ainsi savoir si les variances sont différentes en comparant Alpha et </a:t>
-            </a:r>
-            <a:r>
-              <a:rPr lang="fr-FR" dirty="0" err="1"/>
-              <a:t>P_valeur</a:t>
-            </a:r>
-            <a:r>
-              <a:rPr lang="fr-FR" dirty="0"/>
-              <a:t> ;</a:t>
-            </a:r>
-          </a:p>
-          <a:p>
-            <a:endParaRPr lang="fr-FR" dirty="0"/>
-          </a:p>
-          <a:p>
-            <a:r>
-              <a:rPr lang="fr-FR" dirty="0"/>
-              <a:t>Ici, avec un niveau de test à 1%, les variances sont bien égales.</a:t>
-            </a:r>
-          </a:p>
-          <a:p>
-            <a:r>
-              <a:rPr lang="fr-FR" dirty="0"/>
-              <a:t>Les deux Clusters suivent donc la même loi normale.</a:t>
+              <a:t>Comme vu dans la partie précédente, ces deux variables suivent bien une loi normale.</a:t>
             </a:r>
           </a:p>
         </p:txBody>
@@ -1714,7 +1784,7 @@
           <a:p>
             <a:fld id="{F44DFA25-216B-4048-9E14-17772AFFB9C9}" type="slidenum">
               <a:rPr lang="fr-FR" smtClean="0"/>
-              <a:t>21</a:t>
+              <a:t>20</a:t>
             </a:fld>
             <a:endParaRPr lang="fr-FR"/>
           </a:p>
@@ -1723,7 +1793,7 @@
     </p:spTree>
     <p:extLst>
       <p:ext uri="{BB962C8B-B14F-4D97-AF65-F5344CB8AC3E}">
-        <p14:creationId xmlns:p14="http://schemas.microsoft.com/office/powerpoint/2010/main" val="3666263677"/>
+        <p14:creationId xmlns:p14="http://schemas.microsoft.com/office/powerpoint/2010/main" val="3671374684"/>
       </p:ext>
     </p:extLst>
   </p:cSld>
@@ -1783,17 +1853,25 @@
             </a:r>
             <a:r>
               <a:rPr lang="fr-FR" dirty="0" err="1"/>
-              <a:t>scipy.stats.ttest_ind</a:t>
+              <a:t>scipy.stats.barlett</a:t>
             </a:r>
             <a:r>
               <a:rPr lang="fr-FR" dirty="0"/>
-              <a:t> pour comparer les deux Clusters </a:t>
+              <a:t> pour comparer les deux échantillons ; </a:t>
             </a:r>
           </a:p>
           <a:p>
             <a:r>
               <a:rPr lang="fr-FR" dirty="0"/>
-              <a:t>CLICK</a:t>
+              <a:t>On peut ainsi savoir si les variances sont différentes en comparant Alpha et </a:t>
+            </a:r>
+            <a:r>
+              <a:rPr lang="fr-FR" dirty="0" err="1"/>
+              <a:t>P_valeur</a:t>
+            </a:r>
+            <a:r>
+              <a:rPr lang="fr-FR" dirty="0"/>
+              <a:t> ;</a:t>
             </a:r>
           </a:p>
           <a:p>
@@ -1802,30 +1880,13 @@
           <a:p>
             <a:r>
               <a:rPr lang="fr-FR" dirty="0"/>
-              <a:t>Encore une fois, en comparant alpha et </a:t>
-            </a:r>
-            <a:r>
-              <a:rPr lang="fr-FR" dirty="0" err="1"/>
-              <a:t>p_valeur</a:t>
-            </a:r>
+              <a:t>Ici, avec un niveau de test à 1%, les variances sont bien égales.</a:t>
+            </a:r>
+          </a:p>
+          <a:p>
             <a:r>
               <a:rPr lang="fr-FR" dirty="0"/>
-              <a:t>, on sait si les moyennes sont égales ou non</a:t>
-            </a:r>
-          </a:p>
-          <a:p>
-            <a:endParaRPr lang="fr-FR" dirty="0"/>
-          </a:p>
-          <a:p>
-            <a:r>
-              <a:rPr lang="fr-FR" dirty="0"/>
-              <a:t>CLICK </a:t>
-            </a:r>
-          </a:p>
-          <a:p>
-            <a:r>
-              <a:rPr lang="fr-FR" dirty="0"/>
-              <a:t>Ici, les moyennes diffèrent bien.</a:t>
+              <a:t>Les deux Clusters suivent donc la même loi normale.</a:t>
             </a:r>
           </a:p>
         </p:txBody>
@@ -1847,7 +1908,7 @@
           <a:p>
             <a:fld id="{F44DFA25-216B-4048-9E14-17772AFFB9C9}" type="slidenum">
               <a:rPr lang="fr-FR" smtClean="0"/>
-              <a:t>22</a:t>
+              <a:t>21</a:t>
             </a:fld>
             <a:endParaRPr lang="fr-FR"/>
           </a:p>
@@ -1856,7 +1917,7 @@
     </p:spTree>
     <p:extLst>
       <p:ext uri="{BB962C8B-B14F-4D97-AF65-F5344CB8AC3E}">
-        <p14:creationId xmlns:p14="http://schemas.microsoft.com/office/powerpoint/2010/main" val="1147614657"/>
+        <p14:creationId xmlns:p14="http://schemas.microsoft.com/office/powerpoint/2010/main" val="3666263677"/>
       </p:ext>
     </p:extLst>
   </p:cSld>
@@ -1910,7 +1971,56 @@
           <a:bodyPr/>
           <a:lstStyle/>
           <a:p>
+            <a:r>
+              <a:rPr lang="fr-FR" dirty="0"/>
+              <a:t>On utilise ici </a:t>
+            </a:r>
+            <a:r>
+              <a:rPr lang="fr-FR" dirty="0" err="1"/>
+              <a:t>scipy.stats.ttest_ind</a:t>
+            </a:r>
+            <a:r>
+              <a:rPr lang="fr-FR" dirty="0"/>
+              <a:t> pour comparer les deux Clusters </a:t>
+            </a:r>
+          </a:p>
+          <a:p>
+            <a:r>
+              <a:rPr lang="fr-FR" dirty="0"/>
+              <a:t>CLICK</a:t>
+            </a:r>
+          </a:p>
+          <a:p>
             <a:endParaRPr lang="fr-FR" dirty="0"/>
+          </a:p>
+          <a:p>
+            <a:r>
+              <a:rPr lang="fr-FR" dirty="0"/>
+              <a:t>Encore une fois, en comparant alpha et </a:t>
+            </a:r>
+            <a:r>
+              <a:rPr lang="fr-FR" dirty="0" err="1"/>
+              <a:t>p_valeur</a:t>
+            </a:r>
+            <a:r>
+              <a:rPr lang="fr-FR" dirty="0"/>
+              <a:t>, on sait si les moyennes sont égales ou non</a:t>
+            </a:r>
+          </a:p>
+          <a:p>
+            <a:endParaRPr lang="fr-FR" dirty="0"/>
+          </a:p>
+          <a:p>
+            <a:r>
+              <a:rPr lang="fr-FR" dirty="0"/>
+              <a:t>CLICK </a:t>
+            </a:r>
+          </a:p>
+          <a:p>
+            <a:r>
+              <a:rPr lang="fr-FR" dirty="0"/>
+              <a:t>Ici, les moyennes diffèrent bien.</a:t>
+            </a:r>
           </a:p>
         </p:txBody>
       </p:sp>
@@ -1931,7 +2041,7 @@
           <a:p>
             <a:fld id="{F44DFA25-216B-4048-9E14-17772AFFB9C9}" type="slidenum">
               <a:rPr lang="fr-FR" smtClean="0"/>
-              <a:t>23</a:t>
+              <a:t>22</a:t>
             </a:fld>
             <a:endParaRPr lang="fr-FR"/>
           </a:p>
@@ -1940,7 +2050,7 @@
     </p:spTree>
     <p:extLst>
       <p:ext uri="{BB962C8B-B14F-4D97-AF65-F5344CB8AC3E}">
-        <p14:creationId xmlns:p14="http://schemas.microsoft.com/office/powerpoint/2010/main" val="910795080"/>
+        <p14:creationId xmlns:p14="http://schemas.microsoft.com/office/powerpoint/2010/main" val="1147614657"/>
       </p:ext>
     </p:extLst>
   </p:cSld>
@@ -2013,9 +2123,9 @@
           <a:bodyPr/>
           <a:lstStyle/>
           <a:p>
-            <a:fld id="{5F05756B-5F5C-4EED-907C-E25857D58D0B}" type="slidenum">
+            <a:fld id="{F44DFA25-216B-4048-9E14-17772AFFB9C9}" type="slidenum">
               <a:rPr lang="fr-FR" smtClean="0"/>
-              <a:t>24</a:t>
+              <a:t>23</a:t>
             </a:fld>
             <a:endParaRPr lang="fr-FR"/>
           </a:p>
@@ -2024,7 +2134,7 @@
     </p:spTree>
     <p:extLst>
       <p:ext uri="{BB962C8B-B14F-4D97-AF65-F5344CB8AC3E}">
-        <p14:creationId xmlns:p14="http://schemas.microsoft.com/office/powerpoint/2010/main" val="268619433"/>
+        <p14:creationId xmlns:p14="http://schemas.microsoft.com/office/powerpoint/2010/main" val="910795080"/>
       </p:ext>
     </p:extLst>
   </p:cSld>
@@ -2190,18 +2300,7 @@
           <a:bodyPr/>
           <a:lstStyle/>
           <a:p>
-            <a:r>
-              <a:rPr lang="fr-FR" dirty="0"/>
-              <a:t>Remettre le </a:t>
-            </a:r>
-            <a:r>
-              <a:rPr lang="fr-FR" dirty="0" err="1"/>
-              <a:t>Df</a:t>
-            </a:r>
-            <a:r>
-              <a:rPr lang="fr-FR" dirty="0"/>
-              <a:t> sans la France et voir pour les émirats arabes unis</a:t>
-            </a:r>
+            <a:endParaRPr lang="fr-FR" dirty="0"/>
           </a:p>
         </p:txBody>
       </p:sp>
@@ -2220,6 +2319,161 @@
           <a:bodyPr/>
           <a:lstStyle/>
           <a:p>
+            <a:fld id="{5F05756B-5F5C-4EED-907C-E25857D58D0B}" type="slidenum">
+              <a:rPr lang="fr-FR" smtClean="0"/>
+              <a:t>24</a:t>
+            </a:fld>
+            <a:endParaRPr lang="fr-FR"/>
+          </a:p>
+        </p:txBody>
+      </p:sp>
+    </p:spTree>
+    <p:extLst>
+      <p:ext uri="{BB962C8B-B14F-4D97-AF65-F5344CB8AC3E}">
+        <p14:creationId xmlns:p14="http://schemas.microsoft.com/office/powerpoint/2010/main" val="268619433"/>
+      </p:ext>
+    </p:extLst>
+  </p:cSld>
+  <p:clrMapOvr>
+    <a:masterClrMapping/>
+  </p:clrMapOvr>
+</p:notes>
+</file>
+
+<file path=ppt/notesSlides/notesSlide21.xml><?xml version="1.0" encoding="utf-8"?>
+<p:notes xmlns:a="http://schemas.openxmlformats.org/drawingml/2006/main" xmlns:r="http://schemas.openxmlformats.org/officeDocument/2006/relationships" xmlns:p="http://schemas.openxmlformats.org/presentationml/2006/main">
+  <p:cSld>
+    <p:spTree>
+      <p:nvGrpSpPr>
+        <p:cNvPr id="1" name=""/>
+        <p:cNvGrpSpPr/>
+        <p:nvPr/>
+      </p:nvGrpSpPr>
+      <p:grpSpPr>
+        <a:xfrm>
+          <a:off x="0" y="0"/>
+          <a:ext cx="0" cy="0"/>
+          <a:chOff x="0" y="0"/>
+          <a:chExt cx="0" cy="0"/>
+        </a:xfrm>
+      </p:grpSpPr>
+      <p:sp>
+        <p:nvSpPr>
+          <p:cNvPr id="2" name="Espace réservé de l'image des diapositives 1"/>
+          <p:cNvSpPr>
+            <a:spLocks noGrp="1" noRot="1" noChangeAspect="1"/>
+          </p:cNvSpPr>
+          <p:nvPr>
+            <p:ph type="sldImg"/>
+          </p:nvPr>
+        </p:nvSpPr>
+        <p:spPr/>
+      </p:sp>
+      <p:sp>
+        <p:nvSpPr>
+          <p:cNvPr id="3" name="Espace réservé des notes 2"/>
+          <p:cNvSpPr>
+            <a:spLocks noGrp="1"/>
+          </p:cNvSpPr>
+          <p:nvPr>
+            <p:ph type="body" idx="1"/>
+          </p:nvPr>
+        </p:nvSpPr>
+        <p:spPr/>
+        <p:txBody>
+          <a:bodyPr/>
+          <a:lstStyle/>
+          <a:p>
+            <a:r>
+              <a:rPr lang="fr-FR" dirty="0"/>
+              <a:t>Voici la liste que nous avions obtenue plus tôt dans cette présentation. </a:t>
+            </a:r>
+          </a:p>
+          <a:p>
+            <a:endParaRPr lang="fr-FR" dirty="0"/>
+          </a:p>
+          <a:p>
+            <a:r>
+              <a:rPr lang="fr-FR" dirty="0"/>
+              <a:t>Les pays présents dans la liste sont les pays les plus intéressants, présentant des chiffres proches de ceux de la France, et permettent donc une implantation plus facile et avec moins de risques </a:t>
+            </a:r>
+          </a:p>
+          <a:p>
+            <a:endParaRPr lang="fr-FR" dirty="0"/>
+          </a:p>
+          <a:p>
+            <a:r>
+              <a:rPr lang="fr-FR" dirty="0"/>
+              <a:t>Cependant, on remarque que 3 pays sortent du lot sur un critère non négligeable : les facilités d'imports/exports ; </a:t>
+            </a:r>
+            <a:br>
+              <a:rPr lang="fr-FR" dirty="0"/>
+            </a:br>
+            <a:r>
+              <a:rPr lang="fr-FR" dirty="0"/>
+              <a:t>Les pays européens présentent un intérêt majeur : L'espace Schengen </a:t>
+            </a:r>
+          </a:p>
+          <a:p>
+            <a:endParaRPr lang="fr-FR" dirty="0"/>
+          </a:p>
+          <a:p>
+            <a:r>
+              <a:rPr lang="fr-FR" dirty="0"/>
+              <a:t>Ce dernier choix est beaucoup plus arbitraire que les précédents, cependant il s'inscrit dans une logique d'expansion en plusieurs phases : </a:t>
+            </a:r>
+            <a:br>
+              <a:rPr lang="fr-FR" dirty="0"/>
+            </a:br>
+            <a:endParaRPr lang="fr-FR" dirty="0"/>
+          </a:p>
+          <a:p>
+            <a:r>
+              <a:rPr lang="fr-FR" dirty="0"/>
+              <a:t>Phase 1 : S'implanter des dans pays développés, ayant déjà un marché d'import de viandes de volailles, et présentant des facilités (imports/exports, langue). </a:t>
+            </a:r>
+          </a:p>
+          <a:p>
+            <a:endParaRPr lang="fr-FR" dirty="0"/>
+          </a:p>
+          <a:p>
+            <a:r>
+              <a:rPr lang="fr-FR" dirty="0"/>
+              <a:t>Phase 2 : S'implanter dans les pays développés avec un marché d'import de viandes de volailles déjà présent, mais ne présentant pas de facilités particulières (Canada, Royaume-Uni, Hong Kong, Emirats Arabes Unis) </a:t>
+            </a:r>
+          </a:p>
+          <a:p>
+            <a:endParaRPr lang="fr-FR" dirty="0"/>
+          </a:p>
+          <a:p>
+            <a:r>
+              <a:rPr lang="fr-FR" dirty="0"/>
+              <a:t>Voici donc les 3 pays à regarder en priorité : </a:t>
+            </a:r>
+          </a:p>
+          <a:p>
+            <a:r>
+              <a:rPr lang="fr-FR" dirty="0"/>
+              <a:t>CLICK</a:t>
+            </a:r>
+          </a:p>
+        </p:txBody>
+      </p:sp>
+      <p:sp>
+        <p:nvSpPr>
+          <p:cNvPr id="4" name="Espace réservé du numéro de diapositive 3"/>
+          <p:cNvSpPr>
+            <a:spLocks noGrp="1"/>
+          </p:cNvSpPr>
+          <p:nvPr>
+            <p:ph type="sldNum" sz="quarter" idx="5"/>
+          </p:nvPr>
+        </p:nvSpPr>
+        <p:spPr/>
+        <p:txBody>
+          <a:bodyPr/>
+          <a:lstStyle/>
+          <a:p>
             <a:fld id="{F44DFA25-216B-4048-9E14-17772AFFB9C9}" type="slidenum">
               <a:rPr lang="fr-FR" smtClean="0"/>
               <a:t>25</a:t>
@@ -2232,6 +2486,90 @@
     <p:extLst>
       <p:ext uri="{BB962C8B-B14F-4D97-AF65-F5344CB8AC3E}">
         <p14:creationId xmlns:p14="http://schemas.microsoft.com/office/powerpoint/2010/main" val="2302832259"/>
+      </p:ext>
+    </p:extLst>
+  </p:cSld>
+  <p:clrMapOvr>
+    <a:masterClrMapping/>
+  </p:clrMapOvr>
+</p:notes>
+</file>
+
+<file path=ppt/notesSlides/notesSlide22.xml><?xml version="1.0" encoding="utf-8"?>
+<p:notes xmlns:a="http://schemas.openxmlformats.org/drawingml/2006/main" xmlns:r="http://schemas.openxmlformats.org/officeDocument/2006/relationships" xmlns:p="http://schemas.openxmlformats.org/presentationml/2006/main">
+  <p:cSld>
+    <p:spTree>
+      <p:nvGrpSpPr>
+        <p:cNvPr id="1" name=""/>
+        <p:cNvGrpSpPr/>
+        <p:nvPr/>
+      </p:nvGrpSpPr>
+      <p:grpSpPr>
+        <a:xfrm>
+          <a:off x="0" y="0"/>
+          <a:ext cx="0" cy="0"/>
+          <a:chOff x="0" y="0"/>
+          <a:chExt cx="0" cy="0"/>
+        </a:xfrm>
+      </p:grpSpPr>
+      <p:sp>
+        <p:nvSpPr>
+          <p:cNvPr id="2" name="Espace réservé de l'image des diapositives 1"/>
+          <p:cNvSpPr>
+            <a:spLocks noGrp="1" noRot="1" noChangeAspect="1"/>
+          </p:cNvSpPr>
+          <p:nvPr>
+            <p:ph type="sldImg"/>
+          </p:nvPr>
+        </p:nvSpPr>
+        <p:spPr/>
+      </p:sp>
+      <p:sp>
+        <p:nvSpPr>
+          <p:cNvPr id="3" name="Espace réservé des notes 2"/>
+          <p:cNvSpPr>
+            <a:spLocks noGrp="1"/>
+          </p:cNvSpPr>
+          <p:nvPr>
+            <p:ph type="body" idx="1"/>
+          </p:nvPr>
+        </p:nvSpPr>
+        <p:spPr/>
+        <p:txBody>
+          <a:bodyPr/>
+          <a:lstStyle/>
+          <a:p>
+            <a:endParaRPr lang="fr-FR" dirty="0"/>
+          </a:p>
+        </p:txBody>
+      </p:sp>
+      <p:sp>
+        <p:nvSpPr>
+          <p:cNvPr id="4" name="Espace réservé du numéro de diapositive 3"/>
+          <p:cNvSpPr>
+            <a:spLocks noGrp="1"/>
+          </p:cNvSpPr>
+          <p:nvPr>
+            <p:ph type="sldNum" sz="quarter" idx="5"/>
+          </p:nvPr>
+        </p:nvSpPr>
+        <p:spPr/>
+        <p:txBody>
+          <a:bodyPr/>
+          <a:lstStyle/>
+          <a:p>
+            <a:fld id="{5F05756B-5F5C-4EED-907C-E25857D58D0B}" type="slidenum">
+              <a:rPr lang="fr-FR" smtClean="0"/>
+              <a:t>26</a:t>
+            </a:fld>
+            <a:endParaRPr lang="fr-FR"/>
+          </a:p>
+        </p:txBody>
+      </p:sp>
+    </p:spTree>
+    <p:extLst>
+      <p:ext uri="{BB962C8B-B14F-4D97-AF65-F5344CB8AC3E}">
+        <p14:creationId xmlns:p14="http://schemas.microsoft.com/office/powerpoint/2010/main" val="1544918475"/>
       </p:ext>
     </p:extLst>
   </p:cSld>
@@ -2577,6 +2915,9 @@
               <a:t>Voici le dendrogramme</a:t>
             </a:r>
           </a:p>
+          <a:p>
+            <a:endParaRPr lang="fr-FR" dirty="0"/>
+          </a:p>
         </p:txBody>
       </p:sp>
       <p:sp>
@@ -2727,8 +3068,11 @@
           <a:p>
             <a:r>
               <a:rPr lang="fr-FR" dirty="0"/>
-              <a:t>Ajouter la liste du Cluster 7 </a:t>
-            </a:r>
+              <a:t>Différences entre les Clusters : </a:t>
+            </a:r>
+          </a:p>
+          <a:p>
+            <a:endParaRPr lang="fr-FR" dirty="0"/>
           </a:p>
         </p:txBody>
       </p:sp>
@@ -3089,7 +3433,7 @@
           <a:p>
             <a:fld id="{E565D739-1F39-46A1-82E5-C30CDDBD57CA}" type="datetimeFigureOut">
               <a:rPr lang="fr-FR" smtClean="0"/>
-              <a:t>24/04/2019</a:t>
+              <a:t>07/05/2019</a:t>
             </a:fld>
             <a:endParaRPr lang="fr-FR"/>
           </a:p>
@@ -3287,7 +3631,7 @@
           <a:p>
             <a:fld id="{E565D739-1F39-46A1-82E5-C30CDDBD57CA}" type="datetimeFigureOut">
               <a:rPr lang="fr-FR" smtClean="0"/>
-              <a:t>24/04/2019</a:t>
+              <a:t>07/05/2019</a:t>
             </a:fld>
             <a:endParaRPr lang="fr-FR"/>
           </a:p>
@@ -3495,7 +3839,7 @@
           <a:p>
             <a:fld id="{E565D739-1F39-46A1-82E5-C30CDDBD57CA}" type="datetimeFigureOut">
               <a:rPr lang="fr-FR" smtClean="0"/>
-              <a:t>24/04/2019</a:t>
+              <a:t>07/05/2019</a:t>
             </a:fld>
             <a:endParaRPr lang="fr-FR"/>
           </a:p>
@@ -3693,7 +4037,7 @@
           <a:p>
             <a:fld id="{E565D739-1F39-46A1-82E5-C30CDDBD57CA}" type="datetimeFigureOut">
               <a:rPr lang="fr-FR" smtClean="0"/>
-              <a:t>24/04/2019</a:t>
+              <a:t>07/05/2019</a:t>
             </a:fld>
             <a:endParaRPr lang="fr-FR"/>
           </a:p>
@@ -3968,7 +4312,7 @@
           <a:p>
             <a:fld id="{E565D739-1F39-46A1-82E5-C30CDDBD57CA}" type="datetimeFigureOut">
               <a:rPr lang="fr-FR" smtClean="0"/>
-              <a:t>24/04/2019</a:t>
+              <a:t>07/05/2019</a:t>
             </a:fld>
             <a:endParaRPr lang="fr-FR"/>
           </a:p>
@@ -4233,7 +4577,7 @@
           <a:p>
             <a:fld id="{E565D739-1F39-46A1-82E5-C30CDDBD57CA}" type="datetimeFigureOut">
               <a:rPr lang="fr-FR" smtClean="0"/>
-              <a:t>24/04/2019</a:t>
+              <a:t>07/05/2019</a:t>
             </a:fld>
             <a:endParaRPr lang="fr-FR"/>
           </a:p>
@@ -4645,7 +4989,7 @@
           <a:p>
             <a:fld id="{E565D739-1F39-46A1-82E5-C30CDDBD57CA}" type="datetimeFigureOut">
               <a:rPr lang="fr-FR" smtClean="0"/>
-              <a:t>24/04/2019</a:t>
+              <a:t>07/05/2019</a:t>
             </a:fld>
             <a:endParaRPr lang="fr-FR"/>
           </a:p>
@@ -4786,7 +5130,7 @@
           <a:p>
             <a:fld id="{E565D739-1F39-46A1-82E5-C30CDDBD57CA}" type="datetimeFigureOut">
               <a:rPr lang="fr-FR" smtClean="0"/>
-              <a:t>24/04/2019</a:t>
+              <a:t>07/05/2019</a:t>
             </a:fld>
             <a:endParaRPr lang="fr-FR"/>
           </a:p>
@@ -4899,7 +5243,7 @@
           <a:p>
             <a:fld id="{E565D739-1F39-46A1-82E5-C30CDDBD57CA}" type="datetimeFigureOut">
               <a:rPr lang="fr-FR" smtClean="0"/>
-              <a:t>24/04/2019</a:t>
+              <a:t>07/05/2019</a:t>
             </a:fld>
             <a:endParaRPr lang="fr-FR"/>
           </a:p>
@@ -5210,7 +5554,7 @@
           <a:p>
             <a:fld id="{E565D739-1F39-46A1-82E5-C30CDDBD57CA}" type="datetimeFigureOut">
               <a:rPr lang="fr-FR" smtClean="0"/>
-              <a:t>24/04/2019</a:t>
+              <a:t>07/05/2019</a:t>
             </a:fld>
             <a:endParaRPr lang="fr-FR"/>
           </a:p>
@@ -5498,7 +5842,7 @@
           <a:p>
             <a:fld id="{E565D739-1F39-46A1-82E5-C30CDDBD57CA}" type="datetimeFigureOut">
               <a:rPr lang="fr-FR" smtClean="0"/>
-              <a:t>24/04/2019</a:t>
+              <a:t>07/05/2019</a:t>
             </a:fld>
             <a:endParaRPr lang="fr-FR"/>
           </a:p>
@@ -5739,7 +6083,7 @@
           <a:p>
             <a:fld id="{E565D739-1F39-46A1-82E5-C30CDDBD57CA}" type="datetimeFigureOut">
               <a:rPr lang="fr-FR" smtClean="0"/>
-              <a:t>24/04/2019</a:t>
+              <a:t>07/05/2019</a:t>
             </a:fld>
             <a:endParaRPr lang="fr-FR"/>
           </a:p>
@@ -6664,13 +7008,13 @@
               </a:ext>
             </a:extLst>
           </a:blip>
-          <a:srcRect l="74879" t="48207" r="11914"/>
+          <a:srcRect l="74879" t="48207" r="11914" b="9771"/>
           <a:stretch/>
         </p:blipFill>
         <p:spPr>
           <a:xfrm rot="16200000">
-            <a:off x="3427355" y="-276198"/>
-            <a:ext cx="5321148" cy="8347116"/>
+            <a:off x="2639958" y="511199"/>
+            <a:ext cx="5321148" cy="6772321"/>
           </a:xfrm>
           <a:prstGeom prst="rect">
             <a:avLst/>
@@ -6726,6 +7070,216 @@
           <a:p>
             <a:pPr algn="ctr"/>
             <a:endParaRPr lang="fr-FR"/>
+          </a:p>
+        </p:txBody>
+      </p:sp>
+      <p:sp>
+        <p:nvSpPr>
+          <p:cNvPr id="3" name="ZoneTexte 2">
+            <a:extLst>
+              <a:ext uri="{FF2B5EF4-FFF2-40B4-BE49-F238E27FC236}">
+                <a16:creationId xmlns:a16="http://schemas.microsoft.com/office/drawing/2014/main" id="{56D30F1F-477D-4499-A72B-33DFA04AF920}"/>
+              </a:ext>
+            </a:extLst>
+          </p:cNvPr>
+          <p:cNvSpPr txBox="1"/>
+          <p:nvPr/>
+        </p:nvSpPr>
+        <p:spPr>
+          <a:xfrm>
+            <a:off x="8686692" y="1236785"/>
+            <a:ext cx="1778051" cy="5401479"/>
+          </a:xfrm>
+          <a:prstGeom prst="rect">
+            <a:avLst/>
+          </a:prstGeom>
+          <a:noFill/>
+        </p:spPr>
+        <p:txBody>
+          <a:bodyPr wrap="none" rtlCol="0">
+            <a:spAutoFit/>
+          </a:bodyPr>
+          <a:lstStyle/>
+          <a:p>
+            <a:r>
+              <a:rPr lang="fr-FR" sz="1150" dirty="0"/>
+              <a:t>Canada</a:t>
+            </a:r>
+          </a:p>
+          <a:p>
+            <a:r>
+              <a:rPr lang="fr-FR" sz="1150" dirty="0"/>
+              <a:t>Belgique</a:t>
+            </a:r>
+          </a:p>
+          <a:p>
+            <a:r>
+              <a:rPr lang="fr-FR" sz="1150" dirty="0"/>
+              <a:t>Etats-Unis d’Amérique</a:t>
+            </a:r>
+          </a:p>
+          <a:p>
+            <a:r>
+              <a:rPr lang="fr-FR" sz="1150" dirty="0"/>
+              <a:t>Autriche</a:t>
+            </a:r>
+          </a:p>
+          <a:p>
+            <a:r>
+              <a:rPr lang="fr-FR" sz="1150" dirty="0"/>
+              <a:t>Irlande</a:t>
+            </a:r>
+          </a:p>
+          <a:p>
+            <a:r>
+              <a:rPr lang="fr-FR" sz="1150" dirty="0"/>
+              <a:t>Suède</a:t>
+            </a:r>
+          </a:p>
+          <a:p>
+            <a:r>
+              <a:rPr lang="fr-FR" sz="1150" dirty="0"/>
+              <a:t>Danemark</a:t>
+            </a:r>
+          </a:p>
+          <a:p>
+            <a:r>
+              <a:rPr lang="fr-FR" sz="1150" dirty="0"/>
+              <a:t>Finlande</a:t>
+            </a:r>
+          </a:p>
+          <a:p>
+            <a:r>
+              <a:rPr lang="fr-FR" sz="1150" dirty="0"/>
+              <a:t>Israël</a:t>
+            </a:r>
+          </a:p>
+          <a:p>
+            <a:r>
+              <a:rPr lang="fr-FR" sz="1150" dirty="0"/>
+              <a:t>Irlande</a:t>
+            </a:r>
+          </a:p>
+          <a:p>
+            <a:r>
+              <a:rPr lang="fr-FR" sz="1150" dirty="0" err="1"/>
+              <a:t>Kowaït</a:t>
+            </a:r>
+            <a:endParaRPr lang="fr-FR" sz="1150" dirty="0"/>
+          </a:p>
+          <a:p>
+            <a:r>
+              <a:rPr lang="fr-FR" sz="1150" dirty="0"/>
+              <a:t>Royaume-Uni</a:t>
+            </a:r>
+          </a:p>
+          <a:p>
+            <a:r>
+              <a:rPr lang="fr-FR" sz="1150" dirty="0"/>
+              <a:t>France</a:t>
+            </a:r>
+          </a:p>
+          <a:p>
+            <a:r>
+              <a:rPr lang="fr-FR" sz="1150" dirty="0"/>
+              <a:t>Allemagne</a:t>
+            </a:r>
+          </a:p>
+          <a:p>
+            <a:r>
+              <a:rPr lang="fr-FR" sz="1150" dirty="0"/>
+              <a:t>Pays-Bas</a:t>
+            </a:r>
+          </a:p>
+          <a:p>
+            <a:r>
+              <a:rPr lang="fr-FR" sz="1150" dirty="0"/>
+              <a:t>Emirats Arabes Unis</a:t>
+            </a:r>
+          </a:p>
+          <a:p>
+            <a:r>
+              <a:rPr lang="fr-FR" sz="1150" dirty="0"/>
+              <a:t>Suisse</a:t>
+            </a:r>
+          </a:p>
+          <a:p>
+            <a:r>
+              <a:rPr lang="fr-FR" sz="1150" dirty="0"/>
+              <a:t>Australie</a:t>
+            </a:r>
+          </a:p>
+          <a:p>
+            <a:r>
+              <a:rPr lang="fr-FR" sz="1150" dirty="0"/>
+              <a:t>Bermudes</a:t>
+            </a:r>
+          </a:p>
+          <a:p>
+            <a:r>
+              <a:rPr lang="fr-FR" sz="1150" dirty="0"/>
+              <a:t>Norvège</a:t>
+            </a:r>
+          </a:p>
+          <a:p>
+            <a:r>
+              <a:rPr lang="fr-FR" sz="1150" dirty="0"/>
+              <a:t>Luxembourg</a:t>
+            </a:r>
+          </a:p>
+          <a:p>
+            <a:r>
+              <a:rPr lang="fr-FR" sz="1150" dirty="0"/>
+              <a:t>Chine – RAS de Macao</a:t>
+            </a:r>
+          </a:p>
+          <a:p>
+            <a:r>
+              <a:rPr lang="fr-FR" sz="1150" dirty="0"/>
+              <a:t>Chine – RAS de Hong-Kong</a:t>
+            </a:r>
+          </a:p>
+          <a:p>
+            <a:r>
+              <a:rPr lang="fr-FR" sz="1150" dirty="0"/>
+              <a:t>Arabie Saoudite</a:t>
+            </a:r>
+          </a:p>
+          <a:p>
+            <a:r>
+              <a:rPr lang="fr-FR" sz="1150" dirty="0"/>
+              <a:t>Mexique</a:t>
+            </a:r>
+          </a:p>
+          <a:p>
+            <a:r>
+              <a:rPr lang="fr-FR" sz="1150" dirty="0"/>
+              <a:t>Chine – Continentale</a:t>
+            </a:r>
+          </a:p>
+          <a:p>
+            <a:r>
+              <a:rPr lang="fr-FR" sz="1150" dirty="0"/>
+              <a:t>Fédération de Russie</a:t>
+            </a:r>
+          </a:p>
+          <a:p>
+            <a:r>
+              <a:rPr lang="fr-FR" sz="1150" dirty="0"/>
+              <a:t>Venezuela</a:t>
+            </a:r>
+          </a:p>
+          <a:p>
+            <a:r>
+              <a:rPr lang="fr-FR" sz="1150" dirty="0"/>
+              <a:t>Afrique du Sud</a:t>
+            </a:r>
+          </a:p>
+          <a:p>
+            <a:r>
+              <a:rPr lang="fr-FR" sz="1150" dirty="0"/>
+              <a:t>Japon</a:t>
+            </a:r>
           </a:p>
         </p:txBody>
       </p:sp>
@@ -6904,7 +7458,7 @@
                                 </p:cTn>
                               </p:par>
                               <p:par>
-                                <p:cTn id="17" presetID="1" presetClass="entr" presetSubtype="0" fill="hold" nodeType="withEffect">
+                                <p:cTn id="17" presetID="1" presetClass="entr" presetSubtype="0" fill="hold" grpId="0" nodeType="withEffect">
                                   <p:stCondLst>
                                     <p:cond delay="0"/>
                                   </p:stCondLst>
@@ -6912,6 +7466,33 @@
                                     <p:set>
                                       <p:cBhvr>
                                         <p:cTn id="18" dur="1" fill="hold">
+                                          <p:stCondLst>
+                                            <p:cond delay="0"/>
+                                          </p:stCondLst>
+                                        </p:cTn>
+                                        <p:tgtEl>
+                                          <p:spTgt spid="3"/>
+                                        </p:tgtEl>
+                                        <p:attrNameLst>
+                                          <p:attrName>style.visibility</p:attrName>
+                                        </p:attrNameLst>
+                                      </p:cBhvr>
+                                      <p:to>
+                                        <p:strVal val="visible"/>
+                                      </p:to>
+                                    </p:set>
+                                  </p:childTnLst>
+                                </p:cTn>
+                              </p:par>
+                              <p:par>
+                                <p:cTn id="19" presetID="1" presetClass="entr" presetSubtype="0" fill="hold" nodeType="withEffect">
+                                  <p:stCondLst>
+                                    <p:cond delay="0"/>
+                                  </p:stCondLst>
+                                  <p:childTnLst>
+                                    <p:set>
+                                      <p:cBhvr>
+                                        <p:cTn id="20" dur="1" fill="hold">
                                           <p:stCondLst>
                                             <p:cond delay="0"/>
                                           </p:stCondLst>
@@ -6960,6 +7541,7 @@
     <p:bldLst>
       <p:bldP spid="8" grpId="0" animBg="1"/>
       <p:bldP spid="8" grpId="1" animBg="1"/>
+      <p:bldP spid="3" grpId="0"/>
     </p:bldLst>
   </p:timing>
 </p:sld>
@@ -7316,10 +7898,10 @@
       </p:pic>
       <p:pic>
         <p:nvPicPr>
-          <p:cNvPr id="9" name="Image 8">
-            <a:extLst>
-              <a:ext uri="{FF2B5EF4-FFF2-40B4-BE49-F238E27FC236}">
-                <a16:creationId xmlns:a16="http://schemas.microsoft.com/office/drawing/2014/main" id="{C9230A34-03C6-493D-9CC9-6EAFF5EAD5AD}"/>
+          <p:cNvPr id="5" name="Image 4">
+            <a:extLst>
+              <a:ext uri="{FF2B5EF4-FFF2-40B4-BE49-F238E27FC236}">
+                <a16:creationId xmlns:a16="http://schemas.microsoft.com/office/drawing/2014/main" id="{FFE228B8-8829-444F-A15D-6FDE1E2E5437}"/>
               </a:ext>
             </a:extLst>
           </p:cNvPr>
@@ -7328,7 +7910,7 @@
           </p:cNvPicPr>
           <p:nvPr/>
         </p:nvPicPr>
-        <p:blipFill rotWithShape="1">
+        <p:blipFill>
           <a:blip r:embed="rId4">
             <a:extLst>
               <a:ext uri="{28A0092B-C50C-407E-A947-70E740481C1C}">
@@ -7336,13 +7918,14 @@
               </a:ext>
             </a:extLst>
           </a:blip>
-          <a:srcRect l="2027" t="4590" r="8322"/>
-          <a:stretch/>
+          <a:stretch>
+            <a:fillRect/>
+          </a:stretch>
         </p:blipFill>
         <p:spPr>
           <a:xfrm>
-            <a:off x="2475711" y="1385596"/>
-            <a:ext cx="7240578" cy="5137125"/>
+            <a:off x="2277666" y="1376362"/>
+            <a:ext cx="7636667" cy="5091111"/>
           </a:xfrm>
           <a:prstGeom prst="rect">
             <a:avLst/>
@@ -8895,10 +9478,10 @@
       </p:pic>
       <p:pic>
         <p:nvPicPr>
-          <p:cNvPr id="5" name="Image 4">
-            <a:extLst>
-              <a:ext uri="{FF2B5EF4-FFF2-40B4-BE49-F238E27FC236}">
-                <a16:creationId xmlns:a16="http://schemas.microsoft.com/office/drawing/2014/main" id="{C920E7A0-66D9-43B0-8D3E-20C2DA342A28}"/>
+          <p:cNvPr id="9" name="Image 8">
+            <a:extLst>
+              <a:ext uri="{FF2B5EF4-FFF2-40B4-BE49-F238E27FC236}">
+                <a16:creationId xmlns:a16="http://schemas.microsoft.com/office/drawing/2014/main" id="{1F6DA860-1872-4130-9A89-191353990418}"/>
               </a:ext>
             </a:extLst>
           </p:cNvPr>
@@ -8925,10 +9508,10 @@
       </p:pic>
       <p:pic>
         <p:nvPicPr>
-          <p:cNvPr id="6" name="Image 5">
-            <a:extLst>
-              <a:ext uri="{FF2B5EF4-FFF2-40B4-BE49-F238E27FC236}">
-                <a16:creationId xmlns:a16="http://schemas.microsoft.com/office/drawing/2014/main" id="{DDC1526B-72D8-4671-98A9-EF46A5FA01C9}"/>
+          <p:cNvPr id="3" name="Image 2">
+            <a:extLst>
+              <a:ext uri="{FF2B5EF4-FFF2-40B4-BE49-F238E27FC236}">
+                <a16:creationId xmlns:a16="http://schemas.microsoft.com/office/drawing/2014/main" id="{DA564157-FCA3-41AA-BC3E-63E24BDD6FB0}"/>
               </a:ext>
             </a:extLst>
           </p:cNvPr>
@@ -8945,8 +9528,8 @@
         </p:blipFill>
         <p:spPr>
           <a:xfrm>
-            <a:off x="253586" y="3049267"/>
-            <a:ext cx="11687368" cy="1795590"/>
+            <a:off x="1761255" y="365153"/>
+            <a:ext cx="8669489" cy="6127694"/>
           </a:xfrm>
           <a:prstGeom prst="rect">
             <a:avLst/>
@@ -8955,10 +9538,10 @@
       </p:pic>
       <p:pic>
         <p:nvPicPr>
-          <p:cNvPr id="7" name="Image 6">
-            <a:extLst>
-              <a:ext uri="{FF2B5EF4-FFF2-40B4-BE49-F238E27FC236}">
-                <a16:creationId xmlns:a16="http://schemas.microsoft.com/office/drawing/2014/main" id="{DD2ACCD4-4BB7-47F6-ADF5-2278C67468E9}"/>
+          <p:cNvPr id="10" name="Image 9">
+            <a:extLst>
+              <a:ext uri="{FF2B5EF4-FFF2-40B4-BE49-F238E27FC236}">
+                <a16:creationId xmlns:a16="http://schemas.microsoft.com/office/drawing/2014/main" id="{9A0D50CC-BBA7-40D7-AB67-2D2A2B6C0D41}"/>
               </a:ext>
             </a:extLst>
           </p:cNvPr>
@@ -8975,8 +9558,8 @@
         </p:blipFill>
         <p:spPr>
           <a:xfrm>
-            <a:off x="249776" y="2301574"/>
-            <a:ext cx="11688638" cy="3134026"/>
+            <a:off x="251046" y="2727278"/>
+            <a:ext cx="11687368" cy="1795590"/>
           </a:xfrm>
           <a:prstGeom prst="rect">
             <a:avLst/>
@@ -8985,10 +9568,10 @@
       </p:pic>
       <p:sp>
         <p:nvSpPr>
-          <p:cNvPr id="8" name="ZoneTexte 7">
-            <a:extLst>
-              <a:ext uri="{FF2B5EF4-FFF2-40B4-BE49-F238E27FC236}">
-                <a16:creationId xmlns:a16="http://schemas.microsoft.com/office/drawing/2014/main" id="{639A5ED9-ED07-4AC4-8FB9-5FCD4AB0962D}"/>
+          <p:cNvPr id="11" name="ZoneTexte 10">
+            <a:extLst>
+              <a:ext uri="{FF2B5EF4-FFF2-40B4-BE49-F238E27FC236}">
+                <a16:creationId xmlns:a16="http://schemas.microsoft.com/office/drawing/2014/main" id="{549B5C71-A737-43B6-9BE1-46AE0091BCA0}"/>
               </a:ext>
             </a:extLst>
           </p:cNvPr>
@@ -8997,7 +9580,7 @@
         </p:nvSpPr>
         <p:spPr>
           <a:xfrm>
-            <a:off x="3249827" y="5894173"/>
+            <a:off x="4504683" y="5834439"/>
             <a:ext cx="3178819" cy="369332"/>
           </a:xfrm>
           <a:prstGeom prst="rect">
@@ -9018,6 +9601,36 @@
           </a:p>
         </p:txBody>
       </p:sp>
+      <p:pic>
+        <p:nvPicPr>
+          <p:cNvPr id="12" name="Image 11">
+            <a:extLst>
+              <a:ext uri="{FF2B5EF4-FFF2-40B4-BE49-F238E27FC236}">
+                <a16:creationId xmlns:a16="http://schemas.microsoft.com/office/drawing/2014/main" id="{F85A96F0-F42A-4A25-9D57-6C4333CC9FE9}"/>
+              </a:ext>
+            </a:extLst>
+          </p:cNvPr>
+          <p:cNvPicPr>
+            <a:picLocks noChangeAspect="1"/>
+          </p:cNvPicPr>
+          <p:nvPr/>
+        </p:nvPicPr>
+        <p:blipFill>
+          <a:blip r:embed="rId7"/>
+          <a:stretch>
+            <a:fillRect/>
+          </a:stretch>
+        </p:blipFill>
+        <p:spPr>
+          <a:xfrm>
+            <a:off x="716437" y="1559819"/>
+            <a:ext cx="10755313" cy="3840582"/>
+          </a:xfrm>
+          <a:prstGeom prst="rect">
+            <a:avLst/>
+          </a:prstGeom>
+        </p:spPr>
+      </p:pic>
     </p:spTree>
     <p:extLst>
       <p:ext uri="{BB962C8B-B14F-4D97-AF65-F5344CB8AC3E}">
@@ -9062,7 +9675,7 @@
                                           </p:stCondLst>
                                         </p:cTn>
                                         <p:tgtEl>
-                                          <p:spTgt spid="5"/>
+                                          <p:spTgt spid="9"/>
                                         </p:tgtEl>
                                         <p:attrNameLst>
                                           <p:attrName>style.visibility</p:attrName>
@@ -9089,7 +9702,7 @@
                                           </p:stCondLst>
                                         </p:cTn>
                                         <p:tgtEl>
-                                          <p:spTgt spid="6"/>
+                                          <p:spTgt spid="3"/>
                                         </p:tgtEl>
                                         <p:attrNameLst>
                                           <p:attrName>style.visibility</p:attrName>
@@ -9134,7 +9747,7 @@
                                           </p:stCondLst>
                                         </p:cTn>
                                         <p:tgtEl>
-                                          <p:spTgt spid="6"/>
+                                          <p:spTgt spid="3"/>
                                         </p:tgtEl>
                                         <p:attrNameLst>
                                           <p:attrName>style.visibility</p:attrName>
@@ -9147,21 +9760,30 @@
                                   </p:childTnLst>
                                 </p:cTn>
                               </p:par>
+                            </p:childTnLst>
+                          </p:cTn>
+                        </p:par>
+                        <p:par>
+                          <p:cTn id="13" fill="hold">
+                            <p:stCondLst>
+                              <p:cond delay="0"/>
+                            </p:stCondLst>
+                            <p:childTnLst>
                               <p:par>
-                                <p:cTn id="13" presetID="1" presetClass="entr" presetSubtype="0" fill="hold" nodeType="withEffect">
+                                <p:cTn id="14" presetID="1" presetClass="entr" presetSubtype="0" fill="hold" nodeType="afterEffect">
                                   <p:stCondLst>
                                     <p:cond delay="0"/>
                                   </p:stCondLst>
                                   <p:childTnLst>
                                     <p:set>
                                       <p:cBhvr>
-                                        <p:cTn id="14" dur="1" fill="hold">
+                                        <p:cTn id="15" dur="1" fill="hold">
                                           <p:stCondLst>
                                             <p:cond delay="0"/>
                                           </p:stCondLst>
                                         </p:cTn>
                                         <p:tgtEl>
-                                          <p:spTgt spid="7"/>
+                                          <p:spTgt spid="10"/>
                                         </p:tgtEl>
                                         <p:attrNameLst>
                                           <p:attrName>style.visibility</p:attrName>
@@ -9181,32 +9803,113 @@
                     </p:cTn>
                   </p:par>
                   <p:par>
-                    <p:cTn id="15" fill="hold">
+                    <p:cTn id="16" fill="hold">
                       <p:stCondLst>
                         <p:cond delay="indefinite"/>
                       </p:stCondLst>
                       <p:childTnLst>
                         <p:par>
-                          <p:cTn id="16" fill="hold">
+                          <p:cTn id="17" fill="hold">
                             <p:stCondLst>
                               <p:cond delay="0"/>
                             </p:stCondLst>
                             <p:childTnLst>
                               <p:par>
-                                <p:cTn id="17" presetID="1" presetClass="entr" presetSubtype="0" fill="hold" grpId="0" nodeType="clickEffect">
+                                <p:cTn id="18" presetID="1" presetClass="exit" presetSubtype="0" fill="hold" nodeType="clickEffect">
                                   <p:stCondLst>
                                     <p:cond delay="0"/>
                                   </p:stCondLst>
                                   <p:childTnLst>
                                     <p:set>
                                       <p:cBhvr>
-                                        <p:cTn id="18" dur="1" fill="hold">
+                                        <p:cTn id="19" dur="1" fill="hold">
                                           <p:stCondLst>
                                             <p:cond delay="0"/>
                                           </p:stCondLst>
                                         </p:cTn>
                                         <p:tgtEl>
-                                          <p:spTgt spid="8"/>
+                                          <p:spTgt spid="10"/>
+                                        </p:tgtEl>
+                                        <p:attrNameLst>
+                                          <p:attrName>style.visibility</p:attrName>
+                                        </p:attrNameLst>
+                                      </p:cBhvr>
+                                      <p:to>
+                                        <p:strVal val="hidden"/>
+                                      </p:to>
+                                    </p:set>
+                                  </p:childTnLst>
+                                </p:cTn>
+                              </p:par>
+                            </p:childTnLst>
+                          </p:cTn>
+                        </p:par>
+                        <p:par>
+                          <p:cTn id="20" fill="hold">
+                            <p:stCondLst>
+                              <p:cond delay="0"/>
+                            </p:stCondLst>
+                            <p:childTnLst>
+                              <p:par>
+                                <p:cTn id="21" presetID="1" presetClass="entr" presetSubtype="0" fill="hold" nodeType="afterEffect">
+                                  <p:stCondLst>
+                                    <p:cond delay="0"/>
+                                  </p:stCondLst>
+                                  <p:childTnLst>
+                                    <p:set>
+                                      <p:cBhvr>
+                                        <p:cTn id="22" dur="1" fill="hold">
+                                          <p:stCondLst>
+                                            <p:cond delay="0"/>
+                                          </p:stCondLst>
+                                        </p:cTn>
+                                        <p:tgtEl>
+                                          <p:spTgt spid="12"/>
+                                        </p:tgtEl>
+                                        <p:attrNameLst>
+                                          <p:attrName>style.visibility</p:attrName>
+                                        </p:attrNameLst>
+                                      </p:cBhvr>
+                                      <p:to>
+                                        <p:strVal val="visible"/>
+                                      </p:to>
+                                    </p:set>
+                                  </p:childTnLst>
+                                </p:cTn>
+                              </p:par>
+                            </p:childTnLst>
+                          </p:cTn>
+                        </p:par>
+                      </p:childTnLst>
+                    </p:cTn>
+                  </p:par>
+                  <p:par>
+                    <p:cTn id="23" fill="hold">
+                      <p:stCondLst>
+                        <p:cond delay="indefinite"/>
+                      </p:stCondLst>
+                      <p:childTnLst>
+                        <p:par>
+                          <p:cTn id="24" fill="hold">
+                            <p:stCondLst>
+                              <p:cond delay="0"/>
+                            </p:stCondLst>
+                            <p:childTnLst>
+                              <p:par>
+                                <p:cTn id="25" presetID="1" presetClass="entr" presetSubtype="0" fill="hold" grpId="0" nodeType="clickEffect">
+                                  <p:stCondLst>
+                                    <p:cond delay="0"/>
+                                  </p:stCondLst>
+                                  <p:childTnLst>
+                                    <p:set>
+                                      <p:cBhvr>
+                                        <p:cTn id="26" dur="1" fill="hold">
+                                          <p:stCondLst>
+                                            <p:cond delay="0"/>
+                                          </p:stCondLst>
+                                        </p:cTn>
+                                        <p:tgtEl>
+                                          <p:spTgt spid="11"/>
                                         </p:tgtEl>
                                         <p:attrNameLst>
                                           <p:attrName>style.visibility</p:attrName>
@@ -9247,7 +9950,7 @@
       </p:par>
     </p:tnLst>
     <p:bldLst>
-      <p:bldP spid="8" grpId="0"/>
+      <p:bldP spid="11" grpId="0"/>
     </p:bldLst>
   </p:timing>
 </p:sld>
@@ -9382,7 +10085,7 @@
           <p:nvPr/>
         </p:nvPicPr>
         <p:blipFill>
-          <a:blip r:embed="rId2">
+          <a:blip r:embed="rId3">
             <a:extLst>
               <a:ext uri="{28A0092B-C50C-407E-A947-70E740481C1C}">
                 <a14:useLocalDpi xmlns:a14="http://schemas.microsoft.com/office/drawing/2010/main" val="0"/>
@@ -10733,12 +11436,174 @@
           </a:prstGeom>
         </p:spPr>
       </p:pic>
+      <p:sp>
+        <p:nvSpPr>
+          <p:cNvPr id="3" name="ZoneTexte 2">
+            <a:extLst>
+              <a:ext uri="{FF2B5EF4-FFF2-40B4-BE49-F238E27FC236}">
+                <a16:creationId xmlns:a16="http://schemas.microsoft.com/office/drawing/2014/main" id="{60EE723B-833B-46CE-9D05-F56FCD3E0679}"/>
+              </a:ext>
+            </a:extLst>
+          </p:cNvPr>
+          <p:cNvSpPr txBox="1"/>
+          <p:nvPr/>
+        </p:nvSpPr>
+        <p:spPr>
+          <a:xfrm>
+            <a:off x="662402" y="1882738"/>
+            <a:ext cx="6864672" cy="646331"/>
+          </a:xfrm>
+          <a:prstGeom prst="rect">
+            <a:avLst/>
+          </a:prstGeom>
+          <a:noFill/>
+        </p:spPr>
+        <p:txBody>
+          <a:bodyPr wrap="square" rtlCol="0">
+            <a:spAutoFit/>
+          </a:bodyPr>
+          <a:lstStyle/>
+          <a:p>
+            <a:r>
+              <a:rPr lang="fr-FR" dirty="0"/>
+              <a:t>Le but du test est de vérifier que nos Clusters diffèrent bien entre eux.</a:t>
+            </a:r>
+          </a:p>
+          <a:p>
+            <a:endParaRPr lang="fr-FR" dirty="0"/>
+          </a:p>
+        </p:txBody>
+      </p:sp>
+      <p:sp>
+        <p:nvSpPr>
+          <p:cNvPr id="6" name="ZoneTexte 5">
+            <a:extLst>
+              <a:ext uri="{FF2B5EF4-FFF2-40B4-BE49-F238E27FC236}">
+                <a16:creationId xmlns:a16="http://schemas.microsoft.com/office/drawing/2014/main" id="{B7D73A11-B1F2-4942-BD97-B71F61F5923D}"/>
+              </a:ext>
+            </a:extLst>
+          </p:cNvPr>
+          <p:cNvSpPr txBox="1"/>
+          <p:nvPr/>
+        </p:nvSpPr>
+        <p:spPr>
+          <a:xfrm>
+            <a:off x="662402" y="2829532"/>
+            <a:ext cx="7006213" cy="646331"/>
+          </a:xfrm>
+          <a:prstGeom prst="rect">
+            <a:avLst/>
+          </a:prstGeom>
+          <a:noFill/>
+        </p:spPr>
+        <p:txBody>
+          <a:bodyPr wrap="none" rtlCol="0">
+            <a:spAutoFit/>
+          </a:bodyPr>
+          <a:lstStyle/>
+          <a:p>
+            <a:r>
+              <a:rPr lang="fr-FR" dirty="0"/>
+              <a:t>Analyse de la variance : </a:t>
+            </a:r>
+          </a:p>
+          <a:p>
+            <a:r>
+              <a:rPr lang="fr-FR" dirty="0"/>
+              <a:t>Permet de confirmer que nos variables suivent bien la même loi normale</a:t>
+            </a:r>
+          </a:p>
+        </p:txBody>
+      </p:sp>
+      <p:sp>
+        <p:nvSpPr>
+          <p:cNvPr id="7" name="ZoneTexte 6">
+            <a:extLst>
+              <a:ext uri="{FF2B5EF4-FFF2-40B4-BE49-F238E27FC236}">
+                <a16:creationId xmlns:a16="http://schemas.microsoft.com/office/drawing/2014/main" id="{B8007079-9ED0-4E82-8BAE-760487DB89D4}"/>
+              </a:ext>
+            </a:extLst>
+          </p:cNvPr>
+          <p:cNvSpPr txBox="1"/>
+          <p:nvPr/>
+        </p:nvSpPr>
+        <p:spPr>
+          <a:xfrm>
+            <a:off x="662402" y="3936201"/>
+            <a:ext cx="6187591" cy="646331"/>
+          </a:xfrm>
+          <a:prstGeom prst="rect">
+            <a:avLst/>
+          </a:prstGeom>
+          <a:noFill/>
+        </p:spPr>
+        <p:txBody>
+          <a:bodyPr wrap="none" rtlCol="0">
+            <a:spAutoFit/>
+          </a:bodyPr>
+          <a:lstStyle/>
+          <a:p>
+            <a:r>
+              <a:rPr lang="fr-FR" dirty="0"/>
+              <a:t>Analyse de la moyenne : </a:t>
+            </a:r>
+          </a:p>
+          <a:p>
+            <a:r>
+              <a:rPr lang="fr-FR" dirty="0"/>
+              <a:t>Permet de confirmer que nos variables diffèrent bien entre elles</a:t>
+            </a:r>
+          </a:p>
+        </p:txBody>
+      </p:sp>
+      <p:sp>
+        <p:nvSpPr>
+          <p:cNvPr id="8" name="ZoneTexte 7">
+            <a:extLst>
+              <a:ext uri="{FF2B5EF4-FFF2-40B4-BE49-F238E27FC236}">
+                <a16:creationId xmlns:a16="http://schemas.microsoft.com/office/drawing/2014/main" id="{42C273F6-5402-4505-9A0F-5161C6202E5C}"/>
+              </a:ext>
+            </a:extLst>
+          </p:cNvPr>
+          <p:cNvSpPr txBox="1"/>
+          <p:nvPr/>
+        </p:nvSpPr>
+        <p:spPr>
+          <a:xfrm>
+            <a:off x="869795" y="5062654"/>
+            <a:ext cx="4115037" cy="646331"/>
+          </a:xfrm>
+          <a:prstGeom prst="rect">
+            <a:avLst/>
+          </a:prstGeom>
+          <a:noFill/>
+        </p:spPr>
+        <p:txBody>
+          <a:bodyPr wrap="none" rtlCol="0">
+            <a:spAutoFit/>
+          </a:bodyPr>
+          <a:lstStyle/>
+          <a:p>
+            <a:r>
+              <a:rPr lang="fr-FR" dirty="0"/>
+              <a:t>Si le test est concluant, alors on obtient :</a:t>
+            </a:r>
+          </a:p>
+          <a:p>
+            <a:r>
+              <a:rPr lang="fr-FR" i="1" dirty="0"/>
+              <a:t> </a:t>
+            </a:r>
+            <a:endParaRPr lang="fr-FR" dirty="0"/>
+          </a:p>
+        </p:txBody>
+      </p:sp>
       <p:pic>
         <p:nvPicPr>
-          <p:cNvPr id="15" name="Image 14">
-            <a:extLst>
-              <a:ext uri="{FF2B5EF4-FFF2-40B4-BE49-F238E27FC236}">
-                <a16:creationId xmlns:a16="http://schemas.microsoft.com/office/drawing/2014/main" id="{87E37925-0385-4E5A-B44C-9DC0EF09C648}"/>
+          <p:cNvPr id="9" name="Image 8">
+            <a:extLst>
+              <a:ext uri="{FF2B5EF4-FFF2-40B4-BE49-F238E27FC236}">
+                <a16:creationId xmlns:a16="http://schemas.microsoft.com/office/drawing/2014/main" id="{02F86BB7-F3EC-4E82-9B9F-61CD38CEDDF6}"/>
               </a:ext>
             </a:extLst>
           </p:cNvPr>
@@ -10748,99 +11613,100 @@
           <p:nvPr/>
         </p:nvPicPr>
         <p:blipFill>
-          <a:blip r:embed="rId4">
-            <a:extLst>
-              <a:ext uri="{28A0092B-C50C-407E-A947-70E740481C1C}">
-                <a14:useLocalDpi xmlns:a14="http://schemas.microsoft.com/office/drawing/2010/main" val="0"/>
-              </a:ext>
-            </a:extLst>
-          </a:blip>
+          <a:blip r:embed="rId4"/>
           <a:stretch>
             <a:fillRect/>
           </a:stretch>
         </p:blipFill>
         <p:spPr>
           <a:xfrm>
-            <a:off x="2019299" y="1422400"/>
-            <a:ext cx="8153401" cy="5435600"/>
+            <a:off x="869795" y="5489910"/>
+            <a:ext cx="1562100" cy="438150"/>
           </a:xfrm>
           <a:prstGeom prst="rect">
             <a:avLst/>
           </a:prstGeom>
         </p:spPr>
       </p:pic>
-      <p:pic>
-        <p:nvPicPr>
-          <p:cNvPr id="17" name="Image 16">
-            <a:extLst>
-              <a:ext uri="{FF2B5EF4-FFF2-40B4-BE49-F238E27FC236}">
-                <a16:creationId xmlns:a16="http://schemas.microsoft.com/office/drawing/2014/main" id="{9E28E25D-A14B-48E8-972E-549B4E5AE219}"/>
-              </a:ext>
-            </a:extLst>
-          </p:cNvPr>
-          <p:cNvPicPr>
-            <a:picLocks noChangeAspect="1"/>
-          </p:cNvPicPr>
+      <p:sp>
+        <p:nvSpPr>
+          <p:cNvPr id="10" name="ZoneTexte 9">
+            <a:extLst>
+              <a:ext uri="{FF2B5EF4-FFF2-40B4-BE49-F238E27FC236}">
+                <a16:creationId xmlns:a16="http://schemas.microsoft.com/office/drawing/2014/main" id="{816D9577-BEC0-4E7F-89D2-5E2B9F68A3C4}"/>
+              </a:ext>
+            </a:extLst>
+          </p:cNvPr>
+          <p:cNvSpPr txBox="1"/>
           <p:nvPr/>
-        </p:nvPicPr>
-        <p:blipFill>
-          <a:blip r:embed="rId5">
-            <a:extLst>
-              <a:ext uri="{28A0092B-C50C-407E-A947-70E740481C1C}">
-                <a14:useLocalDpi xmlns:a14="http://schemas.microsoft.com/office/drawing/2010/main" val="0"/>
-              </a:ext>
-            </a:extLst>
-          </a:blip>
-          <a:stretch>
-            <a:fillRect/>
-          </a:stretch>
-        </p:blipFill>
+        </p:nvSpPr>
         <p:spPr>
           <a:xfrm>
-            <a:off x="2019299" y="1422399"/>
-            <a:ext cx="8153401" cy="5435601"/>
+            <a:off x="869795" y="6004441"/>
+            <a:ext cx="5413277" cy="369332"/>
           </a:xfrm>
           <a:prstGeom prst="rect">
             <a:avLst/>
           </a:prstGeom>
+          <a:noFill/>
         </p:spPr>
-      </p:pic>
-      <p:pic>
-        <p:nvPicPr>
-          <p:cNvPr id="19" name="Image 18">
-            <a:extLst>
-              <a:ext uri="{FF2B5EF4-FFF2-40B4-BE49-F238E27FC236}">
-                <a16:creationId xmlns:a16="http://schemas.microsoft.com/office/drawing/2014/main" id="{3060126B-D2D4-46B9-9707-25D5343E30F1}"/>
-              </a:ext>
-            </a:extLst>
-          </p:cNvPr>
-          <p:cNvPicPr>
-            <a:picLocks noChangeAspect="1"/>
-          </p:cNvPicPr>
-          <p:nvPr/>
-        </p:nvPicPr>
-        <p:blipFill>
-          <a:blip r:embed="rId6">
-            <a:extLst>
-              <a:ext uri="{28A0092B-C50C-407E-A947-70E740481C1C}">
-                <a14:useLocalDpi xmlns:a14="http://schemas.microsoft.com/office/drawing/2010/main" val="0"/>
-              </a:ext>
-            </a:extLst>
-          </a:blip>
-          <a:stretch>
-            <a:fillRect/>
-          </a:stretch>
-        </p:blipFill>
-        <p:spPr>
-          <a:xfrm>
-            <a:off x="2019298" y="1422398"/>
-            <a:ext cx="8153401" cy="5435601"/>
-          </a:xfrm>
-          <a:prstGeom prst="rect">
-            <a:avLst/>
-          </a:prstGeom>
-        </p:spPr>
-      </p:pic>
+        <p:txBody>
+          <a:bodyPr wrap="none" rtlCol="0">
+            <a:spAutoFit/>
+          </a:bodyPr>
+          <a:lstStyle/>
+          <a:p>
+            <a:r>
+              <a:rPr lang="fr-FR" b="1" dirty="0">
+                <a:solidFill>
+                  <a:srgbClr val="FF0000"/>
+                </a:solidFill>
+              </a:rPr>
+              <a:t>Où </a:t>
+            </a:r>
+            <a:r>
+              <a:rPr lang="el-GR" b="1" i="1" dirty="0">
+                <a:solidFill>
+                  <a:srgbClr val="FF0000"/>
+                </a:solidFill>
+              </a:rPr>
+              <a:t>σ</a:t>
+            </a:r>
+            <a:r>
+              <a:rPr lang="el-GR" b="1" baseline="30000" dirty="0">
+                <a:solidFill>
+                  <a:srgbClr val="FF0000"/>
+                </a:solidFill>
+              </a:rPr>
+              <a:t>2</a:t>
+            </a:r>
+            <a:r>
+              <a:rPr lang="fr-FR" b="1" dirty="0">
+                <a:solidFill>
+                  <a:srgbClr val="FF0000"/>
+                </a:solidFill>
+              </a:rPr>
+              <a:t> est toujours le même et </a:t>
+            </a:r>
+            <a:r>
+              <a:rPr lang="el-GR" b="1" i="1" dirty="0">
+                <a:solidFill>
+                  <a:srgbClr val="FF0000"/>
+                </a:solidFill>
+              </a:rPr>
+              <a:t>μ</a:t>
+            </a:r>
+            <a:r>
+              <a:rPr lang="fr-FR" b="1" dirty="0">
+                <a:solidFill>
+                  <a:srgbClr val="FF0000"/>
+                </a:solidFill>
+              </a:rPr>
+              <a:t> diffère selon le Cluster</a:t>
+            </a:r>
+          </a:p>
+        </p:txBody>
+      </p:sp>
     </p:spTree>
     <p:extLst>
       <p:ext uri="{BB962C8B-B14F-4D97-AF65-F5344CB8AC3E}">
@@ -10872,7 +11738,7 @@
                             </p:stCondLst>
                             <p:childTnLst>
                               <p:par>
-                                <p:cTn id="5" presetID="1" presetClass="entr" presetSubtype="0" fill="hold" nodeType="clickEffect">
+                                <p:cTn id="5" presetID="1" presetClass="entr" presetSubtype="0" fill="hold" grpId="0" nodeType="clickEffect">
                                   <p:stCondLst>
                                     <p:cond delay="0"/>
                                   </p:stCondLst>
@@ -10885,7 +11751,7 @@
                                           </p:stCondLst>
                                         </p:cTn>
                                         <p:tgtEl>
-                                          <p:spTgt spid="17"/>
+                                          <p:spTgt spid="3"/>
                                         </p:tgtEl>
                                         <p:attrNameLst>
                                           <p:attrName>style.visibility</p:attrName>
@@ -10917,7 +11783,7 @@
                             </p:stCondLst>
                             <p:childTnLst>
                               <p:par>
-                                <p:cTn id="9" presetID="1" presetClass="entr" presetSubtype="0" fill="hold" nodeType="clickEffect">
+                                <p:cTn id="9" presetID="1" presetClass="entr" presetSubtype="0" fill="hold" grpId="0" nodeType="clickEffect">
                                   <p:stCondLst>
                                     <p:cond delay="0"/>
                                   </p:stCondLst>
@@ -10930,7 +11796,169 @@
                                           </p:stCondLst>
                                         </p:cTn>
                                         <p:tgtEl>
-                                          <p:spTgt spid="19"/>
+                                          <p:spTgt spid="6"/>
+                                        </p:tgtEl>
+                                        <p:attrNameLst>
+                                          <p:attrName>style.visibility</p:attrName>
+                                        </p:attrNameLst>
+                                      </p:cBhvr>
+                                      <p:to>
+                                        <p:strVal val="visible"/>
+                                      </p:to>
+                                    </p:set>
+                                  </p:childTnLst>
+                                </p:cTn>
+                              </p:par>
+                            </p:childTnLst>
+                          </p:cTn>
+                        </p:par>
+                      </p:childTnLst>
+                    </p:cTn>
+                  </p:par>
+                  <p:par>
+                    <p:cTn id="11" fill="hold">
+                      <p:stCondLst>
+                        <p:cond delay="indefinite"/>
+                      </p:stCondLst>
+                      <p:childTnLst>
+                        <p:par>
+                          <p:cTn id="12" fill="hold">
+                            <p:stCondLst>
+                              <p:cond delay="0"/>
+                            </p:stCondLst>
+                            <p:childTnLst>
+                              <p:par>
+                                <p:cTn id="13" presetID="1" presetClass="entr" presetSubtype="0" fill="hold" grpId="0" nodeType="clickEffect">
+                                  <p:stCondLst>
+                                    <p:cond delay="0"/>
+                                  </p:stCondLst>
+                                  <p:childTnLst>
+                                    <p:set>
+                                      <p:cBhvr>
+                                        <p:cTn id="14" dur="1" fill="hold">
+                                          <p:stCondLst>
+                                            <p:cond delay="0"/>
+                                          </p:stCondLst>
+                                        </p:cTn>
+                                        <p:tgtEl>
+                                          <p:spTgt spid="7"/>
+                                        </p:tgtEl>
+                                        <p:attrNameLst>
+                                          <p:attrName>style.visibility</p:attrName>
+                                        </p:attrNameLst>
+                                      </p:cBhvr>
+                                      <p:to>
+                                        <p:strVal val="visible"/>
+                                      </p:to>
+                                    </p:set>
+                                  </p:childTnLst>
+                                </p:cTn>
+                              </p:par>
+                            </p:childTnLst>
+                          </p:cTn>
+                        </p:par>
+                      </p:childTnLst>
+                    </p:cTn>
+                  </p:par>
+                  <p:par>
+                    <p:cTn id="15" fill="hold">
+                      <p:stCondLst>
+                        <p:cond delay="indefinite"/>
+                      </p:stCondLst>
+                      <p:childTnLst>
+                        <p:par>
+                          <p:cTn id="16" fill="hold">
+                            <p:stCondLst>
+                              <p:cond delay="0"/>
+                            </p:stCondLst>
+                            <p:childTnLst>
+                              <p:par>
+                                <p:cTn id="17" presetID="1" presetClass="entr" presetSubtype="0" fill="hold" grpId="0" nodeType="clickEffect">
+                                  <p:stCondLst>
+                                    <p:cond delay="0"/>
+                                  </p:stCondLst>
+                                  <p:childTnLst>
+                                    <p:set>
+                                      <p:cBhvr>
+                                        <p:cTn id="18" dur="1" fill="hold">
+                                          <p:stCondLst>
+                                            <p:cond delay="0"/>
+                                          </p:stCondLst>
+                                        </p:cTn>
+                                        <p:tgtEl>
+                                          <p:spTgt spid="8"/>
+                                        </p:tgtEl>
+                                        <p:attrNameLst>
+                                          <p:attrName>style.visibility</p:attrName>
+                                        </p:attrNameLst>
+                                      </p:cBhvr>
+                                      <p:to>
+                                        <p:strVal val="visible"/>
+                                      </p:to>
+                                    </p:set>
+                                  </p:childTnLst>
+                                </p:cTn>
+                              </p:par>
+                              <p:par>
+                                <p:cTn id="19" presetID="1" presetClass="entr" presetSubtype="0" fill="hold" nodeType="withEffect">
+                                  <p:stCondLst>
+                                    <p:cond delay="0"/>
+                                  </p:stCondLst>
+                                  <p:childTnLst>
+                                    <p:set>
+                                      <p:cBhvr>
+                                        <p:cTn id="20" dur="1" fill="hold">
+                                          <p:stCondLst>
+                                            <p:cond delay="0"/>
+                                          </p:stCondLst>
+                                        </p:cTn>
+                                        <p:tgtEl>
+                                          <p:spTgt spid="9"/>
+                                        </p:tgtEl>
+                                        <p:attrNameLst>
+                                          <p:attrName>style.visibility</p:attrName>
+                                        </p:attrNameLst>
+                                      </p:cBhvr>
+                                      <p:to>
+                                        <p:strVal val="visible"/>
+                                      </p:to>
+                                    </p:set>
+                                  </p:childTnLst>
+                                </p:cTn>
+                              </p:par>
+                            </p:childTnLst>
+                          </p:cTn>
+                        </p:par>
+                      </p:childTnLst>
+                    </p:cTn>
+                  </p:par>
+                  <p:par>
+                    <p:cTn id="21" fill="hold">
+                      <p:stCondLst>
+                        <p:cond delay="indefinite"/>
+                      </p:stCondLst>
+                      <p:childTnLst>
+                        <p:par>
+                          <p:cTn id="22" fill="hold">
+                            <p:stCondLst>
+                              <p:cond delay="0"/>
+                            </p:stCondLst>
+                            <p:childTnLst>
+                              <p:par>
+                                <p:cTn id="23" presetID="1" presetClass="entr" presetSubtype="0" fill="hold" grpId="0" nodeType="clickEffect">
+                                  <p:stCondLst>
+                                    <p:cond delay="0"/>
+                                  </p:stCondLst>
+                                  <p:childTnLst>
+                                    <p:set>
+                                      <p:cBhvr>
+                                        <p:cTn id="24" dur="1" fill="hold">
+                                          <p:stCondLst>
+                                            <p:cond delay="0"/>
+                                          </p:stCondLst>
+                                        </p:cTn>
+                                        <p:tgtEl>
+                                          <p:spTgt spid="10"/>
                                         </p:tgtEl>
                                         <p:attrNameLst>
                                           <p:attrName>style.visibility</p:attrName>
@@ -10970,6 +11998,13 @@
         </p:cTn>
       </p:par>
     </p:tnLst>
+    <p:bldLst>
+      <p:bldP spid="3" grpId="0"/>
+      <p:bldP spid="6" grpId="0"/>
+      <p:bldP spid="7" grpId="0"/>
+      <p:bldP spid="8" grpId="0"/>
+      <p:bldP spid="10" grpId="0"/>
+    </p:bldLst>
   </p:timing>
 </p:sld>
 </file>
@@ -13499,7 +14534,7 @@
           <p:cNvPr id="5" name="Image 4">
             <a:extLst>
               <a:ext uri="{FF2B5EF4-FFF2-40B4-BE49-F238E27FC236}">
-                <a16:creationId xmlns:a16="http://schemas.microsoft.com/office/drawing/2014/main" id="{824F6203-BA09-410E-8D33-8BB403704249}"/>
+                <a16:creationId xmlns:a16="http://schemas.microsoft.com/office/drawing/2014/main" id="{C11F3868-BF08-449A-9072-A0BD01B01061}"/>
               </a:ext>
             </a:extLst>
           </p:cNvPr>
@@ -13516,8 +14551,38 @@
         </p:blipFill>
         <p:spPr>
           <a:xfrm>
-            <a:off x="249776" y="2275070"/>
-            <a:ext cx="11688638" cy="3134026"/>
+            <a:off x="716437" y="1559819"/>
+            <a:ext cx="10755313" cy="3840582"/>
+          </a:xfrm>
+          <a:prstGeom prst="rect">
+            <a:avLst/>
+          </a:prstGeom>
+        </p:spPr>
+      </p:pic>
+      <p:pic>
+        <p:nvPicPr>
+          <p:cNvPr id="6" name="Image 5">
+            <a:extLst>
+              <a:ext uri="{FF2B5EF4-FFF2-40B4-BE49-F238E27FC236}">
+                <a16:creationId xmlns:a16="http://schemas.microsoft.com/office/drawing/2014/main" id="{670D63C1-4909-4BC0-833D-3F9465D54EC0}"/>
+              </a:ext>
+            </a:extLst>
+          </p:cNvPr>
+          <p:cNvPicPr>
+            <a:picLocks noChangeAspect="1"/>
+          </p:cNvPicPr>
+          <p:nvPr/>
+        </p:nvPicPr>
+        <p:blipFill>
+          <a:blip r:embed="rId5"/>
+          <a:stretch>
+            <a:fillRect/>
+          </a:stretch>
+        </p:blipFill>
+        <p:spPr>
+          <a:xfrm>
+            <a:off x="627240" y="2628960"/>
+            <a:ext cx="10933705" cy="1702299"/>
           </a:xfrm>
           <a:prstGeom prst="rect">
             <a:avLst/>
@@ -13546,9 +14611,6 @@
                     <p:cTn id="3" fill="hold">
                       <p:stCondLst>
                         <p:cond delay="indefinite"/>
-                        <p:cond evt="onBegin" delay="0">
-                          <p:tn val="2"/>
-                        </p:cond>
                       </p:stCondLst>
                       <p:childTnLst>
                         <p:par>
@@ -13558,7 +14620,7 @@
                             </p:stCondLst>
                             <p:childTnLst>
                               <p:par>
-                                <p:cTn id="5" presetID="1" presetClass="entr" presetSubtype="0" fill="hold" nodeType="withEffect">
+                                <p:cTn id="5" presetID="1" presetClass="exit" presetSubtype="0" fill="hold" nodeType="clickEffect">
                                   <p:stCondLst>
                                     <p:cond delay="0"/>
                                   </p:stCondLst>
@@ -13572,6 +14634,33 @@
                                         </p:cTn>
                                         <p:tgtEl>
                                           <p:spTgt spid="5"/>
+                                        </p:tgtEl>
+                                        <p:attrNameLst>
+                                          <p:attrName>style.visibility</p:attrName>
+                                        </p:attrNameLst>
+                                      </p:cBhvr>
+                                      <p:to>
+                                        <p:strVal val="hidden"/>
+                                      </p:to>
+                                    </p:set>
+                                  </p:childTnLst>
+                                </p:cTn>
+                              </p:par>
+                              <p:par>
+                                <p:cTn id="7" presetID="1" presetClass="entr" presetSubtype="0" fill="hold" nodeType="withEffect">
+                                  <p:stCondLst>
+                                    <p:cond delay="0"/>
+                                  </p:stCondLst>
+                                  <p:childTnLst>
+                                    <p:set>
+                                      <p:cBhvr>
+                                        <p:cTn id="8" dur="1" fill="hold">
+                                          <p:stCondLst>
+                                            <p:cond delay="0"/>
+                                          </p:stCondLst>
+                                        </p:cTn>
+                                        <p:tgtEl>
+                                          <p:spTgt spid="6"/>
                                         </p:tgtEl>
                                         <p:attrNameLst>
                                           <p:attrName>style.visibility</p:attrName>
@@ -13618,6 +14707,17 @@
 <file path=ppt/slides/slide26.xml><?xml version="1.0" encoding="utf-8"?>
 <p:sld xmlns:a="http://schemas.openxmlformats.org/drawingml/2006/main" xmlns:r="http://schemas.openxmlformats.org/officeDocument/2006/relationships" xmlns:p="http://schemas.openxmlformats.org/presentationml/2006/main">
   <p:cSld>
+    <p:bg>
+      <p:bgPr>
+        <a:solidFill>
+          <a:schemeClr val="bg1">
+            <a:tint val="95000"/>
+            <a:satMod val="170000"/>
+          </a:schemeClr>
+        </a:solidFill>
+        <a:effectLst/>
+      </p:bgPr>
+    </p:bg>
     <p:spTree>
       <p:nvGrpSpPr>
         <p:cNvPr id="1" name=""/>
@@ -13637,7 +14737,7 @@
           <p:cNvPr id="2" name="Titre 1">
             <a:extLst>
               <a:ext uri="{FF2B5EF4-FFF2-40B4-BE49-F238E27FC236}">
-                <a16:creationId xmlns:a16="http://schemas.microsoft.com/office/drawing/2014/main" id="{CAA876EA-FED9-49A0-94CB-4283459215B9}"/>
+                <a16:creationId xmlns:a16="http://schemas.microsoft.com/office/drawing/2014/main" id="{612FA98D-5214-442A-97A7-973984024AE3}"/>
               </a:ext>
             </a:extLst>
           </p:cNvPr>
@@ -13645,61 +14745,203 @@
             <a:spLocks noGrp="1"/>
           </p:cNvSpPr>
           <p:nvPr>
-            <p:ph type="ctrTitle"/>
+            <p:ph type="title"/>
           </p:nvPr>
         </p:nvSpPr>
         <p:spPr>
           <a:xfrm>
-            <a:off x="1524000" y="335279"/>
-            <a:ext cx="9144000" cy="1041083"/>
+            <a:off x="6746628" y="1783959"/>
+            <a:ext cx="4645250" cy="2889114"/>
           </a:xfrm>
         </p:spPr>
         <p:txBody>
-          <a:bodyPr/>
-          <a:lstStyle/>
-          <a:p>
-            <a:endParaRPr lang="fr-FR" dirty="0"/>
-          </a:p>
-        </p:txBody>
-      </p:sp>
-      <p:sp>
-        <p:nvSpPr>
-          <p:cNvPr id="3" name="Sous-titre 2">
-            <a:extLst>
-              <a:ext uri="{FF2B5EF4-FFF2-40B4-BE49-F238E27FC236}">
-                <a16:creationId xmlns:a16="http://schemas.microsoft.com/office/drawing/2014/main" id="{218B9057-36A2-4CEF-8698-A320933B4FB0}"/>
-              </a:ext>
-            </a:extLst>
-          </p:cNvPr>
-          <p:cNvSpPr>
-            <a:spLocks noGrp="1"/>
-          </p:cNvSpPr>
-          <p:nvPr>
-            <p:ph type="subTitle" idx="1"/>
-          </p:nvPr>
-        </p:nvSpPr>
-        <p:spPr>
-          <a:xfrm>
-            <a:off x="1524000" y="1897539"/>
-            <a:ext cx="9245600" cy="3062922"/>
-          </a:xfrm>
-        </p:spPr>
-        <p:txBody>
-          <a:bodyPr>
+          <a:bodyPr vert="horz" lIns="91440" tIns="45720" rIns="91440" bIns="45720" rtlCol="0" anchor="b">
             <a:normAutofit/>
           </a:bodyPr>
           <a:lstStyle/>
           <a:p>
-            <a:endParaRPr lang="fr-FR" dirty="0"/>
+            <a:pPr algn="ctr"/>
+            <a:r>
+              <a:rPr lang="en-US" sz="6000" b="1" dirty="0"/>
+              <a:t>Merci</a:t>
+            </a:r>
+            <a:endParaRPr lang="en-US" sz="6000" dirty="0"/>
+          </a:p>
+        </p:txBody>
+      </p:sp>
+      <p:sp>
+        <p:nvSpPr>
+          <p:cNvPr id="13" name="Freeform: Shape 12">
+            <a:extLst>
+              <a:ext uri="{FF2B5EF4-FFF2-40B4-BE49-F238E27FC236}">
+                <a16:creationId xmlns:a16="http://schemas.microsoft.com/office/drawing/2014/main" id="{1DB7C82F-AB7E-4F0C-B829-FA1B9C415180}"/>
+              </a:ext>
+              <a:ext uri="{C183D7F6-B498-43B3-948B-1728B52AA6E4}">
+                <adec:decorative xmlns:adec="http://schemas.microsoft.com/office/drawing/2017/decorative" val="1"/>
+              </a:ext>
+            </a:extLst>
+          </p:cNvPr>
+          <p:cNvSpPr>
+            <a:spLocks noGrp="1" noRot="1" noChangeAspect="1" noMove="1" noResize="1" noEditPoints="1" noAdjustHandles="1" noChangeArrowheads="1" noChangeShapeType="1" noTextEdit="1"/>
+          </p:cNvSpPr>
+          <p:nvPr>
+            <p:extLst>
+              <p:ext uri="{386F3935-93C4-4BCD-93E2-E3B085C9AB24}">
+                <p16:designElem xmlns:p16="http://schemas.microsoft.com/office/powerpoint/2015/main" val="1"/>
+              </p:ext>
+            </p:extLst>
+          </p:nvPr>
+        </p:nvSpPr>
+        <p:spPr>
+          <a:xfrm flipH="1">
+            <a:off x="0" y="0"/>
+            <a:ext cx="6172782" cy="6858000"/>
+          </a:xfrm>
+          <a:custGeom>
+            <a:avLst/>
+            <a:gdLst>
+              <a:gd name="connsiteX0" fmla="*/ 6172782 w 6172782"/>
+              <a:gd name="connsiteY0" fmla="*/ 0 h 6858000"/>
+              <a:gd name="connsiteX1" fmla="*/ 69075 w 6172782"/>
+              <a:gd name="connsiteY1" fmla="*/ 0 h 6858000"/>
+              <a:gd name="connsiteX2" fmla="*/ 35131 w 6172782"/>
+              <a:gd name="connsiteY2" fmla="*/ 267128 h 6858000"/>
+              <a:gd name="connsiteX3" fmla="*/ 0 w 6172782"/>
+              <a:gd name="connsiteY3" fmla="*/ 962845 h 6858000"/>
+              <a:gd name="connsiteX4" fmla="*/ 3276103 w 6172782"/>
+              <a:gd name="connsiteY4" fmla="*/ 6782205 h 6858000"/>
+              <a:gd name="connsiteX5" fmla="*/ 3407923 w 6172782"/>
+              <a:gd name="connsiteY5" fmla="*/ 6858000 h 6858000"/>
+              <a:gd name="connsiteX6" fmla="*/ 6172782 w 6172782"/>
+              <a:gd name="connsiteY6" fmla="*/ 6858000 h 6858000"/>
+            </a:gdLst>
+            <a:ahLst/>
+            <a:cxnLst>
+              <a:cxn ang="0">
+                <a:pos x="connsiteX0" y="connsiteY0"/>
+              </a:cxn>
+              <a:cxn ang="0">
+                <a:pos x="connsiteX1" y="connsiteY1"/>
+              </a:cxn>
+              <a:cxn ang="0">
+                <a:pos x="connsiteX2" y="connsiteY2"/>
+              </a:cxn>
+              <a:cxn ang="0">
+                <a:pos x="connsiteX3" y="connsiteY3"/>
+              </a:cxn>
+              <a:cxn ang="0">
+                <a:pos x="connsiteX4" y="connsiteY4"/>
+              </a:cxn>
+              <a:cxn ang="0">
+                <a:pos x="connsiteX5" y="connsiteY5"/>
+              </a:cxn>
+              <a:cxn ang="0">
+                <a:pos x="connsiteX6" y="connsiteY6"/>
+              </a:cxn>
+            </a:cxnLst>
+            <a:rect l="l" t="t" r="r" b="b"/>
+            <a:pathLst>
+              <a:path w="6172782" h="6858000">
+                <a:moveTo>
+                  <a:pt x="6172782" y="0"/>
+                </a:moveTo>
+                <a:lnTo>
+                  <a:pt x="69075" y="0"/>
+                </a:lnTo>
+                <a:lnTo>
+                  <a:pt x="35131" y="267128"/>
+                </a:lnTo>
+                <a:cubicBezTo>
+                  <a:pt x="11901" y="495874"/>
+                  <a:pt x="0" y="727970"/>
+                  <a:pt x="0" y="962845"/>
+                </a:cubicBezTo>
+                <a:cubicBezTo>
+                  <a:pt x="0" y="3429034"/>
+                  <a:pt x="1312002" y="5588789"/>
+                  <a:pt x="3276103" y="6782205"/>
+                </a:cubicBezTo>
+                <a:lnTo>
+                  <a:pt x="3407923" y="6858000"/>
+                </a:lnTo>
+                <a:lnTo>
+                  <a:pt x="6172782" y="6858000"/>
+                </a:lnTo>
+                <a:close/>
+              </a:path>
+            </a:pathLst>
+          </a:custGeom>
+          <a:solidFill>
+            <a:srgbClr val="FFFFFF">
+              <a:alpha val="80000"/>
+            </a:srgbClr>
+          </a:solidFill>
+          <a:ln>
+            <a:noFill/>
+          </a:ln>
+        </p:spPr>
+        <p:style>
+          <a:lnRef idx="2">
+            <a:schemeClr val="accent1">
+              <a:shade val="50000"/>
+            </a:schemeClr>
+          </a:lnRef>
+          <a:fillRef idx="1">
+            <a:schemeClr val="accent1"/>
+          </a:fillRef>
+          <a:effectRef idx="0">
+            <a:schemeClr val="accent1"/>
+          </a:effectRef>
+          <a:fontRef idx="minor">
+            <a:schemeClr val="lt1"/>
+          </a:fontRef>
+        </p:style>
+        <p:txBody>
+          <a:bodyPr wrap="square" rtlCol="0" anchor="ctr">
+            <a:noAutofit/>
+          </a:bodyPr>
+          <a:lstStyle/>
+          <a:p>
+            <a:pPr marL="0" marR="0" lvl="0" indent="0" algn="ctr" defTabSz="914400" rtl="0" eaLnBrk="1" fontAlgn="auto" latinLnBrk="0" hangingPunct="1">
+              <a:lnSpc>
+                <a:spcPct val="100000"/>
+              </a:lnSpc>
+              <a:spcBef>
+                <a:spcPts val="0"/>
+              </a:spcBef>
+              <a:spcAft>
+                <a:spcPts val="0"/>
+              </a:spcAft>
+              <a:buClrTx/>
+              <a:buSzTx/>
+              <a:buFontTx/>
+              <a:buNone/>
+              <a:tabLst/>
+              <a:defRPr/>
+            </a:pPr>
+            <a:endParaRPr kumimoji="0" lang="en-US" sz="1800" b="0" i="0" u="none" strike="noStrike" kern="1200" cap="none" spc="0" normalizeH="0" baseline="0" noProof="0">
+              <a:ln>
+                <a:noFill/>
+              </a:ln>
+              <a:solidFill>
+                <a:prstClr val="white"/>
+              </a:solidFill>
+              <a:effectLst/>
+              <a:uLnTx/>
+              <a:uFillTx/>
+              <a:latin typeface="Calibri" panose="020F0502020204030204"/>
+              <a:ea typeface="+mn-ea"/>
+              <a:cs typeface="+mn-cs"/>
+            </a:endParaRPr>
           </a:p>
         </p:txBody>
       </p:sp>
       <p:pic>
         <p:nvPicPr>
-          <p:cNvPr id="4" name="Image 3">
-            <a:extLst>
-              <a:ext uri="{FF2B5EF4-FFF2-40B4-BE49-F238E27FC236}">
-                <a16:creationId xmlns:a16="http://schemas.microsoft.com/office/drawing/2014/main" id="{D86C892C-1E6D-41AC-9500-A62F2106E5BF}"/>
+          <p:cNvPr id="8" name="Image 7">
+            <a:extLst>
+              <a:ext uri="{FF2B5EF4-FFF2-40B4-BE49-F238E27FC236}">
+                <a16:creationId xmlns:a16="http://schemas.microsoft.com/office/drawing/2014/main" id="{6544D499-1984-49D0-93AC-9584A893DE63}"/>
               </a:ext>
             </a:extLst>
           </p:cNvPr>
@@ -13708,37 +14950,107 @@
           </p:cNvPicPr>
           <p:nvPr/>
         </p:nvPicPr>
-        <p:blipFill>
-          <a:blip r:embed="rId2">
+        <p:blipFill rotWithShape="1">
+          <a:blip r:embed="rId3">
             <a:extLst>
               <a:ext uri="{28A0092B-C50C-407E-A947-70E740481C1C}">
                 <a14:useLocalDpi xmlns:a14="http://schemas.microsoft.com/office/drawing/2010/main" val="0"/>
               </a:ext>
             </a:extLst>
           </a:blip>
-          <a:stretch>
-            <a:fillRect/>
-          </a:stretch>
+          <a:srcRect l="10851" r="1308"/>
+          <a:stretch/>
         </p:blipFill>
         <p:spPr>
           <a:xfrm>
-            <a:off x="10769600" y="5435600"/>
-            <a:ext cx="1422400" cy="1422400"/>
+            <a:off x="20" y="10"/>
+            <a:ext cx="6024134" cy="6857990"/>
           </a:xfrm>
-          <a:prstGeom prst="rect">
+          <a:custGeom>
             <a:avLst/>
-          </a:prstGeom>
+            <a:gdLst>
+              <a:gd name="connsiteX0" fmla="*/ 0 w 6024154"/>
+              <a:gd name="connsiteY0" fmla="*/ 0 h 6858000"/>
+              <a:gd name="connsiteX1" fmla="*/ 5953780 w 6024154"/>
+              <a:gd name="connsiteY1" fmla="*/ 0 h 6858000"/>
+              <a:gd name="connsiteX2" fmla="*/ 5989880 w 6024154"/>
+              <a:gd name="connsiteY2" fmla="*/ 284091 h 6858000"/>
+              <a:gd name="connsiteX3" fmla="*/ 6024154 w 6024154"/>
+              <a:gd name="connsiteY3" fmla="*/ 962844 h 6858000"/>
+              <a:gd name="connsiteX4" fmla="*/ 2549934 w 6024154"/>
+              <a:gd name="connsiteY4" fmla="*/ 6800152 h 6858000"/>
+              <a:gd name="connsiteX5" fmla="*/ 2436987 w 6024154"/>
+              <a:gd name="connsiteY5" fmla="*/ 6858000 h 6858000"/>
+              <a:gd name="connsiteX6" fmla="*/ 0 w 6024154"/>
+              <a:gd name="connsiteY6" fmla="*/ 6858000 h 6858000"/>
+            </a:gdLst>
+            <a:ahLst/>
+            <a:cxnLst>
+              <a:cxn ang="0">
+                <a:pos x="connsiteX0" y="connsiteY0"/>
+              </a:cxn>
+              <a:cxn ang="0">
+                <a:pos x="connsiteX1" y="connsiteY1"/>
+              </a:cxn>
+              <a:cxn ang="0">
+                <a:pos x="connsiteX2" y="connsiteY2"/>
+              </a:cxn>
+              <a:cxn ang="0">
+                <a:pos x="connsiteX3" y="connsiteY3"/>
+              </a:cxn>
+              <a:cxn ang="0">
+                <a:pos x="connsiteX4" y="connsiteY4"/>
+              </a:cxn>
+              <a:cxn ang="0">
+                <a:pos x="connsiteX5" y="connsiteY5"/>
+              </a:cxn>
+              <a:cxn ang="0">
+                <a:pos x="connsiteX6" y="connsiteY6"/>
+              </a:cxn>
+            </a:cxnLst>
+            <a:rect l="l" t="t" r="r" b="b"/>
+            <a:pathLst>
+              <a:path w="6024154" h="6858000">
+                <a:moveTo>
+                  <a:pt x="0" y="0"/>
+                </a:moveTo>
+                <a:lnTo>
+                  <a:pt x="5953780" y="0"/>
+                </a:lnTo>
+                <a:lnTo>
+                  <a:pt x="5989880" y="284091"/>
+                </a:lnTo>
+                <a:cubicBezTo>
+                  <a:pt x="6012544" y="507260"/>
+                  <a:pt x="6024154" y="733696"/>
+                  <a:pt x="6024154" y="962844"/>
+                </a:cubicBezTo>
+                <a:cubicBezTo>
+                  <a:pt x="6024154" y="3483472"/>
+                  <a:pt x="4619336" y="5675986"/>
+                  <a:pt x="2549934" y="6800152"/>
+                </a:cubicBezTo>
+                <a:lnTo>
+                  <a:pt x="2436987" y="6858000"/>
+                </a:lnTo>
+                <a:lnTo>
+                  <a:pt x="0" y="6858000"/>
+                </a:lnTo>
+                <a:close/>
+              </a:path>
+            </a:pathLst>
+          </a:custGeom>
         </p:spPr>
       </p:pic>
     </p:spTree>
     <p:extLst>
       <p:ext uri="{BB962C8B-B14F-4D97-AF65-F5344CB8AC3E}">
-        <p14:creationId xmlns:p14="http://schemas.microsoft.com/office/powerpoint/2010/main" val="2791180461"/>
+        <p14:creationId xmlns:p14="http://schemas.microsoft.com/office/powerpoint/2010/main" val="2148296200"/>
       </p:ext>
     </p:extLst>
   </p:cSld>
   <p:clrMapOvr>
-    <a:masterClrMapping/>
+    <a:overrideClrMapping bg1="dk1" tx1="lt1" bg2="dk2" tx2="lt2" accent1="accent1" accent2="accent2" accent3="accent3" accent4="accent4" accent5="accent5" accent6="accent6" hlink="hlink" folHlink="folHlink"/>
   </p:clrMapOvr>
 </p:sld>
 </file>
@@ -17042,240 +18354,6 @@
                       </p:childTnLst>
                     </p:cTn>
                   </p:par>
-                  <p:par>
-                    <p:cTn id="31" fill="hold">
-                      <p:stCondLst>
-                        <p:cond delay="indefinite"/>
-                      </p:stCondLst>
-                      <p:childTnLst>
-                        <p:par>
-                          <p:cTn id="32" fill="hold">
-                            <p:stCondLst>
-                              <p:cond delay="0"/>
-                            </p:stCondLst>
-                            <p:childTnLst>
-                              <p:par>
-                                <p:cTn id="33" presetID="1" presetClass="exit" presetSubtype="0" fill="hold" grpId="1" nodeType="clickEffect">
-                                  <p:stCondLst>
-                                    <p:cond delay="0"/>
-                                  </p:stCondLst>
-                                  <p:childTnLst>
-                                    <p:set>
-                                      <p:cBhvr>
-                                        <p:cTn id="34" dur="1" fill="hold">
-                                          <p:stCondLst>
-                                            <p:cond delay="0"/>
-                                          </p:stCondLst>
-                                        </p:cTn>
-                                        <p:tgtEl>
-                                          <p:spTgt spid="6"/>
-                                        </p:tgtEl>
-                                        <p:attrNameLst>
-                                          <p:attrName>style.visibility</p:attrName>
-                                        </p:attrNameLst>
-                                      </p:cBhvr>
-                                      <p:to>
-                                        <p:strVal val="hidden"/>
-                                      </p:to>
-                                    </p:set>
-                                  </p:childTnLst>
-                                </p:cTn>
-                              </p:par>
-                              <p:par>
-                                <p:cTn id="35" presetID="1" presetClass="exit" presetSubtype="0" fill="hold" grpId="1" nodeType="withEffect">
-                                  <p:stCondLst>
-                                    <p:cond delay="0"/>
-                                  </p:stCondLst>
-                                  <p:childTnLst>
-                                    <p:set>
-                                      <p:cBhvr>
-                                        <p:cTn id="36" dur="1" fill="hold">
-                                          <p:stCondLst>
-                                            <p:cond delay="0"/>
-                                          </p:stCondLst>
-                                        </p:cTn>
-                                        <p:tgtEl>
-                                          <p:spTgt spid="7"/>
-                                        </p:tgtEl>
-                                        <p:attrNameLst>
-                                          <p:attrName>style.visibility</p:attrName>
-                                        </p:attrNameLst>
-                                      </p:cBhvr>
-                                      <p:to>
-                                        <p:strVal val="hidden"/>
-                                      </p:to>
-                                    </p:set>
-                                  </p:childTnLst>
-                                </p:cTn>
-                              </p:par>
-                              <p:par>
-                                <p:cTn id="37" presetID="1" presetClass="exit" presetSubtype="0" fill="hold" grpId="1" nodeType="withEffect">
-                                  <p:stCondLst>
-                                    <p:cond delay="0"/>
-                                  </p:stCondLst>
-                                  <p:childTnLst>
-                                    <p:set>
-                                      <p:cBhvr>
-                                        <p:cTn id="38" dur="1" fill="hold">
-                                          <p:stCondLst>
-                                            <p:cond delay="0"/>
-                                          </p:stCondLst>
-                                        </p:cTn>
-                                        <p:tgtEl>
-                                          <p:spTgt spid="8"/>
-                                        </p:tgtEl>
-                                        <p:attrNameLst>
-                                          <p:attrName>style.visibility</p:attrName>
-                                        </p:attrNameLst>
-                                      </p:cBhvr>
-                                      <p:to>
-                                        <p:strVal val="hidden"/>
-                                      </p:to>
-                                    </p:set>
-                                  </p:childTnLst>
-                                </p:cTn>
-                              </p:par>
-                              <p:par>
-                                <p:cTn id="39" presetID="1" presetClass="exit" presetSubtype="0" fill="hold" grpId="1" nodeType="withEffect">
-                                  <p:stCondLst>
-                                    <p:cond delay="0"/>
-                                  </p:stCondLst>
-                                  <p:childTnLst>
-                                    <p:set>
-                                      <p:cBhvr>
-                                        <p:cTn id="40" dur="1" fill="hold">
-                                          <p:stCondLst>
-                                            <p:cond delay="0"/>
-                                          </p:stCondLst>
-                                        </p:cTn>
-                                        <p:tgtEl>
-                                          <p:spTgt spid="9"/>
-                                        </p:tgtEl>
-                                        <p:attrNameLst>
-                                          <p:attrName>style.visibility</p:attrName>
-                                        </p:attrNameLst>
-                                      </p:cBhvr>
-                                      <p:to>
-                                        <p:strVal val="hidden"/>
-                                      </p:to>
-                                    </p:set>
-                                  </p:childTnLst>
-                                </p:cTn>
-                              </p:par>
-                              <p:par>
-                                <p:cTn id="41" presetID="1" presetClass="exit" presetSubtype="0" fill="hold" grpId="1" nodeType="withEffect">
-                                  <p:stCondLst>
-                                    <p:cond delay="0"/>
-                                  </p:stCondLst>
-                                  <p:childTnLst>
-                                    <p:set>
-                                      <p:cBhvr>
-                                        <p:cTn id="42" dur="1" fill="hold">
-                                          <p:stCondLst>
-                                            <p:cond delay="0"/>
-                                          </p:stCondLst>
-                                        </p:cTn>
-                                        <p:tgtEl>
-                                          <p:spTgt spid="10"/>
-                                        </p:tgtEl>
-                                        <p:attrNameLst>
-                                          <p:attrName>style.visibility</p:attrName>
-                                        </p:attrNameLst>
-                                      </p:cBhvr>
-                                      <p:to>
-                                        <p:strVal val="hidden"/>
-                                      </p:to>
-                                    </p:set>
-                                  </p:childTnLst>
-                                </p:cTn>
-                              </p:par>
-                              <p:par>
-                                <p:cTn id="43" presetID="1" presetClass="exit" presetSubtype="0" fill="hold" grpId="1" nodeType="withEffect">
-                                  <p:stCondLst>
-                                    <p:cond delay="0"/>
-                                  </p:stCondLst>
-                                  <p:childTnLst>
-                                    <p:set>
-                                      <p:cBhvr>
-                                        <p:cTn id="44" dur="1" fill="hold">
-                                          <p:stCondLst>
-                                            <p:cond delay="0"/>
-                                          </p:stCondLst>
-                                        </p:cTn>
-                                        <p:tgtEl>
-                                          <p:spTgt spid="11"/>
-                                        </p:tgtEl>
-                                        <p:attrNameLst>
-                                          <p:attrName>style.visibility</p:attrName>
-                                        </p:attrNameLst>
-                                      </p:cBhvr>
-                                      <p:to>
-                                        <p:strVal val="hidden"/>
-                                      </p:to>
-                                    </p:set>
-                                  </p:childTnLst>
-                                </p:cTn>
-                              </p:par>
-                              <p:par>
-                                <p:cTn id="45" presetID="1" presetClass="exit" presetSubtype="0" fill="hold" grpId="1" nodeType="withEffect">
-                                  <p:stCondLst>
-                                    <p:cond delay="0"/>
-                                  </p:stCondLst>
-                                  <p:childTnLst>
-                                    <p:set>
-                                      <p:cBhvr>
-                                        <p:cTn id="46" dur="1" fill="hold">
-                                          <p:stCondLst>
-                                            <p:cond delay="0"/>
-                                          </p:stCondLst>
-                                        </p:cTn>
-                                        <p:tgtEl>
-                                          <p:spTgt spid="12"/>
-                                        </p:tgtEl>
-                                        <p:attrNameLst>
-                                          <p:attrName>style.visibility</p:attrName>
-                                        </p:attrNameLst>
-                                      </p:cBhvr>
-                                      <p:to>
-                                        <p:strVal val="hidden"/>
-                                      </p:to>
-                                    </p:set>
-                                  </p:childTnLst>
-                                </p:cTn>
-                              </p:par>
-                              <p:par>
-                                <p:cTn id="47" presetID="1" presetClass="exit" presetSubtype="0" fill="hold" nodeType="withEffect">
-                                  <p:stCondLst>
-                                    <p:cond delay="0"/>
-                                  </p:stCondLst>
-                                  <p:childTnLst>
-                                    <p:set>
-                                      <p:cBhvr>
-                                        <p:cTn id="48" dur="1" fill="hold">
-                                          <p:stCondLst>
-                                            <p:cond delay="0"/>
-                                          </p:stCondLst>
-                                        </p:cTn>
-                                        <p:tgtEl>
-                                          <p:spTgt spid="5"/>
-                                        </p:tgtEl>
-                                        <p:attrNameLst>
-                                          <p:attrName>style.visibility</p:attrName>
-                                        </p:attrNameLst>
-                                      </p:cBhvr>
-                                      <p:to>
-                                        <p:strVal val="hidden"/>
-                                      </p:to>
-                                    </p:set>
-                                  </p:childTnLst>
-                                </p:cTn>
-                              </p:par>
-                            </p:childTnLst>
-                          </p:cTn>
-                        </p:par>
-                      </p:childTnLst>
-                    </p:cTn>
-                  </p:par>
                 </p:childTnLst>
               </p:cTn>
               <p:prevCondLst>
@@ -17299,19 +18377,12 @@
     </p:tnLst>
     <p:bldLst>
       <p:bldP spid="6" grpId="0" animBg="1"/>
-      <p:bldP spid="6" grpId="1" animBg="1"/>
       <p:bldP spid="7" grpId="0" animBg="1"/>
-      <p:bldP spid="7" grpId="1" animBg="1"/>
       <p:bldP spid="8" grpId="0" animBg="1"/>
-      <p:bldP spid="8" grpId="1" animBg="1"/>
       <p:bldP spid="9" grpId="0" animBg="1"/>
-      <p:bldP spid="9" grpId="1" animBg="1"/>
       <p:bldP spid="10" grpId="0" animBg="1"/>
-      <p:bldP spid="10" grpId="1" animBg="1"/>
       <p:bldP spid="11" grpId="0" animBg="1"/>
-      <p:bldP spid="11" grpId="1" animBg="1"/>
       <p:bldP spid="12" grpId="0" animBg="1"/>
-      <p:bldP spid="12" grpId="1" animBg="1"/>
     </p:bldLst>
   </p:timing>
 </p:sld>

</xml_diff>